<commit_message>
Add RQs to Powerpoint
</commit_message>
<xml_diff>
--- a/mrubis_controller/presentation/MLC.pptx
+++ b/mrubis_controller/presentation/MLC.pptx
@@ -5,29 +5,30 @@
     <p:sldMasterId id="2147483648" r:id="rId1"/>
   </p:sldMasterIdLst>
   <p:notesMasterIdLst>
-    <p:notesMasterId r:id="rId14"/>
+    <p:notesMasterId r:id="rId15"/>
   </p:notesMasterIdLst>
   <p:handoutMasterIdLst>
-    <p:handoutMasterId r:id="rId15"/>
+    <p:handoutMasterId r:id="rId16"/>
   </p:handoutMasterIdLst>
   <p:sldIdLst>
     <p:sldId id="258" r:id="rId2"/>
     <p:sldId id="262" r:id="rId3"/>
     <p:sldId id="273" r:id="rId4"/>
-    <p:sldId id="272" r:id="rId5"/>
-    <p:sldId id="263" r:id="rId6"/>
-    <p:sldId id="271" r:id="rId7"/>
-    <p:sldId id="259" r:id="rId8"/>
-    <p:sldId id="261" r:id="rId9"/>
-    <p:sldId id="266" r:id="rId10"/>
-    <p:sldId id="267" r:id="rId11"/>
-    <p:sldId id="268" r:id="rId12"/>
-    <p:sldId id="269" r:id="rId13"/>
+    <p:sldId id="274" r:id="rId5"/>
+    <p:sldId id="272" r:id="rId6"/>
+    <p:sldId id="263" r:id="rId7"/>
+    <p:sldId id="271" r:id="rId8"/>
+    <p:sldId id="259" r:id="rId9"/>
+    <p:sldId id="261" r:id="rId10"/>
+    <p:sldId id="266" r:id="rId11"/>
+    <p:sldId id="267" r:id="rId12"/>
+    <p:sldId id="268" r:id="rId13"/>
+    <p:sldId id="269" r:id="rId14"/>
   </p:sldIdLst>
   <p:sldSz cx="9144000" cy="5143500" type="screen16x9"/>
   <p:notesSz cx="6858000" cy="9144000"/>
   <p:custDataLst>
-    <p:tags r:id="rId16"/>
+    <p:tags r:id="rId17"/>
   </p:custDataLst>
   <p:defaultTextStyle>
     <a:defPPr>
@@ -354,7 +355,7 @@
             <a:fld id="{AA592FF2-A4BD-4E98-AC76-A10007E04C10}" type="datetimeFigureOut">
               <a:rPr lang="en-US" smtClean="0"/>
               <a:pPr/>
-              <a:t>9/15/2021</a:t>
+              <a:t>9/19/2021</a:t>
             </a:fld>
             <a:endParaRPr lang="en-US" dirty="0"/>
           </a:p>
@@ -1211,7 +1212,7 @@
             <a:fld id="{AA592FF2-A4BD-4E98-AC76-A10007E04C10}" type="datetimeFigureOut">
               <a:rPr lang="en-US" smtClean="0"/>
               <a:pPr/>
-              <a:t>9/15/2021</a:t>
+              <a:t>9/19/2021</a:t>
             </a:fld>
             <a:endParaRPr lang="en-US" dirty="0"/>
           </a:p>
@@ -2753,7 +2754,7 @@
             <a:fld id="{4CBF50E3-ED67-46F2-ABFC-A36EE1082CF7}" type="slidenum">
               <a:rPr lang="en-US" b="1" smtClean="0"/>
               <a:pPr/>
-              <a:t>12</a:t>
+              <a:t>13</a:t>
             </a:fld>
             <a:endParaRPr lang="en-US" b="1" dirty="0"/>
           </a:p>
@@ -2941,7 +2942,7 @@
             <a:fld id="{4CBF50E3-ED67-46F2-ABFC-A36EE1082CF7}" type="slidenum">
               <a:rPr lang="en-US" b="1" smtClean="0"/>
               <a:pPr/>
-              <a:t>5</a:t>
+              <a:t>6</a:t>
             </a:fld>
             <a:endParaRPr lang="en-US" b="1" dirty="0"/>
           </a:p>
@@ -3035,7 +3036,7 @@
             <a:fld id="{4CBF50E3-ED67-46F2-ABFC-A36EE1082CF7}" type="slidenum">
               <a:rPr lang="en-US" b="1" smtClean="0"/>
               <a:pPr/>
-              <a:t>6</a:t>
+              <a:t>7</a:t>
             </a:fld>
             <a:endParaRPr lang="en-US" b="1" dirty="0"/>
           </a:p>
@@ -3129,7 +3130,7 @@
             <a:fld id="{4CBF50E3-ED67-46F2-ABFC-A36EE1082CF7}" type="slidenum">
               <a:rPr lang="en-US" b="1" smtClean="0"/>
               <a:pPr/>
-              <a:t>7</a:t>
+              <a:t>8</a:t>
             </a:fld>
             <a:endParaRPr lang="en-US" b="1" dirty="0"/>
           </a:p>
@@ -3223,7 +3224,7 @@
             <a:fld id="{4CBF50E3-ED67-46F2-ABFC-A36EE1082CF7}" type="slidenum">
               <a:rPr lang="en-US" b="1" smtClean="0"/>
               <a:pPr/>
-              <a:t>8</a:t>
+              <a:t>9</a:t>
             </a:fld>
             <a:endParaRPr lang="en-US" b="1" dirty="0"/>
           </a:p>
@@ -3317,7 +3318,7 @@
             <a:fld id="{4CBF50E3-ED67-46F2-ABFC-A36EE1082CF7}" type="slidenum">
               <a:rPr lang="en-US" b="1" smtClean="0"/>
               <a:pPr/>
-              <a:t>9</a:t>
+              <a:t>10</a:t>
             </a:fld>
             <a:endParaRPr lang="en-US" b="1" dirty="0"/>
           </a:p>
@@ -3411,7 +3412,7 @@
             <a:fld id="{4CBF50E3-ED67-46F2-ABFC-A36EE1082CF7}" type="slidenum">
               <a:rPr lang="en-US" b="1" smtClean="0"/>
               <a:pPr/>
-              <a:t>10</a:t>
+              <a:t>11</a:t>
             </a:fld>
             <a:endParaRPr lang="en-US" b="1" dirty="0"/>
           </a:p>
@@ -3505,7 +3506,7 @@
             <a:fld id="{4CBF50E3-ED67-46F2-ABFC-A36EE1082CF7}" type="slidenum">
               <a:rPr lang="en-US" b="1" smtClean="0"/>
               <a:pPr/>
-              <a:t>11</a:t>
+              <a:t>12</a:t>
             </a:fld>
             <a:endParaRPr lang="en-US" b="1" dirty="0"/>
           </a:p>
@@ -11806,6 +11807,572 @@
           <a:lstStyle/>
           <a:p>
             <a:r>
+              <a:rPr lang="en-US"/>
+              <a:t>Explanations</a:t>
+            </a:r>
+            <a:br>
+              <a:rPr lang="en-US"/>
+            </a:br>
+            <a:r>
+              <a:rPr lang="en-US"/>
+              <a:t>- Text layers</a:t>
+            </a:r>
+            <a:endParaRPr lang="en-US" dirty="0"/>
+          </a:p>
+        </p:txBody>
+      </p:sp>
+      <p:sp>
+        <p:nvSpPr>
+          <p:cNvPr id="5" name="Text Placeholder 4"/>
+          <p:cNvSpPr>
+            <a:spLocks noGrp="1"/>
+          </p:cNvSpPr>
+          <p:nvPr>
+            <p:ph type="body" sz="quarter" idx="13"/>
+          </p:nvPr>
+        </p:nvSpPr>
+        <p:spPr bwMode="gray"/>
+        <p:txBody>
+          <a:bodyPr/>
+          <a:lstStyle/>
+          <a:p>
+            <a:r>
+              <a:rPr lang="en-US" dirty="0"/>
+              <a:t>First text layer for running text. </a:t>
+            </a:r>
+          </a:p>
+          <a:p>
+            <a:pPr lvl="1"/>
+            <a:r>
+              <a:rPr lang="en-US" dirty="0"/>
+              <a:t>Second level for bullet points</a:t>
+            </a:r>
+          </a:p>
+          <a:p>
+            <a:pPr lvl="2"/>
+            <a:r>
+              <a:rPr lang="en-US" dirty="0"/>
+              <a:t>Third level for bullet points</a:t>
+            </a:r>
+          </a:p>
+          <a:p>
+            <a:pPr lvl="3"/>
+            <a:r>
+              <a:rPr lang="en-US" dirty="0"/>
+              <a:t>Fourth level for bullet points</a:t>
+            </a:r>
+          </a:p>
+          <a:p>
+            <a:pPr lvl="4"/>
+            <a:r>
+              <a:rPr lang="en-US" dirty="0"/>
+              <a:t>Fifth level for numberings</a:t>
+            </a:r>
+          </a:p>
+          <a:p>
+            <a:pPr lvl="5"/>
+            <a:r>
+              <a:rPr lang="en-US" dirty="0"/>
+              <a:t>Sixth level for listings</a:t>
+            </a:r>
+          </a:p>
+          <a:p>
+            <a:pPr lvl="6"/>
+            <a:r>
+              <a:rPr lang="en-US" dirty="0"/>
+              <a:t>Seventh text layer </a:t>
+            </a:r>
+            <a:br>
+              <a:rPr lang="en-US" dirty="0"/>
+            </a:br>
+            <a:r>
+              <a:rPr lang="en-US" dirty="0"/>
+              <a:t>for Core Messages</a:t>
+            </a:r>
+          </a:p>
+          <a:p>
+            <a:pPr lvl="3"/>
+            <a:endParaRPr lang="en-US" dirty="0"/>
+          </a:p>
+          <a:p>
+            <a:pPr lvl="3"/>
+            <a:endParaRPr lang="en-US" dirty="0"/>
+          </a:p>
+          <a:p>
+            <a:endParaRPr lang="en-US" dirty="0"/>
+          </a:p>
+        </p:txBody>
+      </p:sp>
+      <p:sp>
+        <p:nvSpPr>
+          <p:cNvPr id="6" name="Text Placeholder 5"/>
+          <p:cNvSpPr>
+            <a:spLocks noGrp="1"/>
+          </p:cNvSpPr>
+          <p:nvPr>
+            <p:ph type="body" sz="quarter" idx="14"/>
+          </p:nvPr>
+        </p:nvSpPr>
+        <p:spPr bwMode="gray"/>
+        <p:txBody>
+          <a:bodyPr/>
+          <a:lstStyle/>
+          <a:p>
+            <a:r>
+              <a:rPr lang="en-US" dirty="0"/>
+              <a:t>In this template, we pre-formatted different text layers </a:t>
+            </a:r>
+            <a:br>
+              <a:rPr lang="en-US" dirty="0"/>
+            </a:br>
+            <a:r>
+              <a:rPr lang="en-US" dirty="0"/>
+              <a:t>(as you can see on the right side). </a:t>
+            </a:r>
+            <a:br>
+              <a:rPr lang="en-US" dirty="0"/>
+            </a:br>
+            <a:br>
+              <a:rPr lang="en-US" dirty="0"/>
+            </a:br>
+            <a:r>
+              <a:rPr lang="en-US" dirty="0"/>
+              <a:t>You don’t have to generate </a:t>
+            </a:r>
+            <a:br>
+              <a:rPr lang="en-US" dirty="0"/>
+            </a:br>
+            <a:r>
+              <a:rPr lang="en-US" dirty="0"/>
+              <a:t>bullet points manually. </a:t>
+            </a:r>
+            <a:br>
+              <a:rPr lang="en-US" dirty="0"/>
+            </a:br>
+            <a:r>
+              <a:rPr lang="en-US" b="1" dirty="0"/>
+              <a:t>By the way: Please avoid this!</a:t>
+            </a:r>
+          </a:p>
+          <a:p>
+            <a:r>
+              <a:rPr lang="en-US" dirty="0"/>
+              <a:t>To change from one text layer</a:t>
+            </a:r>
+            <a:br>
+              <a:rPr lang="en-US" dirty="0"/>
+            </a:br>
+            <a:r>
+              <a:rPr lang="en-US" dirty="0"/>
+              <a:t>to the next, use the </a:t>
+            </a:r>
+            <a:br>
+              <a:rPr lang="en-US" dirty="0"/>
+            </a:br>
+            <a:r>
+              <a:rPr lang="en-US" dirty="0"/>
+              <a:t>Increase / Decrease List Level buttons:</a:t>
+            </a:r>
+          </a:p>
+          <a:p>
+            <a:endParaRPr lang="en-US" dirty="0"/>
+          </a:p>
+          <a:p>
+            <a:endParaRPr lang="en-US" dirty="0"/>
+          </a:p>
+          <a:p>
+            <a:pPr lvl="3"/>
+            <a:endParaRPr lang="en-US" dirty="0"/>
+          </a:p>
+        </p:txBody>
+      </p:sp>
+      <p:pic>
+        <p:nvPicPr>
+          <p:cNvPr id="8" name="Picture 2"/>
+          <p:cNvPicPr>
+            <a:picLocks noChangeAspect="1" noChangeArrowheads="1"/>
+          </p:cNvPicPr>
+          <p:nvPr/>
+        </p:nvPicPr>
+        <p:blipFill>
+          <a:blip r:embed="rId3" cstate="screen">
+            <a:extLst>
+              <a:ext uri="{28A0092B-C50C-407E-A947-70E740481C1C}">
+                <a14:useLocalDpi xmlns:a14="http://schemas.microsoft.com/office/drawing/2010/main"/>
+              </a:ext>
+            </a:extLst>
+          </a:blip>
+          <a:srcRect/>
+          <a:stretch>
+            <a:fillRect/>
+          </a:stretch>
+        </p:blipFill>
+        <p:spPr bwMode="gray">
+          <a:xfrm>
+            <a:off x="3886201" y="3721986"/>
+            <a:ext cx="3349624" cy="664227"/>
+          </a:xfrm>
+          <a:prstGeom prst="rect">
+            <a:avLst/>
+          </a:prstGeom>
+          <a:noFill/>
+          <a:ln>
+            <a:noFill/>
+          </a:ln>
+          <a:extLst>
+            <a:ext uri="{909E8E84-426E-40DD-AFC4-6F175D3DCCD1}">
+              <a14:hiddenFill xmlns:a14="http://schemas.microsoft.com/office/drawing/2010/main">
+                <a:solidFill>
+                  <a:schemeClr val="accent1"/>
+                </a:solidFill>
+              </a14:hiddenFill>
+            </a:ext>
+            <a:ext uri="{91240B29-F687-4F45-9708-019B960494DF}">
+              <a14:hiddenLine xmlns:a14="http://schemas.microsoft.com/office/drawing/2010/main" w="9525">
+                <a:solidFill>
+                  <a:schemeClr val="tx1"/>
+                </a:solidFill>
+                <a:miter lim="800000"/>
+                <a:headEnd/>
+                <a:tailEnd/>
+              </a14:hiddenLine>
+            </a:ext>
+          </a:extLst>
+        </p:spPr>
+      </p:pic>
+      <p:grpSp>
+        <p:nvGrpSpPr>
+          <p:cNvPr id="13" name="Group 12"/>
+          <p:cNvGrpSpPr/>
+          <p:nvPr/>
+        </p:nvGrpSpPr>
+        <p:grpSpPr bwMode="gray">
+          <a:xfrm>
+            <a:off x="6633315" y="3993610"/>
+            <a:ext cx="566291" cy="808783"/>
+            <a:chOff x="3060700" y="3737426"/>
+            <a:chExt cx="635034" cy="906963"/>
+          </a:xfrm>
+        </p:grpSpPr>
+        <p:sp>
+          <p:nvSpPr>
+            <p:cNvPr id="9" name="Rectangle 8"/>
+            <p:cNvSpPr/>
+            <p:nvPr/>
+          </p:nvSpPr>
+          <p:spPr bwMode="gray">
+            <a:xfrm>
+              <a:off x="3232097" y="3737426"/>
+              <a:ext cx="292241" cy="150005"/>
+            </a:xfrm>
+            <a:prstGeom prst="rect">
+              <a:avLst/>
+            </a:prstGeom>
+            <a:noFill/>
+            <a:ln w="9525">
+              <a:solidFill>
+                <a:schemeClr val="tx2"/>
+              </a:solidFill>
+            </a:ln>
+          </p:spPr>
+          <p:style>
+            <a:lnRef idx="2">
+              <a:schemeClr val="accent1">
+                <a:shade val="50000"/>
+              </a:schemeClr>
+            </a:lnRef>
+            <a:fillRef idx="1">
+              <a:schemeClr val="accent1"/>
+            </a:fillRef>
+            <a:effectRef idx="0">
+              <a:schemeClr val="accent1"/>
+            </a:effectRef>
+            <a:fontRef idx="minor">
+              <a:schemeClr val="lt1"/>
+            </a:fontRef>
+          </p:style>
+          <p:txBody>
+            <a:bodyPr rot="0" spcFirstLastPara="0" vertOverflow="overflow" horzOverflow="overflow" vert="horz" wrap="square" lIns="108000" tIns="72000" rIns="108000" bIns="72000" numCol="1" spcCol="0" rtlCol="0" fromWordArt="0" anchor="ctr" anchorCtr="0" forceAA="0" compatLnSpc="1">
+              <a:prstTxWarp prst="textNoShape">
+                <a:avLst/>
+              </a:prstTxWarp>
+              <a:noAutofit/>
+            </a:bodyPr>
+            <a:lstStyle/>
+            <a:p>
+              <a:pPr algn="ctr"/>
+              <a:endParaRPr lang="en-US" sz="1600" dirty="0" err="1"/>
+            </a:p>
+          </p:txBody>
+        </p:sp>
+        <p:pic>
+          <p:nvPicPr>
+            <p:cNvPr id="10" name="Picture 3"/>
+            <p:cNvPicPr>
+              <a:picLocks noChangeAspect="1" noChangeArrowheads="1"/>
+            </p:cNvPicPr>
+            <p:nvPr/>
+          </p:nvPicPr>
+          <p:blipFill>
+            <a:blip r:embed="rId4">
+              <a:extLst>
+                <a:ext uri="{28A0092B-C50C-407E-A947-70E740481C1C}">
+                  <a14:useLocalDpi xmlns:a14="http://schemas.microsoft.com/office/drawing/2010/main"/>
+                </a:ext>
+              </a:extLst>
+            </a:blip>
+            <a:srcRect/>
+            <a:stretch>
+              <a:fillRect/>
+            </a:stretch>
+          </p:blipFill>
+          <p:spPr bwMode="gray">
+            <a:xfrm>
+              <a:off x="3060700" y="4313641"/>
+              <a:ext cx="635034" cy="330748"/>
+            </a:xfrm>
+            <a:prstGeom prst="rect">
+              <a:avLst/>
+            </a:prstGeom>
+            <a:noFill/>
+            <a:ln w="9525">
+              <a:solidFill>
+                <a:schemeClr val="tx2"/>
+              </a:solidFill>
+              <a:miter lim="800000"/>
+              <a:headEnd/>
+              <a:tailEnd/>
+            </a:ln>
+            <a:extLst>
+              <a:ext uri="{909E8E84-426E-40DD-AFC4-6F175D3DCCD1}">
+                <a14:hiddenFill xmlns:a14="http://schemas.microsoft.com/office/drawing/2010/main">
+                  <a:solidFill>
+                    <a:schemeClr val="accent1"/>
+                  </a:solidFill>
+                </a14:hiddenFill>
+              </a:ext>
+            </a:extLst>
+          </p:spPr>
+        </p:pic>
+        <p:cxnSp>
+          <p:nvCxnSpPr>
+            <p:cNvPr id="11" name="Straight Arrow Connector 10"/>
+            <p:cNvCxnSpPr/>
+            <p:nvPr/>
+          </p:nvCxnSpPr>
+          <p:spPr bwMode="gray">
+            <a:xfrm flipH="1">
+              <a:off x="3060700" y="3887431"/>
+              <a:ext cx="171397" cy="430822"/>
+            </a:xfrm>
+            <a:prstGeom prst="straightConnector1">
+              <a:avLst/>
+            </a:prstGeom>
+            <a:ln w="12700">
+              <a:solidFill>
+                <a:schemeClr val="tx2"/>
+              </a:solidFill>
+              <a:headEnd type="none" w="med" len="med"/>
+              <a:tailEnd type="triangle" w="med" len="med"/>
+            </a:ln>
+          </p:spPr>
+          <p:style>
+            <a:lnRef idx="1">
+              <a:schemeClr val="accent1"/>
+            </a:lnRef>
+            <a:fillRef idx="0">
+              <a:schemeClr val="accent1"/>
+            </a:fillRef>
+            <a:effectRef idx="0">
+              <a:schemeClr val="accent1"/>
+            </a:effectRef>
+            <a:fontRef idx="minor">
+              <a:schemeClr val="tx1"/>
+            </a:fontRef>
+          </p:style>
+        </p:cxnSp>
+        <p:cxnSp>
+          <p:nvCxnSpPr>
+            <p:cNvPr id="12" name="Straight Arrow Connector 11"/>
+            <p:cNvCxnSpPr>
+              <a:stCxn id="9" idx="3"/>
+            </p:cNvCxnSpPr>
+            <p:nvPr/>
+          </p:nvCxnSpPr>
+          <p:spPr bwMode="gray">
+            <a:xfrm>
+              <a:off x="3524338" y="3812429"/>
+              <a:ext cx="171396" cy="505824"/>
+            </a:xfrm>
+            <a:prstGeom prst="straightConnector1">
+              <a:avLst/>
+            </a:prstGeom>
+            <a:ln w="12700">
+              <a:solidFill>
+                <a:schemeClr val="tx2"/>
+              </a:solidFill>
+              <a:headEnd type="none" w="med" len="med"/>
+              <a:tailEnd type="triangle" w="med" len="med"/>
+            </a:ln>
+          </p:spPr>
+          <p:style>
+            <a:lnRef idx="1">
+              <a:schemeClr val="accent1"/>
+            </a:lnRef>
+            <a:fillRef idx="0">
+              <a:schemeClr val="accent1"/>
+            </a:fillRef>
+            <a:effectRef idx="0">
+              <a:schemeClr val="accent1"/>
+            </a:effectRef>
+            <a:fontRef idx="minor">
+              <a:schemeClr val="tx1"/>
+            </a:fontRef>
+          </p:style>
+        </p:cxnSp>
+      </p:grpSp>
+      <p:sp>
+        <p:nvSpPr>
+          <p:cNvPr id="28" name="Slide Number Placeholder 27"/>
+          <p:cNvSpPr>
+            <a:spLocks noGrp="1"/>
+          </p:cNvSpPr>
+          <p:nvPr>
+            <p:ph type="sldNum" sz="quarter" idx="17"/>
+          </p:nvPr>
+        </p:nvSpPr>
+        <p:spPr bwMode="gray">
+          <a:xfrm>
+            <a:off x="7416801" y="4623195"/>
+            <a:ext cx="1547813" cy="180580"/>
+          </a:xfrm>
+        </p:spPr>
+        <p:txBody>
+          <a:bodyPr/>
+          <a:lstStyle/>
+          <a:p>
+            <a:r>
+              <a:rPr lang="en-US" dirty="0"/>
+              <a:t>Chart </a:t>
+            </a:r>
+            <a:fld id="{91D913BA-B0D8-4B51-9328-DFAA0B370309}" type="slidenum">
+              <a:rPr lang="en-US" b="1" smtClean="0"/>
+              <a:pPr/>
+              <a:t>10</a:t>
+            </a:fld>
+            <a:endParaRPr lang="en-US" b="1" dirty="0"/>
+          </a:p>
+        </p:txBody>
+      </p:sp>
+      <p:sp>
+        <p:nvSpPr>
+          <p:cNvPr id="2" name="Date Placeholder 1"/>
+          <p:cNvSpPr>
+            <a:spLocks noGrp="1"/>
+          </p:cNvSpPr>
+          <p:nvPr>
+            <p:ph type="dt" sz="half" idx="15"/>
+          </p:nvPr>
+        </p:nvSpPr>
+        <p:spPr>
+          <a:xfrm>
+            <a:off x="7416801" y="4155928"/>
+            <a:ext cx="1547813" cy="467268"/>
+          </a:xfrm>
+        </p:spPr>
+        <p:txBody>
+          <a:bodyPr/>
+          <a:lstStyle/>
+          <a:p>
+            <a:r>
+              <a:rPr lang="en-US" dirty="0"/>
+              <a:t>Speaker, Job Description, Date if needed</a:t>
+            </a:r>
+          </a:p>
+        </p:txBody>
+      </p:sp>
+      <p:sp>
+        <p:nvSpPr>
+          <p:cNvPr id="3" name="Footer Placeholder 2"/>
+          <p:cNvSpPr>
+            <a:spLocks noGrp="1"/>
+          </p:cNvSpPr>
+          <p:nvPr>
+            <p:ph type="ftr" sz="quarter" idx="16"/>
+          </p:nvPr>
+        </p:nvSpPr>
+        <p:spPr>
+          <a:xfrm>
+            <a:off x="7416801" y="3562453"/>
+            <a:ext cx="1547813" cy="521465"/>
+          </a:xfrm>
+        </p:spPr>
+        <p:txBody>
+          <a:bodyPr/>
+          <a:lstStyle/>
+          <a:p>
+            <a:r>
+              <a:rPr lang="en-US"/>
+              <a:t>Presentation Title</a:t>
+            </a:r>
+            <a:endParaRPr lang="en-US" dirty="0"/>
+          </a:p>
+        </p:txBody>
+      </p:sp>
+    </p:spTree>
+    <p:extLst>
+      <p:ext uri="{BB962C8B-B14F-4D97-AF65-F5344CB8AC3E}">
+        <p14:creationId xmlns:p14="http://schemas.microsoft.com/office/powerpoint/2010/main" val="2427557884"/>
+      </p:ext>
+    </p:extLst>
+  </p:cSld>
+  <p:clrMapOvr>
+    <a:masterClrMapping/>
+  </p:clrMapOvr>
+  <p:transition>
+    <p:fade/>
+  </p:transition>
+</p:sld>
+</file>
+
+<file path=ppt/slides/slide11.xml><?xml version="1.0" encoding="utf-8"?>
+<p:sld xmlns:a="http://schemas.openxmlformats.org/drawingml/2006/main" xmlns:r="http://schemas.openxmlformats.org/officeDocument/2006/relationships" xmlns:p="http://schemas.openxmlformats.org/presentationml/2006/main" show="0">
+  <p:cSld>
+    <p:spTree>
+      <p:nvGrpSpPr>
+        <p:cNvPr id="1" name=""/>
+        <p:cNvGrpSpPr/>
+        <p:nvPr/>
+      </p:nvGrpSpPr>
+      <p:grpSpPr>
+        <a:xfrm>
+          <a:off x="0" y="0"/>
+          <a:ext cx="0" cy="0"/>
+          <a:chOff x="0" y="0"/>
+          <a:chExt cx="0" cy="0"/>
+        </a:xfrm>
+      </p:grpSpPr>
+      <p:sp>
+        <p:nvSpPr>
+          <p:cNvPr id="4" name="Title 3"/>
+          <p:cNvSpPr>
+            <a:spLocks noGrp="1"/>
+          </p:cNvSpPr>
+          <p:nvPr>
+            <p:ph type="title"/>
+          </p:nvPr>
+        </p:nvSpPr>
+        <p:spPr bwMode="gray">
+          <a:xfrm>
+            <a:off x="358776" y="108001"/>
+            <a:ext cx="6877051" cy="927588"/>
+          </a:xfrm>
+        </p:spPr>
+        <p:txBody>
+          <a:bodyPr/>
+          <a:lstStyle/>
+          <a:p>
+            <a:r>
               <a:rPr lang="en-US" dirty="0"/>
               <a:t>Explanations</a:t>
             </a:r>
@@ -12522,7 +13089,7 @@
             <a:fld id="{91D913BA-B0D8-4B51-9328-DFAA0B370309}" type="slidenum">
               <a:rPr lang="en-US" b="1" smtClean="0"/>
               <a:pPr/>
-              <a:t>10</a:t>
+              <a:t>11</a:t>
             </a:fld>
             <a:endParaRPr lang="en-US" b="1" dirty="0"/>
           </a:p>
@@ -12662,7 +13229,7 @@
 </p:sld>
 </file>
 
-<file path=ppt/slides/slide11.xml><?xml version="1.0" encoding="utf-8"?>
+<file path=ppt/slides/slide12.xml><?xml version="1.0" encoding="utf-8"?>
 <p:sld xmlns:a="http://schemas.openxmlformats.org/drawingml/2006/main" xmlns:r="http://schemas.openxmlformats.org/officeDocument/2006/relationships" xmlns:p="http://schemas.openxmlformats.org/presentationml/2006/main" show="0">
   <p:cSld>
     <p:spTree>
@@ -13295,7 +13862,7 @@
             <a:fld id="{91D913BA-B0D8-4B51-9328-DFAA0B370309}" type="slidenum">
               <a:rPr lang="en-US" b="1" smtClean="0"/>
               <a:pPr/>
-              <a:t>11</a:t>
+              <a:t>12</a:t>
             </a:fld>
             <a:endParaRPr lang="en-US" b="1" dirty="0"/>
           </a:p>
@@ -13373,7 +13940,7 @@
 </p:sld>
 </file>
 
-<file path=ppt/slides/slide12.xml><?xml version="1.0" encoding="utf-8"?>
+<file path=ppt/slides/slide13.xml><?xml version="1.0" encoding="utf-8"?>
 <p:sld xmlns:a="http://schemas.openxmlformats.org/drawingml/2006/main" xmlns:r="http://schemas.openxmlformats.org/officeDocument/2006/relationships" xmlns:p="http://schemas.openxmlformats.org/presentationml/2006/main" show="0">
   <p:cSld>
     <p:spTree>
@@ -13579,7 +14146,7 @@
             <a:fld id="{91D913BA-B0D8-4B51-9328-DFAA0B370309}" type="slidenum">
               <a:rPr lang="en-US" b="1" smtClean="0"/>
               <a:pPr/>
-              <a:t>12</a:t>
+              <a:t>13</a:t>
             </a:fld>
             <a:endParaRPr lang="en-US" b="1" dirty="0"/>
           </a:p>
@@ -14119,7 +14686,7 @@
           <p:nvPr>
             <p:extLst>
               <p:ext uri="{D42A27DB-BD31-4B8C-83A1-F6EECF244321}">
-                <p14:modId xmlns:p14="http://schemas.microsoft.com/office/powerpoint/2010/main" val="3228684955"/>
+                <p14:modId xmlns:p14="http://schemas.microsoft.com/office/powerpoint/2010/main" val="4291867276"/>
               </p:ext>
             </p:extLst>
           </p:nvPr>
@@ -14442,12 +15009,12 @@
                     <a:lstStyle/>
                     <a:p>
                       <a:r>
-                        <a:rPr lang="de-DE" dirty="0">
+                        <a:rPr lang="de-DE" sz="1600" dirty="0">
                           <a:latin typeface="Perpetua" panose="02020502060401020303" pitchFamily="18" charset="0"/>
                         </a:rPr>
-                        <a:t>Comp. Failures</a:t>
+                        <a:t>Component Failures</a:t>
                       </a:r>
-                      <a:endParaRPr lang="en-GB" dirty="0">
+                      <a:endParaRPr lang="en-GB" sz="1600" dirty="0">
                         <a:latin typeface="Perpetua" panose="02020502060401020303" pitchFamily="18" charset="0"/>
                       </a:endParaRPr>
                     </a:p>
@@ -14761,7 +15328,13 @@
       </p:grpSpPr>
       <p:sp>
         <p:nvSpPr>
-          <p:cNvPr id="8" name="Textplatzhalter 7"/>
+          <p:cNvPr id="2" name="Text Placeholder 1">
+            <a:extLst>
+              <a:ext uri="{FF2B5EF4-FFF2-40B4-BE49-F238E27FC236}">
+                <a16:creationId xmlns:a16="http://schemas.microsoft.com/office/drawing/2014/main" id="{4C3248BF-AF07-408C-AB2A-E3BB907B252C}"/>
+              </a:ext>
+            </a:extLst>
+          </p:cNvPr>
           <p:cNvSpPr>
             <a:spLocks noGrp="1"/>
           </p:cNvSpPr>
@@ -14774,42 +15347,53 @@
           <a:bodyPr/>
           <a:lstStyle/>
           <a:p>
-            <a:endParaRPr lang="de-DE" dirty="0"/>
-          </a:p>
-        </p:txBody>
-      </p:sp>
-      <p:sp>
-        <p:nvSpPr>
-          <p:cNvPr id="7" name="Titel 6"/>
+            <a:endParaRPr lang="en-GB"/>
+          </a:p>
+        </p:txBody>
+      </p:sp>
+      <p:sp>
+        <p:nvSpPr>
+          <p:cNvPr id="3" name="Date Placeholder 2">
+            <a:extLst>
+              <a:ext uri="{FF2B5EF4-FFF2-40B4-BE49-F238E27FC236}">
+                <a16:creationId xmlns:a16="http://schemas.microsoft.com/office/drawing/2014/main" id="{6BE20898-5805-4CB5-AF73-F3AC58E2F270}"/>
+              </a:ext>
+            </a:extLst>
+          </p:cNvPr>
           <p:cNvSpPr>
             <a:spLocks noGrp="1"/>
           </p:cNvSpPr>
           <p:nvPr>
-            <p:ph type="title"/>
-          </p:nvPr>
-        </p:nvSpPr>
-        <p:spPr>
-          <a:xfrm>
-            <a:off x="358776" y="108001"/>
-            <a:ext cx="6877051" cy="927588"/>
-          </a:xfrm>
-        </p:spPr>
+            <p:ph type="dt" sz="half" idx="14"/>
+          </p:nvPr>
+        </p:nvSpPr>
+        <p:spPr/>
         <p:txBody>
           <a:bodyPr/>
           <a:lstStyle/>
           <a:p>
-            <a:endParaRPr lang="de-DE" dirty="0"/>
-          </a:p>
-        </p:txBody>
-      </p:sp>
-      <p:sp>
-        <p:nvSpPr>
-          <p:cNvPr id="4" name="Datumsplatzhalter 3"/>
+            <a:r>
+              <a:rPr lang="en-US"/>
+              <a:t>Speaker, Job Description, Date if needed</a:t>
+            </a:r>
+            <a:endParaRPr lang="en-US" dirty="0"/>
+          </a:p>
+        </p:txBody>
+      </p:sp>
+      <p:sp>
+        <p:nvSpPr>
+          <p:cNvPr id="4" name="Footer Placeholder 3">
+            <a:extLst>
+              <a:ext uri="{FF2B5EF4-FFF2-40B4-BE49-F238E27FC236}">
+                <a16:creationId xmlns:a16="http://schemas.microsoft.com/office/drawing/2014/main" id="{0EF4E08F-A181-461F-93F6-CBCF4815EE07}"/>
+              </a:ext>
+            </a:extLst>
+          </p:cNvPr>
           <p:cNvSpPr>
             <a:spLocks noGrp="1"/>
           </p:cNvSpPr>
           <p:nvPr>
-            <p:ph type="dt" sz="half" idx="14"/>
+            <p:ph type="ftr" sz="quarter" idx="15"/>
           </p:nvPr>
         </p:nvSpPr>
         <p:spPr/>
@@ -14819,7 +15403,7 @@
           <a:p>
             <a:r>
               <a:rPr lang="en-US"/>
-              <a:t>Speaker, Job Description, Date if needed</a:t>
+              <a:t>Presentation Title</a:t>
             </a:r>
             <a:endParaRPr lang="en-US" dirty="0"/>
           </a:p>
@@ -14827,30 +15411,13 @@
       </p:sp>
       <p:sp>
         <p:nvSpPr>
-          <p:cNvPr id="5" name="Fußzeilenplatzhalter 4"/>
-          <p:cNvSpPr>
-            <a:spLocks noGrp="1"/>
-          </p:cNvSpPr>
-          <p:nvPr>
-            <p:ph type="ftr" sz="quarter" idx="15"/>
-          </p:nvPr>
-        </p:nvSpPr>
-        <p:spPr/>
-        <p:txBody>
-          <a:bodyPr/>
-          <a:lstStyle/>
-          <a:p>
-            <a:r>
-              <a:rPr lang="en-US"/>
-              <a:t>Presentation Title</a:t>
-            </a:r>
-            <a:endParaRPr lang="en-US" dirty="0"/>
-          </a:p>
-        </p:txBody>
-      </p:sp>
-      <p:sp>
-        <p:nvSpPr>
-          <p:cNvPr id="6" name="Foliennummernplatzhalter 5"/>
+          <p:cNvPr id="5" name="Slide Number Placeholder 4">
+            <a:extLst>
+              <a:ext uri="{FF2B5EF4-FFF2-40B4-BE49-F238E27FC236}">
+                <a16:creationId xmlns:a16="http://schemas.microsoft.com/office/drawing/2014/main" id="{3BA6DEC6-072E-4C4D-8BFC-37FD3E017AAF}"/>
+              </a:ext>
+            </a:extLst>
+          </p:cNvPr>
           <p:cNvSpPr>
             <a:spLocks noGrp="1"/>
           </p:cNvSpPr>
@@ -14876,10 +15443,46 @@
           </a:p>
         </p:txBody>
       </p:sp>
+      <p:sp>
+        <p:nvSpPr>
+          <p:cNvPr id="6" name="Title 5">
+            <a:extLst>
+              <a:ext uri="{FF2B5EF4-FFF2-40B4-BE49-F238E27FC236}">
+                <a16:creationId xmlns:a16="http://schemas.microsoft.com/office/drawing/2014/main" id="{C5F8674D-AF02-4D21-A1B6-BB3D2C5F554D}"/>
+              </a:ext>
+            </a:extLst>
+          </p:cNvPr>
+          <p:cNvSpPr>
+            <a:spLocks noGrp="1"/>
+          </p:cNvSpPr>
+          <p:nvPr>
+            <p:ph type="title"/>
+          </p:nvPr>
+        </p:nvSpPr>
+        <p:spPr/>
+        <p:txBody>
+          <a:bodyPr/>
+          <a:lstStyle/>
+          <a:p>
+            <a:r>
+              <a:rPr lang="de-DE" dirty="0"/>
+              <a:t>Past-Learned Action Failing Probabilities –</a:t>
+            </a:r>
+            <a:br>
+              <a:rPr lang="de-DE" dirty="0"/>
+            </a:br>
+            <a:r>
+              <a:rPr lang="de-DE" dirty="0"/>
+              <a:t>Transition Matrix</a:t>
+            </a:r>
+            <a:endParaRPr lang="en-GB" dirty="0"/>
+          </a:p>
+        </p:txBody>
+      </p:sp>
     </p:spTree>
     <p:extLst>
       <p:ext uri="{BB962C8B-B14F-4D97-AF65-F5344CB8AC3E}">
-        <p14:creationId xmlns:p14="http://schemas.microsoft.com/office/powerpoint/2010/main" val="3110667540"/>
+        <p14:creationId xmlns:p14="http://schemas.microsoft.com/office/powerpoint/2010/main" val="3893831194"/>
       </p:ext>
     </p:extLst>
   </p:cSld>
@@ -14911,24 +15514,12 @@
       </p:grpSpPr>
       <p:sp>
         <p:nvSpPr>
-          <p:cNvPr id="6" name="Bildplatzhalter 5"/>
+          <p:cNvPr id="8" name="Textplatzhalter 7"/>
           <p:cNvSpPr>
             <a:spLocks noGrp="1"/>
           </p:cNvSpPr>
           <p:nvPr>
-            <p:ph type="pic" sz="quarter" idx="10"/>
-          </p:nvPr>
-        </p:nvSpPr>
-        <p:spPr/>
-      </p:sp>
-      <p:sp>
-        <p:nvSpPr>
-          <p:cNvPr id="7" name="Textplatzhalter 6"/>
-          <p:cNvSpPr>
-            <a:spLocks noGrp="1"/>
-          </p:cNvSpPr>
-          <p:nvPr>
-            <p:ph type="body" sz="quarter" idx="11"/>
+            <p:ph type="body" sz="quarter" idx="13"/>
           </p:nvPr>
         </p:nvSpPr>
         <p:spPr/>
@@ -14936,80 +15527,103 @@
           <a:bodyPr/>
           <a:lstStyle/>
           <a:p>
+            <a:r>
+              <a:rPr lang="de-DE" dirty="0"/>
+              <a:t>RQ1</a:t>
+            </a:r>
+          </a:p>
+          <a:p>
+            <a:pPr lvl="1"/>
+            <a:r>
+              <a:rPr lang="de-DE" dirty="0"/>
+              <a:t>Are the two approaches compatible?</a:t>
+            </a:r>
+          </a:p>
+          <a:p>
+            <a:r>
+              <a:rPr lang="de-DE" dirty="0"/>
+              <a:t>RQ2</a:t>
+            </a:r>
+          </a:p>
+          <a:p>
+            <a:pPr lvl="1"/>
+            <a:r>
+              <a:rPr lang="de-DE" dirty="0"/>
+              <a:t>Is the decision-making </a:t>
+            </a:r>
+            <a:r>
+              <a:rPr lang="de-DE" i="1" dirty="0"/>
+              <a:t>significantly</a:t>
+            </a:r>
+            <a:r>
+              <a:rPr lang="de-DE" dirty="0"/>
+              <a:t> worse when using incorrect reward penalties?</a:t>
+            </a:r>
+          </a:p>
+          <a:p>
+            <a:r>
+              <a:rPr lang="de-DE" dirty="0"/>
+              <a:t>RQ3</a:t>
+            </a:r>
+          </a:p>
+          <a:p>
+            <a:pPr lvl="1"/>
+            <a:r>
+              <a:rPr lang="de-DE" dirty="0"/>
+              <a:t>Assuming that the failing probabilities were correct: What is the theoretical lost utility?</a:t>
+            </a:r>
+          </a:p>
+          <a:p>
+            <a:pPr marL="0" indent="0">
+              <a:buNone/>
+            </a:pPr>
             <a:endParaRPr lang="de-DE" dirty="0"/>
           </a:p>
-        </p:txBody>
-      </p:sp>
-      <p:sp>
-        <p:nvSpPr>
-          <p:cNvPr id="21" name="Title 20"/>
+          <a:p>
+            <a:pPr lvl="1"/>
+            <a:endParaRPr lang="de-DE" dirty="0"/>
+          </a:p>
+          <a:p>
+            <a:pPr lvl="1"/>
+            <a:endParaRPr lang="de-DE" dirty="0"/>
+          </a:p>
+        </p:txBody>
+      </p:sp>
+      <p:sp>
+        <p:nvSpPr>
+          <p:cNvPr id="7" name="Titel 6"/>
           <p:cNvSpPr>
             <a:spLocks noGrp="1"/>
           </p:cNvSpPr>
           <p:nvPr>
-            <p:ph type="ctrTitle"/>
-          </p:nvPr>
-        </p:nvSpPr>
-        <p:spPr/>
+            <p:ph type="title"/>
+          </p:nvPr>
+        </p:nvSpPr>
+        <p:spPr>
+          <a:xfrm>
+            <a:off x="358776" y="108001"/>
+            <a:ext cx="6877051" cy="927588"/>
+          </a:xfrm>
+        </p:spPr>
         <p:txBody>
           <a:bodyPr/>
           <a:lstStyle/>
           <a:p>
             <a:r>
-              <a:rPr lang="de-DE" dirty="0" err="1"/>
-              <a:t>Thank</a:t>
-            </a:r>
-            <a:r>
               <a:rPr lang="de-DE" dirty="0"/>
-              <a:t> </a:t>
-            </a:r>
-            <a:r>
-              <a:rPr lang="de-DE" dirty="0" err="1"/>
-              <a:t>you</a:t>
-            </a:r>
-            <a:r>
-              <a:rPr lang="de-DE" dirty="0"/>
-              <a:t> </a:t>
-            </a:r>
-            <a:br>
-              <a:rPr lang="de-DE" dirty="0"/>
-            </a:br>
-            <a:r>
-              <a:rPr lang="de-DE" dirty="0" err="1"/>
-              <a:t>for</a:t>
-            </a:r>
-            <a:r>
-              <a:rPr lang="de-DE" dirty="0"/>
-              <a:t> </a:t>
-            </a:r>
-            <a:r>
-              <a:rPr lang="de-DE" dirty="0" err="1"/>
-              <a:t>your</a:t>
-            </a:r>
-            <a:r>
-              <a:rPr lang="de-DE" dirty="0"/>
-              <a:t> </a:t>
-            </a:r>
-            <a:r>
-              <a:rPr lang="de-DE" dirty="0" err="1"/>
-              <a:t>attention</a:t>
-            </a:r>
-            <a:r>
-              <a:rPr lang="de-DE" dirty="0"/>
-              <a:t>!</a:t>
-            </a:r>
-            <a:endParaRPr lang="en-US" dirty="0"/>
-          </a:p>
-        </p:txBody>
-      </p:sp>
-      <p:sp>
-        <p:nvSpPr>
-          <p:cNvPr id="22" name="Subtitle 21"/>
+              <a:t>Research Questions</a:t>
+            </a:r>
+          </a:p>
+        </p:txBody>
+      </p:sp>
+      <p:sp>
+        <p:nvSpPr>
+          <p:cNvPr id="4" name="Datumsplatzhalter 3"/>
           <p:cNvSpPr>
             <a:spLocks noGrp="1"/>
           </p:cNvSpPr>
           <p:nvPr>
-            <p:ph type="subTitle" idx="1"/>
+            <p:ph type="dt" sz="half" idx="14"/>
           </p:nvPr>
         </p:nvSpPr>
         <p:spPr/>
@@ -15019,28 +15633,67 @@
           <a:p>
             <a:r>
               <a:rPr lang="en-US"/>
-              <a:t>Speaker</a:t>
-            </a:r>
-          </a:p>
+              <a:t>Speaker, Job Description, Date if needed</a:t>
+            </a:r>
+            <a:endParaRPr lang="en-US" dirty="0"/>
+          </a:p>
+        </p:txBody>
+      </p:sp>
+      <p:sp>
+        <p:nvSpPr>
+          <p:cNvPr id="5" name="Fußzeilenplatzhalter 4"/>
+          <p:cNvSpPr>
+            <a:spLocks noGrp="1"/>
+          </p:cNvSpPr>
+          <p:nvPr>
+            <p:ph type="ftr" sz="quarter" idx="15"/>
+          </p:nvPr>
+        </p:nvSpPr>
+        <p:spPr/>
+        <p:txBody>
+          <a:bodyPr/>
+          <a:lstStyle/>
           <a:p>
             <a:r>
               <a:rPr lang="en-US"/>
-              <a:t>Job Description</a:t>
-            </a:r>
-          </a:p>
+              <a:t>Presentation Title</a:t>
+            </a:r>
+            <a:endParaRPr lang="en-US" dirty="0"/>
+          </a:p>
+        </p:txBody>
+      </p:sp>
+      <p:sp>
+        <p:nvSpPr>
+          <p:cNvPr id="6" name="Foliennummernplatzhalter 5"/>
+          <p:cNvSpPr>
+            <a:spLocks noGrp="1"/>
+          </p:cNvSpPr>
+          <p:nvPr>
+            <p:ph type="sldNum" sz="quarter" idx="16"/>
+          </p:nvPr>
+        </p:nvSpPr>
+        <p:spPr/>
+        <p:txBody>
+          <a:bodyPr/>
+          <a:lstStyle/>
           <a:p>
             <a:r>
               <a:rPr lang="en-US"/>
-              <a:t>Institute</a:t>
-            </a:r>
-            <a:endParaRPr lang="en-US" dirty="0"/>
+              <a:t>Chart </a:t>
+            </a:r>
+            <a:fld id="{91D913BA-B0D8-4B51-9328-DFAA0B370309}" type="slidenum">
+              <a:rPr lang="en-US" b="1" smtClean="0"/>
+              <a:pPr/>
+              <a:t>5</a:t>
+            </a:fld>
+            <a:endParaRPr lang="en-US" b="1" dirty="0"/>
           </a:p>
         </p:txBody>
       </p:sp>
     </p:spTree>
     <p:extLst>
       <p:ext uri="{BB962C8B-B14F-4D97-AF65-F5344CB8AC3E}">
-        <p14:creationId xmlns:p14="http://schemas.microsoft.com/office/powerpoint/2010/main" val="807357343"/>
+        <p14:creationId xmlns:p14="http://schemas.microsoft.com/office/powerpoint/2010/main" val="3110667540"/>
       </p:ext>
     </p:extLst>
   </p:cSld>
@@ -15054,7 +15707,7 @@
 </file>
 
 <file path=ppt/slides/slide6.xml><?xml version="1.0" encoding="utf-8"?>
-<p:sld xmlns:a="http://schemas.openxmlformats.org/drawingml/2006/main" xmlns:r="http://schemas.openxmlformats.org/officeDocument/2006/relationships" xmlns:p="http://schemas.openxmlformats.org/presentationml/2006/main" show="0">
+<p:sld xmlns:a="http://schemas.openxmlformats.org/drawingml/2006/main" xmlns:r="http://schemas.openxmlformats.org/officeDocument/2006/relationships" xmlns:p="http://schemas.openxmlformats.org/presentationml/2006/main">
   <p:cSld>
     <p:spTree>
       <p:nvGrpSpPr>
@@ -15070,34 +15723,21 @@
           <a:chExt cx="0" cy="0"/>
         </a:xfrm>
       </p:grpSpPr>
-      <p:pic>
-        <p:nvPicPr>
-          <p:cNvPr id="8" name="Picture 2" descr="P:\Projekte\Hasso Plattner Institut\TEMPLATE_HPI_01_EXP\ppt\media\image2.jpg"/>
-          <p:cNvPicPr>
-            <a:picLocks noGrp="1" noChangeAspect="1" noChangeArrowheads="1"/>
-          </p:cNvPicPr>
+      <p:sp>
+        <p:nvSpPr>
+          <p:cNvPr id="6" name="Bildplatzhalter 5"/>
+          <p:cNvSpPr>
+            <a:spLocks noGrp="1"/>
+          </p:cNvSpPr>
           <p:nvPr>
             <p:ph type="pic" sz="quarter" idx="10"/>
           </p:nvPr>
-        </p:nvPicPr>
-        <p:blipFill>
-          <a:blip r:embed="rId3">
-            <a:extLst>
-              <a:ext uri="{28A0092B-C50C-407E-A947-70E740481C1C}">
-                <a14:useLocalDpi xmlns:a14="http://schemas.microsoft.com/office/drawing/2010/main" val="0"/>
-              </a:ext>
-            </a:extLst>
-          </a:blip>
-          <a:srcRect t="80" b="80"/>
-          <a:stretch>
-            <a:fillRect/>
-          </a:stretch>
-        </p:blipFill>
+        </p:nvSpPr>
         <p:spPr/>
-      </p:pic>
-      <p:sp>
-        <p:nvSpPr>
-          <p:cNvPr id="5" name="Textplatzhalter 4"/>
+      </p:sp>
+      <p:sp>
+        <p:nvSpPr>
+          <p:cNvPr id="7" name="Textplatzhalter 6"/>
           <p:cNvSpPr>
             <a:spLocks noGrp="1"/>
           </p:cNvSpPr>
@@ -15110,13 +15750,13 @@
           <a:bodyPr/>
           <a:lstStyle/>
           <a:p>
-            <a:endParaRPr lang="de-DE"/>
-          </a:p>
-        </p:txBody>
-      </p:sp>
-      <p:sp>
-        <p:nvSpPr>
-          <p:cNvPr id="3" name="Titel 2"/>
+            <a:endParaRPr lang="de-DE" dirty="0"/>
+          </a:p>
+        </p:txBody>
+      </p:sp>
+      <p:sp>
+        <p:nvSpPr>
+          <p:cNvPr id="21" name="Title 20"/>
           <p:cNvSpPr>
             <a:spLocks noGrp="1"/>
           </p:cNvSpPr>
@@ -15129,13 +15769,56 @@
           <a:bodyPr/>
           <a:lstStyle/>
           <a:p>
-            <a:endParaRPr lang="de-DE" dirty="0"/>
-          </a:p>
-        </p:txBody>
-      </p:sp>
-      <p:sp>
-        <p:nvSpPr>
-          <p:cNvPr id="4" name="Untertitel 3"/>
+            <a:r>
+              <a:rPr lang="de-DE" dirty="0" err="1"/>
+              <a:t>Thank</a:t>
+            </a:r>
+            <a:r>
+              <a:rPr lang="de-DE" dirty="0"/>
+              <a:t> </a:t>
+            </a:r>
+            <a:r>
+              <a:rPr lang="de-DE" dirty="0" err="1"/>
+              <a:t>you</a:t>
+            </a:r>
+            <a:r>
+              <a:rPr lang="de-DE" dirty="0"/>
+              <a:t> </a:t>
+            </a:r>
+            <a:br>
+              <a:rPr lang="de-DE" dirty="0"/>
+            </a:br>
+            <a:r>
+              <a:rPr lang="de-DE" dirty="0" err="1"/>
+              <a:t>for</a:t>
+            </a:r>
+            <a:r>
+              <a:rPr lang="de-DE" dirty="0"/>
+              <a:t> </a:t>
+            </a:r>
+            <a:r>
+              <a:rPr lang="de-DE" dirty="0" err="1"/>
+              <a:t>your</a:t>
+            </a:r>
+            <a:r>
+              <a:rPr lang="de-DE" dirty="0"/>
+              <a:t> </a:t>
+            </a:r>
+            <a:r>
+              <a:rPr lang="de-DE" dirty="0" err="1"/>
+              <a:t>attention</a:t>
+            </a:r>
+            <a:r>
+              <a:rPr lang="de-DE" dirty="0"/>
+              <a:t>!</a:t>
+            </a:r>
+            <a:endParaRPr lang="en-US" dirty="0"/>
+          </a:p>
+        </p:txBody>
+      </p:sp>
+      <p:sp>
+        <p:nvSpPr>
+          <p:cNvPr id="22" name="Subtitle 21"/>
           <p:cNvSpPr>
             <a:spLocks noGrp="1"/>
           </p:cNvSpPr>
@@ -15148,14 +15831,30 @@
           <a:bodyPr/>
           <a:lstStyle/>
           <a:p>
-            <a:endParaRPr lang="de-DE"/>
+            <a:r>
+              <a:rPr lang="en-US"/>
+              <a:t>Speaker</a:t>
+            </a:r>
+          </a:p>
+          <a:p>
+            <a:r>
+              <a:rPr lang="en-US"/>
+              <a:t>Job Description</a:t>
+            </a:r>
+          </a:p>
+          <a:p>
+            <a:r>
+              <a:rPr lang="en-US"/>
+              <a:t>Institute</a:t>
+            </a:r>
+            <a:endParaRPr lang="en-US" dirty="0"/>
           </a:p>
         </p:txBody>
       </p:sp>
     </p:spTree>
     <p:extLst>
       <p:ext uri="{BB962C8B-B14F-4D97-AF65-F5344CB8AC3E}">
-        <p14:creationId xmlns:p14="http://schemas.microsoft.com/office/powerpoint/2010/main" val="1734704440"/>
+        <p14:creationId xmlns:p14="http://schemas.microsoft.com/office/powerpoint/2010/main" val="807357343"/>
       </p:ext>
     </p:extLst>
   </p:cSld>
@@ -15187,6 +15886,121 @@
       </p:grpSpPr>
       <p:pic>
         <p:nvPicPr>
+          <p:cNvPr id="8" name="Picture 2" descr="P:\Projekte\Hasso Plattner Institut\TEMPLATE_HPI_01_EXP\ppt\media\image2.jpg"/>
+          <p:cNvPicPr>
+            <a:picLocks noGrp="1" noChangeAspect="1" noChangeArrowheads="1"/>
+          </p:cNvPicPr>
+          <p:nvPr>
+            <p:ph type="pic" sz="quarter" idx="10"/>
+          </p:nvPr>
+        </p:nvPicPr>
+        <p:blipFill>
+          <a:blip r:embed="rId3">
+            <a:extLst>
+              <a:ext uri="{28A0092B-C50C-407E-A947-70E740481C1C}">
+                <a14:useLocalDpi xmlns:a14="http://schemas.microsoft.com/office/drawing/2010/main" val="0"/>
+              </a:ext>
+            </a:extLst>
+          </a:blip>
+          <a:srcRect t="80" b="80"/>
+          <a:stretch>
+            <a:fillRect/>
+          </a:stretch>
+        </p:blipFill>
+        <p:spPr/>
+      </p:pic>
+      <p:sp>
+        <p:nvSpPr>
+          <p:cNvPr id="5" name="Textplatzhalter 4"/>
+          <p:cNvSpPr>
+            <a:spLocks noGrp="1"/>
+          </p:cNvSpPr>
+          <p:nvPr>
+            <p:ph type="body" sz="quarter" idx="11"/>
+          </p:nvPr>
+        </p:nvSpPr>
+        <p:spPr/>
+        <p:txBody>
+          <a:bodyPr/>
+          <a:lstStyle/>
+          <a:p>
+            <a:endParaRPr lang="de-DE"/>
+          </a:p>
+        </p:txBody>
+      </p:sp>
+      <p:sp>
+        <p:nvSpPr>
+          <p:cNvPr id="3" name="Titel 2"/>
+          <p:cNvSpPr>
+            <a:spLocks noGrp="1"/>
+          </p:cNvSpPr>
+          <p:nvPr>
+            <p:ph type="ctrTitle"/>
+          </p:nvPr>
+        </p:nvSpPr>
+        <p:spPr/>
+        <p:txBody>
+          <a:bodyPr/>
+          <a:lstStyle/>
+          <a:p>
+            <a:endParaRPr lang="de-DE" dirty="0"/>
+          </a:p>
+        </p:txBody>
+      </p:sp>
+      <p:sp>
+        <p:nvSpPr>
+          <p:cNvPr id="4" name="Untertitel 3"/>
+          <p:cNvSpPr>
+            <a:spLocks noGrp="1"/>
+          </p:cNvSpPr>
+          <p:nvPr>
+            <p:ph type="subTitle" idx="1"/>
+          </p:nvPr>
+        </p:nvSpPr>
+        <p:spPr/>
+        <p:txBody>
+          <a:bodyPr/>
+          <a:lstStyle/>
+          <a:p>
+            <a:endParaRPr lang="de-DE"/>
+          </a:p>
+        </p:txBody>
+      </p:sp>
+    </p:spTree>
+    <p:extLst>
+      <p:ext uri="{BB962C8B-B14F-4D97-AF65-F5344CB8AC3E}">
+        <p14:creationId xmlns:p14="http://schemas.microsoft.com/office/powerpoint/2010/main" val="1734704440"/>
+      </p:ext>
+    </p:extLst>
+  </p:cSld>
+  <p:clrMapOvr>
+    <a:masterClrMapping/>
+  </p:clrMapOvr>
+  <p:transition>
+    <p:fade/>
+  </p:transition>
+</p:sld>
+</file>
+
+<file path=ppt/slides/slide8.xml><?xml version="1.0" encoding="utf-8"?>
+<p:sld xmlns:a="http://schemas.openxmlformats.org/drawingml/2006/main" xmlns:r="http://schemas.openxmlformats.org/officeDocument/2006/relationships" xmlns:p="http://schemas.openxmlformats.org/presentationml/2006/main" show="0">
+  <p:cSld>
+    <p:spTree>
+      <p:nvGrpSpPr>
+        <p:cNvPr id="1" name=""/>
+        <p:cNvGrpSpPr/>
+        <p:nvPr/>
+      </p:nvGrpSpPr>
+      <p:grpSpPr>
+        <a:xfrm>
+          <a:off x="0" y="0"/>
+          <a:ext cx="0" cy="0"/>
+          <a:chOff x="0" y="0"/>
+          <a:chExt cx="0" cy="0"/>
+        </a:xfrm>
+      </p:grpSpPr>
+      <p:pic>
+        <p:nvPicPr>
           <p:cNvPr id="7" name="Picture 2" descr="P:\Projekte\Hasso Plattner Institut\TEMPLATE_HPI_01_EXP\ppt\media\image3.jpg"/>
           <p:cNvPicPr>
             <a:picLocks noGrp="1" noChangeAspect="1" noChangeArrowheads="1"/>
@@ -15283,7 +16097,7 @@
 </p:sld>
 </file>
 
-<file path=ppt/slides/slide8.xml><?xml version="1.0" encoding="utf-8"?>
+<file path=ppt/slides/slide9.xml><?xml version="1.0" encoding="utf-8"?>
 <p:sld xmlns:a="http://schemas.openxmlformats.org/drawingml/2006/main" xmlns:r="http://schemas.openxmlformats.org/officeDocument/2006/relationships" xmlns:p="http://schemas.openxmlformats.org/presentationml/2006/main" show="0">
   <p:cSld>
     <p:spTree>
@@ -15371,572 +16185,6 @@
     <p:extLst>
       <p:ext uri="{BB962C8B-B14F-4D97-AF65-F5344CB8AC3E}">
         <p14:creationId xmlns:p14="http://schemas.microsoft.com/office/powerpoint/2010/main" val="1948139504"/>
-      </p:ext>
-    </p:extLst>
-  </p:cSld>
-  <p:clrMapOvr>
-    <a:masterClrMapping/>
-  </p:clrMapOvr>
-  <p:transition>
-    <p:fade/>
-  </p:transition>
-</p:sld>
-</file>
-
-<file path=ppt/slides/slide9.xml><?xml version="1.0" encoding="utf-8"?>
-<p:sld xmlns:a="http://schemas.openxmlformats.org/drawingml/2006/main" xmlns:r="http://schemas.openxmlformats.org/officeDocument/2006/relationships" xmlns:p="http://schemas.openxmlformats.org/presentationml/2006/main" show="0">
-  <p:cSld>
-    <p:spTree>
-      <p:nvGrpSpPr>
-        <p:cNvPr id="1" name=""/>
-        <p:cNvGrpSpPr/>
-        <p:nvPr/>
-      </p:nvGrpSpPr>
-      <p:grpSpPr>
-        <a:xfrm>
-          <a:off x="0" y="0"/>
-          <a:ext cx="0" cy="0"/>
-          <a:chOff x="0" y="0"/>
-          <a:chExt cx="0" cy="0"/>
-        </a:xfrm>
-      </p:grpSpPr>
-      <p:sp>
-        <p:nvSpPr>
-          <p:cNvPr id="4" name="Title 3"/>
-          <p:cNvSpPr>
-            <a:spLocks noGrp="1"/>
-          </p:cNvSpPr>
-          <p:nvPr>
-            <p:ph type="title"/>
-          </p:nvPr>
-        </p:nvSpPr>
-        <p:spPr bwMode="gray">
-          <a:xfrm>
-            <a:off x="358776" y="108001"/>
-            <a:ext cx="6877051" cy="927588"/>
-          </a:xfrm>
-        </p:spPr>
-        <p:txBody>
-          <a:bodyPr/>
-          <a:lstStyle/>
-          <a:p>
-            <a:r>
-              <a:rPr lang="en-US"/>
-              <a:t>Explanations</a:t>
-            </a:r>
-            <a:br>
-              <a:rPr lang="en-US"/>
-            </a:br>
-            <a:r>
-              <a:rPr lang="en-US"/>
-              <a:t>- Text layers</a:t>
-            </a:r>
-            <a:endParaRPr lang="en-US" dirty="0"/>
-          </a:p>
-        </p:txBody>
-      </p:sp>
-      <p:sp>
-        <p:nvSpPr>
-          <p:cNvPr id="5" name="Text Placeholder 4"/>
-          <p:cNvSpPr>
-            <a:spLocks noGrp="1"/>
-          </p:cNvSpPr>
-          <p:nvPr>
-            <p:ph type="body" sz="quarter" idx="13"/>
-          </p:nvPr>
-        </p:nvSpPr>
-        <p:spPr bwMode="gray"/>
-        <p:txBody>
-          <a:bodyPr/>
-          <a:lstStyle/>
-          <a:p>
-            <a:r>
-              <a:rPr lang="en-US" dirty="0"/>
-              <a:t>First text layer for running text. </a:t>
-            </a:r>
-          </a:p>
-          <a:p>
-            <a:pPr lvl="1"/>
-            <a:r>
-              <a:rPr lang="en-US" dirty="0"/>
-              <a:t>Second level for bullet points</a:t>
-            </a:r>
-          </a:p>
-          <a:p>
-            <a:pPr lvl="2"/>
-            <a:r>
-              <a:rPr lang="en-US" dirty="0"/>
-              <a:t>Third level for bullet points</a:t>
-            </a:r>
-          </a:p>
-          <a:p>
-            <a:pPr lvl="3"/>
-            <a:r>
-              <a:rPr lang="en-US" dirty="0"/>
-              <a:t>Fourth level for bullet points</a:t>
-            </a:r>
-          </a:p>
-          <a:p>
-            <a:pPr lvl="4"/>
-            <a:r>
-              <a:rPr lang="en-US" dirty="0"/>
-              <a:t>Fifth level for numberings</a:t>
-            </a:r>
-          </a:p>
-          <a:p>
-            <a:pPr lvl="5"/>
-            <a:r>
-              <a:rPr lang="en-US" dirty="0"/>
-              <a:t>Sixth level for listings</a:t>
-            </a:r>
-          </a:p>
-          <a:p>
-            <a:pPr lvl="6"/>
-            <a:r>
-              <a:rPr lang="en-US" dirty="0"/>
-              <a:t>Seventh text layer </a:t>
-            </a:r>
-            <a:br>
-              <a:rPr lang="en-US" dirty="0"/>
-            </a:br>
-            <a:r>
-              <a:rPr lang="en-US" dirty="0"/>
-              <a:t>for Core Messages</a:t>
-            </a:r>
-          </a:p>
-          <a:p>
-            <a:pPr lvl="3"/>
-            <a:endParaRPr lang="en-US" dirty="0"/>
-          </a:p>
-          <a:p>
-            <a:pPr lvl="3"/>
-            <a:endParaRPr lang="en-US" dirty="0"/>
-          </a:p>
-          <a:p>
-            <a:endParaRPr lang="en-US" dirty="0"/>
-          </a:p>
-        </p:txBody>
-      </p:sp>
-      <p:sp>
-        <p:nvSpPr>
-          <p:cNvPr id="6" name="Text Placeholder 5"/>
-          <p:cNvSpPr>
-            <a:spLocks noGrp="1"/>
-          </p:cNvSpPr>
-          <p:nvPr>
-            <p:ph type="body" sz="quarter" idx="14"/>
-          </p:nvPr>
-        </p:nvSpPr>
-        <p:spPr bwMode="gray"/>
-        <p:txBody>
-          <a:bodyPr/>
-          <a:lstStyle/>
-          <a:p>
-            <a:r>
-              <a:rPr lang="en-US" dirty="0"/>
-              <a:t>In this template, we pre-formatted different text layers </a:t>
-            </a:r>
-            <a:br>
-              <a:rPr lang="en-US" dirty="0"/>
-            </a:br>
-            <a:r>
-              <a:rPr lang="en-US" dirty="0"/>
-              <a:t>(as you can see on the right side). </a:t>
-            </a:r>
-            <a:br>
-              <a:rPr lang="en-US" dirty="0"/>
-            </a:br>
-            <a:br>
-              <a:rPr lang="en-US" dirty="0"/>
-            </a:br>
-            <a:r>
-              <a:rPr lang="en-US" dirty="0"/>
-              <a:t>You don’t have to generate </a:t>
-            </a:r>
-            <a:br>
-              <a:rPr lang="en-US" dirty="0"/>
-            </a:br>
-            <a:r>
-              <a:rPr lang="en-US" dirty="0"/>
-              <a:t>bullet points manually. </a:t>
-            </a:r>
-            <a:br>
-              <a:rPr lang="en-US" dirty="0"/>
-            </a:br>
-            <a:r>
-              <a:rPr lang="en-US" b="1" dirty="0"/>
-              <a:t>By the way: Please avoid this!</a:t>
-            </a:r>
-          </a:p>
-          <a:p>
-            <a:r>
-              <a:rPr lang="en-US" dirty="0"/>
-              <a:t>To change from one text layer</a:t>
-            </a:r>
-            <a:br>
-              <a:rPr lang="en-US" dirty="0"/>
-            </a:br>
-            <a:r>
-              <a:rPr lang="en-US" dirty="0"/>
-              <a:t>to the next, use the </a:t>
-            </a:r>
-            <a:br>
-              <a:rPr lang="en-US" dirty="0"/>
-            </a:br>
-            <a:r>
-              <a:rPr lang="en-US" dirty="0"/>
-              <a:t>Increase / Decrease List Level buttons:</a:t>
-            </a:r>
-          </a:p>
-          <a:p>
-            <a:endParaRPr lang="en-US" dirty="0"/>
-          </a:p>
-          <a:p>
-            <a:endParaRPr lang="en-US" dirty="0"/>
-          </a:p>
-          <a:p>
-            <a:pPr lvl="3"/>
-            <a:endParaRPr lang="en-US" dirty="0"/>
-          </a:p>
-        </p:txBody>
-      </p:sp>
-      <p:pic>
-        <p:nvPicPr>
-          <p:cNvPr id="8" name="Picture 2"/>
-          <p:cNvPicPr>
-            <a:picLocks noChangeAspect="1" noChangeArrowheads="1"/>
-          </p:cNvPicPr>
-          <p:nvPr/>
-        </p:nvPicPr>
-        <p:blipFill>
-          <a:blip r:embed="rId3" cstate="screen">
-            <a:extLst>
-              <a:ext uri="{28A0092B-C50C-407E-A947-70E740481C1C}">
-                <a14:useLocalDpi xmlns:a14="http://schemas.microsoft.com/office/drawing/2010/main"/>
-              </a:ext>
-            </a:extLst>
-          </a:blip>
-          <a:srcRect/>
-          <a:stretch>
-            <a:fillRect/>
-          </a:stretch>
-        </p:blipFill>
-        <p:spPr bwMode="gray">
-          <a:xfrm>
-            <a:off x="3886201" y="3721986"/>
-            <a:ext cx="3349624" cy="664227"/>
-          </a:xfrm>
-          <a:prstGeom prst="rect">
-            <a:avLst/>
-          </a:prstGeom>
-          <a:noFill/>
-          <a:ln>
-            <a:noFill/>
-          </a:ln>
-          <a:extLst>
-            <a:ext uri="{909E8E84-426E-40DD-AFC4-6F175D3DCCD1}">
-              <a14:hiddenFill xmlns:a14="http://schemas.microsoft.com/office/drawing/2010/main">
-                <a:solidFill>
-                  <a:schemeClr val="accent1"/>
-                </a:solidFill>
-              </a14:hiddenFill>
-            </a:ext>
-            <a:ext uri="{91240B29-F687-4F45-9708-019B960494DF}">
-              <a14:hiddenLine xmlns:a14="http://schemas.microsoft.com/office/drawing/2010/main" w="9525">
-                <a:solidFill>
-                  <a:schemeClr val="tx1"/>
-                </a:solidFill>
-                <a:miter lim="800000"/>
-                <a:headEnd/>
-                <a:tailEnd/>
-              </a14:hiddenLine>
-            </a:ext>
-          </a:extLst>
-        </p:spPr>
-      </p:pic>
-      <p:grpSp>
-        <p:nvGrpSpPr>
-          <p:cNvPr id="13" name="Group 12"/>
-          <p:cNvGrpSpPr/>
-          <p:nvPr/>
-        </p:nvGrpSpPr>
-        <p:grpSpPr bwMode="gray">
-          <a:xfrm>
-            <a:off x="6633315" y="3993610"/>
-            <a:ext cx="566291" cy="808783"/>
-            <a:chOff x="3060700" y="3737426"/>
-            <a:chExt cx="635034" cy="906963"/>
-          </a:xfrm>
-        </p:grpSpPr>
-        <p:sp>
-          <p:nvSpPr>
-            <p:cNvPr id="9" name="Rectangle 8"/>
-            <p:cNvSpPr/>
-            <p:nvPr/>
-          </p:nvSpPr>
-          <p:spPr bwMode="gray">
-            <a:xfrm>
-              <a:off x="3232097" y="3737426"/>
-              <a:ext cx="292241" cy="150005"/>
-            </a:xfrm>
-            <a:prstGeom prst="rect">
-              <a:avLst/>
-            </a:prstGeom>
-            <a:noFill/>
-            <a:ln w="9525">
-              <a:solidFill>
-                <a:schemeClr val="tx2"/>
-              </a:solidFill>
-            </a:ln>
-          </p:spPr>
-          <p:style>
-            <a:lnRef idx="2">
-              <a:schemeClr val="accent1">
-                <a:shade val="50000"/>
-              </a:schemeClr>
-            </a:lnRef>
-            <a:fillRef idx="1">
-              <a:schemeClr val="accent1"/>
-            </a:fillRef>
-            <a:effectRef idx="0">
-              <a:schemeClr val="accent1"/>
-            </a:effectRef>
-            <a:fontRef idx="minor">
-              <a:schemeClr val="lt1"/>
-            </a:fontRef>
-          </p:style>
-          <p:txBody>
-            <a:bodyPr rot="0" spcFirstLastPara="0" vertOverflow="overflow" horzOverflow="overflow" vert="horz" wrap="square" lIns="108000" tIns="72000" rIns="108000" bIns="72000" numCol="1" spcCol="0" rtlCol="0" fromWordArt="0" anchor="ctr" anchorCtr="0" forceAA="0" compatLnSpc="1">
-              <a:prstTxWarp prst="textNoShape">
-                <a:avLst/>
-              </a:prstTxWarp>
-              <a:noAutofit/>
-            </a:bodyPr>
-            <a:lstStyle/>
-            <a:p>
-              <a:pPr algn="ctr"/>
-              <a:endParaRPr lang="en-US" sz="1600" dirty="0" err="1"/>
-            </a:p>
-          </p:txBody>
-        </p:sp>
-        <p:pic>
-          <p:nvPicPr>
-            <p:cNvPr id="10" name="Picture 3"/>
-            <p:cNvPicPr>
-              <a:picLocks noChangeAspect="1" noChangeArrowheads="1"/>
-            </p:cNvPicPr>
-            <p:nvPr/>
-          </p:nvPicPr>
-          <p:blipFill>
-            <a:blip r:embed="rId4">
-              <a:extLst>
-                <a:ext uri="{28A0092B-C50C-407E-A947-70E740481C1C}">
-                  <a14:useLocalDpi xmlns:a14="http://schemas.microsoft.com/office/drawing/2010/main"/>
-                </a:ext>
-              </a:extLst>
-            </a:blip>
-            <a:srcRect/>
-            <a:stretch>
-              <a:fillRect/>
-            </a:stretch>
-          </p:blipFill>
-          <p:spPr bwMode="gray">
-            <a:xfrm>
-              <a:off x="3060700" y="4313641"/>
-              <a:ext cx="635034" cy="330748"/>
-            </a:xfrm>
-            <a:prstGeom prst="rect">
-              <a:avLst/>
-            </a:prstGeom>
-            <a:noFill/>
-            <a:ln w="9525">
-              <a:solidFill>
-                <a:schemeClr val="tx2"/>
-              </a:solidFill>
-              <a:miter lim="800000"/>
-              <a:headEnd/>
-              <a:tailEnd/>
-            </a:ln>
-            <a:extLst>
-              <a:ext uri="{909E8E84-426E-40DD-AFC4-6F175D3DCCD1}">
-                <a14:hiddenFill xmlns:a14="http://schemas.microsoft.com/office/drawing/2010/main">
-                  <a:solidFill>
-                    <a:schemeClr val="accent1"/>
-                  </a:solidFill>
-                </a14:hiddenFill>
-              </a:ext>
-            </a:extLst>
-          </p:spPr>
-        </p:pic>
-        <p:cxnSp>
-          <p:nvCxnSpPr>
-            <p:cNvPr id="11" name="Straight Arrow Connector 10"/>
-            <p:cNvCxnSpPr/>
-            <p:nvPr/>
-          </p:nvCxnSpPr>
-          <p:spPr bwMode="gray">
-            <a:xfrm flipH="1">
-              <a:off x="3060700" y="3887431"/>
-              <a:ext cx="171397" cy="430822"/>
-            </a:xfrm>
-            <a:prstGeom prst="straightConnector1">
-              <a:avLst/>
-            </a:prstGeom>
-            <a:ln w="12700">
-              <a:solidFill>
-                <a:schemeClr val="tx2"/>
-              </a:solidFill>
-              <a:headEnd type="none" w="med" len="med"/>
-              <a:tailEnd type="triangle" w="med" len="med"/>
-            </a:ln>
-          </p:spPr>
-          <p:style>
-            <a:lnRef idx="1">
-              <a:schemeClr val="accent1"/>
-            </a:lnRef>
-            <a:fillRef idx="0">
-              <a:schemeClr val="accent1"/>
-            </a:fillRef>
-            <a:effectRef idx="0">
-              <a:schemeClr val="accent1"/>
-            </a:effectRef>
-            <a:fontRef idx="minor">
-              <a:schemeClr val="tx1"/>
-            </a:fontRef>
-          </p:style>
-        </p:cxnSp>
-        <p:cxnSp>
-          <p:nvCxnSpPr>
-            <p:cNvPr id="12" name="Straight Arrow Connector 11"/>
-            <p:cNvCxnSpPr>
-              <a:stCxn id="9" idx="3"/>
-            </p:cNvCxnSpPr>
-            <p:nvPr/>
-          </p:nvCxnSpPr>
-          <p:spPr bwMode="gray">
-            <a:xfrm>
-              <a:off x="3524338" y="3812429"/>
-              <a:ext cx="171396" cy="505824"/>
-            </a:xfrm>
-            <a:prstGeom prst="straightConnector1">
-              <a:avLst/>
-            </a:prstGeom>
-            <a:ln w="12700">
-              <a:solidFill>
-                <a:schemeClr val="tx2"/>
-              </a:solidFill>
-              <a:headEnd type="none" w="med" len="med"/>
-              <a:tailEnd type="triangle" w="med" len="med"/>
-            </a:ln>
-          </p:spPr>
-          <p:style>
-            <a:lnRef idx="1">
-              <a:schemeClr val="accent1"/>
-            </a:lnRef>
-            <a:fillRef idx="0">
-              <a:schemeClr val="accent1"/>
-            </a:fillRef>
-            <a:effectRef idx="0">
-              <a:schemeClr val="accent1"/>
-            </a:effectRef>
-            <a:fontRef idx="minor">
-              <a:schemeClr val="tx1"/>
-            </a:fontRef>
-          </p:style>
-        </p:cxnSp>
-      </p:grpSp>
-      <p:sp>
-        <p:nvSpPr>
-          <p:cNvPr id="28" name="Slide Number Placeholder 27"/>
-          <p:cNvSpPr>
-            <a:spLocks noGrp="1"/>
-          </p:cNvSpPr>
-          <p:nvPr>
-            <p:ph type="sldNum" sz="quarter" idx="17"/>
-          </p:nvPr>
-        </p:nvSpPr>
-        <p:spPr bwMode="gray">
-          <a:xfrm>
-            <a:off x="7416801" y="4623195"/>
-            <a:ext cx="1547813" cy="180580"/>
-          </a:xfrm>
-        </p:spPr>
-        <p:txBody>
-          <a:bodyPr/>
-          <a:lstStyle/>
-          <a:p>
-            <a:r>
-              <a:rPr lang="en-US" dirty="0"/>
-              <a:t>Chart </a:t>
-            </a:r>
-            <a:fld id="{91D913BA-B0D8-4B51-9328-DFAA0B370309}" type="slidenum">
-              <a:rPr lang="en-US" b="1" smtClean="0"/>
-              <a:pPr/>
-              <a:t>9</a:t>
-            </a:fld>
-            <a:endParaRPr lang="en-US" b="1" dirty="0"/>
-          </a:p>
-        </p:txBody>
-      </p:sp>
-      <p:sp>
-        <p:nvSpPr>
-          <p:cNvPr id="2" name="Date Placeholder 1"/>
-          <p:cNvSpPr>
-            <a:spLocks noGrp="1"/>
-          </p:cNvSpPr>
-          <p:nvPr>
-            <p:ph type="dt" sz="half" idx="15"/>
-          </p:nvPr>
-        </p:nvSpPr>
-        <p:spPr>
-          <a:xfrm>
-            <a:off x="7416801" y="4155928"/>
-            <a:ext cx="1547813" cy="467268"/>
-          </a:xfrm>
-        </p:spPr>
-        <p:txBody>
-          <a:bodyPr/>
-          <a:lstStyle/>
-          <a:p>
-            <a:r>
-              <a:rPr lang="en-US" dirty="0"/>
-              <a:t>Speaker, Job Description, Date if needed</a:t>
-            </a:r>
-          </a:p>
-        </p:txBody>
-      </p:sp>
-      <p:sp>
-        <p:nvSpPr>
-          <p:cNvPr id="3" name="Footer Placeholder 2"/>
-          <p:cNvSpPr>
-            <a:spLocks noGrp="1"/>
-          </p:cNvSpPr>
-          <p:nvPr>
-            <p:ph type="ftr" sz="quarter" idx="16"/>
-          </p:nvPr>
-        </p:nvSpPr>
-        <p:spPr>
-          <a:xfrm>
-            <a:off x="7416801" y="3562453"/>
-            <a:ext cx="1547813" cy="521465"/>
-          </a:xfrm>
-        </p:spPr>
-        <p:txBody>
-          <a:bodyPr/>
-          <a:lstStyle/>
-          <a:p>
-            <a:r>
-              <a:rPr lang="en-US"/>
-              <a:t>Presentation Title</a:t>
-            </a:r>
-            <a:endParaRPr lang="en-US" dirty="0"/>
-          </a:p>
-        </p:txBody>
-      </p:sp>
-    </p:spTree>
-    <p:extLst>
-      <p:ext uri="{BB962C8B-B14F-4D97-AF65-F5344CB8AC3E}">
-        <p14:creationId xmlns:p14="http://schemas.microsoft.com/office/powerpoint/2010/main" val="2427557884"/>
       </p:ext>
     </p:extLst>
   </p:cSld>

</xml_diff>

<commit_message>
add sequence diagram to discussion
</commit_message>
<xml_diff>
--- a/mrubis_controller/presentation/MLC.pptx
+++ b/mrubis_controller/presentation/MLC.pptx
@@ -5,10 +5,10 @@
     <p:sldMasterId id="2147483648" r:id="rId1"/>
   </p:sldMasterIdLst>
   <p:notesMasterIdLst>
-    <p:notesMasterId r:id="rId19"/>
+    <p:notesMasterId r:id="rId20"/>
   </p:notesMasterIdLst>
   <p:handoutMasterIdLst>
-    <p:handoutMasterId r:id="rId20"/>
+    <p:handoutMasterId r:id="rId21"/>
   </p:handoutMasterIdLst>
   <p:sldIdLst>
     <p:sldId id="258" r:id="rId2"/>
@@ -20,19 +20,20 @@
     <p:sldId id="274" r:id="rId8"/>
     <p:sldId id="272" r:id="rId9"/>
     <p:sldId id="277" r:id="rId10"/>
-    <p:sldId id="263" r:id="rId11"/>
-    <p:sldId id="271" r:id="rId12"/>
-    <p:sldId id="259" r:id="rId13"/>
-    <p:sldId id="261" r:id="rId14"/>
-    <p:sldId id="266" r:id="rId15"/>
-    <p:sldId id="267" r:id="rId16"/>
-    <p:sldId id="268" r:id="rId17"/>
-    <p:sldId id="269" r:id="rId18"/>
+    <p:sldId id="287" r:id="rId11"/>
+    <p:sldId id="263" r:id="rId12"/>
+    <p:sldId id="271" r:id="rId13"/>
+    <p:sldId id="259" r:id="rId14"/>
+    <p:sldId id="261" r:id="rId15"/>
+    <p:sldId id="266" r:id="rId16"/>
+    <p:sldId id="267" r:id="rId17"/>
+    <p:sldId id="268" r:id="rId18"/>
+    <p:sldId id="269" r:id="rId19"/>
   </p:sldIdLst>
   <p:sldSz cx="9144000" cy="5143500" type="screen16x9"/>
   <p:notesSz cx="6858000" cy="9144000"/>
   <p:custDataLst>
-    <p:tags r:id="rId21"/>
+    <p:tags r:id="rId22"/>
   </p:custDataLst>
   <p:defaultTextStyle>
     <a:defPPr>
@@ -2758,7 +2759,7 @@
             <a:fld id="{4CBF50E3-ED67-46F2-ABFC-A36EE1082CF7}" type="slidenum">
               <a:rPr lang="en-US" b="1" smtClean="0"/>
               <a:pPr/>
-              <a:t>17</a:t>
+              <a:t>18</a:t>
             </a:fld>
             <a:endParaRPr lang="en-US" b="1" dirty="0"/>
           </a:p>
@@ -2946,7 +2947,7 @@
             <a:fld id="{4CBF50E3-ED67-46F2-ABFC-A36EE1082CF7}" type="slidenum">
               <a:rPr lang="en-US" b="1" smtClean="0"/>
               <a:pPr/>
-              <a:t>10</a:t>
+              <a:t>11</a:t>
             </a:fld>
             <a:endParaRPr lang="en-US" b="1" dirty="0"/>
           </a:p>
@@ -3040,7 +3041,7 @@
             <a:fld id="{4CBF50E3-ED67-46F2-ABFC-A36EE1082CF7}" type="slidenum">
               <a:rPr lang="en-US" b="1" smtClean="0"/>
               <a:pPr/>
-              <a:t>11</a:t>
+              <a:t>12</a:t>
             </a:fld>
             <a:endParaRPr lang="en-US" b="1" dirty="0"/>
           </a:p>
@@ -3134,7 +3135,7 @@
             <a:fld id="{4CBF50E3-ED67-46F2-ABFC-A36EE1082CF7}" type="slidenum">
               <a:rPr lang="en-US" b="1" smtClean="0"/>
               <a:pPr/>
-              <a:t>12</a:t>
+              <a:t>13</a:t>
             </a:fld>
             <a:endParaRPr lang="en-US" b="1" dirty="0"/>
           </a:p>
@@ -3228,7 +3229,7 @@
             <a:fld id="{4CBF50E3-ED67-46F2-ABFC-A36EE1082CF7}" type="slidenum">
               <a:rPr lang="en-US" b="1" smtClean="0"/>
               <a:pPr/>
-              <a:t>13</a:t>
+              <a:t>14</a:t>
             </a:fld>
             <a:endParaRPr lang="en-US" b="1" dirty="0"/>
           </a:p>
@@ -3322,7 +3323,7 @@
             <a:fld id="{4CBF50E3-ED67-46F2-ABFC-A36EE1082CF7}" type="slidenum">
               <a:rPr lang="en-US" b="1" smtClean="0"/>
               <a:pPr/>
-              <a:t>14</a:t>
+              <a:t>15</a:t>
             </a:fld>
             <a:endParaRPr lang="en-US" b="1" dirty="0"/>
           </a:p>
@@ -3416,7 +3417,7 @@
             <a:fld id="{4CBF50E3-ED67-46F2-ABFC-A36EE1082CF7}" type="slidenum">
               <a:rPr lang="en-US" b="1" smtClean="0"/>
               <a:pPr/>
-              <a:t>15</a:t>
+              <a:t>16</a:t>
             </a:fld>
             <a:endParaRPr lang="en-US" b="1" dirty="0"/>
           </a:p>
@@ -3510,7 +3511,7 @@
             <a:fld id="{4CBF50E3-ED67-46F2-ABFC-A36EE1082CF7}" type="slidenum">
               <a:rPr lang="en-US" b="1" smtClean="0"/>
               <a:pPr/>
-              <a:t>16</a:t>
+              <a:t>17</a:t>
             </a:fld>
             <a:endParaRPr lang="en-US" b="1" dirty="0"/>
           </a:p>
@@ -11792,6 +11793,3730 @@
       </p:grpSpPr>
       <p:sp>
         <p:nvSpPr>
+          <p:cNvPr id="111" name="Rectangle: Rounded Corners 110">
+            <a:extLst>
+              <a:ext uri="{FF2B5EF4-FFF2-40B4-BE49-F238E27FC236}">
+                <a16:creationId xmlns:a16="http://schemas.microsoft.com/office/drawing/2014/main" id="{E9F10A70-CA6D-46C9-BDA6-BFCDB51A2EC2}"/>
+              </a:ext>
+            </a:extLst>
+          </p:cNvPr>
+          <p:cNvSpPr/>
+          <p:nvPr/>
+        </p:nvSpPr>
+        <p:spPr bwMode="gray">
+          <a:xfrm>
+            <a:off x="179386" y="4356272"/>
+            <a:ext cx="3074057" cy="369150"/>
+          </a:xfrm>
+          <a:prstGeom prst="roundRect">
+            <a:avLst/>
+          </a:prstGeom>
+          <a:ln w="6350"/>
+        </p:spPr>
+        <p:style>
+          <a:lnRef idx="2">
+            <a:schemeClr val="dk1"/>
+          </a:lnRef>
+          <a:fillRef idx="1">
+            <a:schemeClr val="lt1"/>
+          </a:fillRef>
+          <a:effectRef idx="0">
+            <a:schemeClr val="dk1"/>
+          </a:effectRef>
+          <a:fontRef idx="minor">
+            <a:schemeClr val="dk1"/>
+          </a:fontRef>
+        </p:style>
+        <p:txBody>
+          <a:bodyPr rot="0" spcFirstLastPara="0" vertOverflow="overflow" horzOverflow="overflow" vert="horz" wrap="square" lIns="108000" tIns="72000" rIns="108000" bIns="72000" numCol="1" spcCol="0" rtlCol="0" fromWordArt="0" anchor="ctr" anchorCtr="0" forceAA="0" compatLnSpc="1">
+            <a:prstTxWarp prst="textNoShape">
+              <a:avLst/>
+            </a:prstTxWarp>
+            <a:noAutofit/>
+          </a:bodyPr>
+          <a:lstStyle/>
+          <a:p>
+            <a:pPr algn="ctr">
+              <a:spcBef>
+                <a:spcPts val="300"/>
+              </a:spcBef>
+              <a:spcAft>
+                <a:spcPts val="300"/>
+              </a:spcAft>
+            </a:pPr>
+            <a:endParaRPr lang="en-GB" sz="1200" b="1" dirty="0" err="1">
+              <a:solidFill>
+                <a:schemeClr val="bg1"/>
+              </a:solidFill>
+            </a:endParaRPr>
+          </a:p>
+        </p:txBody>
+      </p:sp>
+      <p:sp>
+        <p:nvSpPr>
+          <p:cNvPr id="110" name="Rectangle: Rounded Corners 109">
+            <a:extLst>
+              <a:ext uri="{FF2B5EF4-FFF2-40B4-BE49-F238E27FC236}">
+                <a16:creationId xmlns:a16="http://schemas.microsoft.com/office/drawing/2014/main" id="{51AE9223-2895-41F1-AC6D-834A24037FE8}"/>
+              </a:ext>
+            </a:extLst>
+          </p:cNvPr>
+          <p:cNvSpPr/>
+          <p:nvPr/>
+        </p:nvSpPr>
+        <p:spPr bwMode="gray">
+          <a:xfrm>
+            <a:off x="179385" y="3668370"/>
+            <a:ext cx="3074057" cy="613488"/>
+          </a:xfrm>
+          <a:prstGeom prst="roundRect">
+            <a:avLst/>
+          </a:prstGeom>
+          <a:ln w="6350"/>
+        </p:spPr>
+        <p:style>
+          <a:lnRef idx="2">
+            <a:schemeClr val="dk1"/>
+          </a:lnRef>
+          <a:fillRef idx="1">
+            <a:schemeClr val="lt1"/>
+          </a:fillRef>
+          <a:effectRef idx="0">
+            <a:schemeClr val="dk1"/>
+          </a:effectRef>
+          <a:fontRef idx="minor">
+            <a:schemeClr val="dk1"/>
+          </a:fontRef>
+        </p:style>
+        <p:txBody>
+          <a:bodyPr rot="0" spcFirstLastPara="0" vertOverflow="overflow" horzOverflow="overflow" vert="horz" wrap="square" lIns="108000" tIns="72000" rIns="108000" bIns="72000" numCol="1" spcCol="0" rtlCol="0" fromWordArt="0" anchor="ctr" anchorCtr="0" forceAA="0" compatLnSpc="1">
+            <a:prstTxWarp prst="textNoShape">
+              <a:avLst/>
+            </a:prstTxWarp>
+            <a:noAutofit/>
+          </a:bodyPr>
+          <a:lstStyle/>
+          <a:p>
+            <a:pPr algn="ctr">
+              <a:spcBef>
+                <a:spcPts val="300"/>
+              </a:spcBef>
+              <a:spcAft>
+                <a:spcPts val="300"/>
+              </a:spcAft>
+            </a:pPr>
+            <a:endParaRPr lang="en-GB" sz="1200" b="1" dirty="0" err="1">
+              <a:solidFill>
+                <a:schemeClr val="bg1"/>
+              </a:solidFill>
+            </a:endParaRPr>
+          </a:p>
+        </p:txBody>
+      </p:sp>
+      <p:sp>
+        <p:nvSpPr>
+          <p:cNvPr id="109" name="Rectangle: Rounded Corners 108">
+            <a:extLst>
+              <a:ext uri="{FF2B5EF4-FFF2-40B4-BE49-F238E27FC236}">
+                <a16:creationId xmlns:a16="http://schemas.microsoft.com/office/drawing/2014/main" id="{0AD9C92F-966D-4EB0-8DC5-9A23F217769D}"/>
+              </a:ext>
+            </a:extLst>
+          </p:cNvPr>
+          <p:cNvSpPr/>
+          <p:nvPr/>
+        </p:nvSpPr>
+        <p:spPr bwMode="gray">
+          <a:xfrm>
+            <a:off x="179386" y="2418151"/>
+            <a:ext cx="3074058" cy="582344"/>
+          </a:xfrm>
+          <a:prstGeom prst="roundRect">
+            <a:avLst/>
+          </a:prstGeom>
+          <a:ln w="6350"/>
+        </p:spPr>
+        <p:style>
+          <a:lnRef idx="2">
+            <a:schemeClr val="dk1"/>
+          </a:lnRef>
+          <a:fillRef idx="1">
+            <a:schemeClr val="lt1"/>
+          </a:fillRef>
+          <a:effectRef idx="0">
+            <a:schemeClr val="dk1"/>
+          </a:effectRef>
+          <a:fontRef idx="minor">
+            <a:schemeClr val="dk1"/>
+          </a:fontRef>
+        </p:style>
+        <p:txBody>
+          <a:bodyPr rot="0" spcFirstLastPara="0" vertOverflow="overflow" horzOverflow="overflow" vert="horz" wrap="square" lIns="108000" tIns="72000" rIns="108000" bIns="72000" numCol="1" spcCol="0" rtlCol="0" fromWordArt="0" anchor="ctr" anchorCtr="0" forceAA="0" compatLnSpc="1">
+            <a:prstTxWarp prst="textNoShape">
+              <a:avLst/>
+            </a:prstTxWarp>
+            <a:noAutofit/>
+          </a:bodyPr>
+          <a:lstStyle/>
+          <a:p>
+            <a:pPr>
+              <a:spcBef>
+                <a:spcPts val="300"/>
+              </a:spcBef>
+              <a:spcAft>
+                <a:spcPts val="300"/>
+              </a:spcAft>
+            </a:pPr>
+            <a:endParaRPr lang="en-GB" sz="1050" dirty="0" err="1">
+              <a:solidFill>
+                <a:schemeClr val="tx1"/>
+              </a:solidFill>
+            </a:endParaRPr>
+          </a:p>
+        </p:txBody>
+      </p:sp>
+      <p:sp>
+        <p:nvSpPr>
+          <p:cNvPr id="3" name="Date Placeholder 2">
+            <a:extLst>
+              <a:ext uri="{FF2B5EF4-FFF2-40B4-BE49-F238E27FC236}">
+                <a16:creationId xmlns:a16="http://schemas.microsoft.com/office/drawing/2014/main" id="{5390AC34-D74B-4F48-BF0D-1E852850750E}"/>
+              </a:ext>
+            </a:extLst>
+          </p:cNvPr>
+          <p:cNvSpPr>
+            <a:spLocks noGrp="1"/>
+          </p:cNvSpPr>
+          <p:nvPr>
+            <p:ph type="dt" sz="half" idx="14"/>
+          </p:nvPr>
+        </p:nvSpPr>
+        <p:spPr/>
+        <p:txBody>
+          <a:bodyPr/>
+          <a:lstStyle/>
+          <a:p>
+            <a:r>
+              <a:rPr lang="en-US"/>
+              <a:t>Speaker, Job Description, Date if needed</a:t>
+            </a:r>
+            <a:endParaRPr lang="en-US" dirty="0"/>
+          </a:p>
+        </p:txBody>
+      </p:sp>
+      <p:sp>
+        <p:nvSpPr>
+          <p:cNvPr id="4" name="Footer Placeholder 3">
+            <a:extLst>
+              <a:ext uri="{FF2B5EF4-FFF2-40B4-BE49-F238E27FC236}">
+                <a16:creationId xmlns:a16="http://schemas.microsoft.com/office/drawing/2014/main" id="{970EFF6D-7D91-42FC-8287-2A4F05288576}"/>
+              </a:ext>
+            </a:extLst>
+          </p:cNvPr>
+          <p:cNvSpPr>
+            <a:spLocks noGrp="1"/>
+          </p:cNvSpPr>
+          <p:nvPr>
+            <p:ph type="ftr" sz="quarter" idx="15"/>
+          </p:nvPr>
+        </p:nvSpPr>
+        <p:spPr/>
+        <p:txBody>
+          <a:bodyPr/>
+          <a:lstStyle/>
+          <a:p>
+            <a:r>
+              <a:rPr lang="en-US"/>
+              <a:t>Presentation Title</a:t>
+            </a:r>
+            <a:endParaRPr lang="en-US" dirty="0"/>
+          </a:p>
+        </p:txBody>
+      </p:sp>
+      <p:sp>
+        <p:nvSpPr>
+          <p:cNvPr id="5" name="Slide Number Placeholder 4">
+            <a:extLst>
+              <a:ext uri="{FF2B5EF4-FFF2-40B4-BE49-F238E27FC236}">
+                <a16:creationId xmlns:a16="http://schemas.microsoft.com/office/drawing/2014/main" id="{762F2ED8-F54B-4080-A9E5-666127D92DDE}"/>
+              </a:ext>
+            </a:extLst>
+          </p:cNvPr>
+          <p:cNvSpPr>
+            <a:spLocks noGrp="1"/>
+          </p:cNvSpPr>
+          <p:nvPr>
+            <p:ph type="sldNum" sz="quarter" idx="16"/>
+          </p:nvPr>
+        </p:nvSpPr>
+        <p:spPr/>
+        <p:txBody>
+          <a:bodyPr/>
+          <a:lstStyle/>
+          <a:p>
+            <a:r>
+              <a:rPr lang="en-US"/>
+              <a:t>Chart </a:t>
+            </a:r>
+            <a:fld id="{91D913BA-B0D8-4B51-9328-DFAA0B370309}" type="slidenum">
+              <a:rPr lang="en-US" b="1" smtClean="0"/>
+              <a:pPr/>
+              <a:t>10</a:t>
+            </a:fld>
+            <a:endParaRPr lang="en-US" b="1" dirty="0"/>
+          </a:p>
+        </p:txBody>
+      </p:sp>
+      <p:sp>
+        <p:nvSpPr>
+          <p:cNvPr id="6" name="Title 5">
+            <a:extLst>
+              <a:ext uri="{FF2B5EF4-FFF2-40B4-BE49-F238E27FC236}">
+                <a16:creationId xmlns:a16="http://schemas.microsoft.com/office/drawing/2014/main" id="{D524EBA2-FCFB-4327-AF4F-0304FDBDCEFC}"/>
+              </a:ext>
+            </a:extLst>
+          </p:cNvPr>
+          <p:cNvSpPr>
+            <a:spLocks noGrp="1"/>
+          </p:cNvSpPr>
+          <p:nvPr>
+            <p:ph type="title"/>
+          </p:nvPr>
+        </p:nvSpPr>
+        <p:spPr/>
+        <p:txBody>
+          <a:bodyPr/>
+          <a:lstStyle/>
+          <a:p>
+            <a:r>
+              <a:rPr lang="de-DE" dirty="0"/>
+              <a:t>Disscussion -</a:t>
+            </a:r>
+            <a:br>
+              <a:rPr lang="de-DE" dirty="0"/>
+            </a:br>
+            <a:r>
+              <a:rPr lang="de-DE" dirty="0"/>
+              <a:t>mRubis and Python</a:t>
+            </a:r>
+            <a:endParaRPr lang="en-GB" dirty="0"/>
+          </a:p>
+        </p:txBody>
+      </p:sp>
+      <p:sp>
+        <p:nvSpPr>
+          <p:cNvPr id="8" name="TextBox 7">
+            <a:extLst>
+              <a:ext uri="{FF2B5EF4-FFF2-40B4-BE49-F238E27FC236}">
+                <a16:creationId xmlns:a16="http://schemas.microsoft.com/office/drawing/2014/main" id="{5C5D4E32-5716-4891-9C8C-97105923B3F8}"/>
+              </a:ext>
+            </a:extLst>
+          </p:cNvPr>
+          <p:cNvSpPr txBox="1"/>
+          <p:nvPr/>
+        </p:nvSpPr>
+        <p:spPr bwMode="gray">
+          <a:xfrm>
+            <a:off x="377012" y="1611423"/>
+            <a:ext cx="1368152" cy="213506"/>
+          </a:xfrm>
+          <a:prstGeom prst="rect">
+            <a:avLst/>
+          </a:prstGeom>
+          <a:noFill/>
+        </p:spPr>
+        <p:txBody>
+          <a:bodyPr wrap="none" lIns="0" tIns="0" rIns="0" bIns="0" rtlCol="0">
+            <a:noAutofit/>
+          </a:bodyPr>
+          <a:lstStyle/>
+          <a:p>
+            <a:pPr algn="ctr">
+              <a:spcBef>
+                <a:spcPts val="300"/>
+              </a:spcBef>
+              <a:spcAft>
+                <a:spcPts val="300"/>
+              </a:spcAft>
+              <a:buClr>
+                <a:schemeClr val="accent1"/>
+              </a:buClr>
+              <a:buSzPct val="90000"/>
+            </a:pPr>
+            <a:r>
+              <a:rPr lang="de-DE" sz="1200" dirty="0"/>
+              <a:t>python controller</a:t>
+            </a:r>
+            <a:endParaRPr lang="en-GB" sz="1200" dirty="0" err="1"/>
+          </a:p>
+        </p:txBody>
+      </p:sp>
+      <p:sp>
+        <p:nvSpPr>
+          <p:cNvPr id="10" name="TextBox 9">
+            <a:extLst>
+              <a:ext uri="{FF2B5EF4-FFF2-40B4-BE49-F238E27FC236}">
+                <a16:creationId xmlns:a16="http://schemas.microsoft.com/office/drawing/2014/main" id="{140BE13C-7120-4D74-A7C5-DFCF8A258EF4}"/>
+              </a:ext>
+            </a:extLst>
+          </p:cNvPr>
+          <p:cNvSpPr txBox="1"/>
+          <p:nvPr/>
+        </p:nvSpPr>
+        <p:spPr bwMode="gray">
+          <a:xfrm>
+            <a:off x="2321228" y="1646168"/>
+            <a:ext cx="1368152" cy="213506"/>
+          </a:xfrm>
+          <a:prstGeom prst="rect">
+            <a:avLst/>
+          </a:prstGeom>
+          <a:noFill/>
+        </p:spPr>
+        <p:txBody>
+          <a:bodyPr wrap="none" lIns="0" tIns="0" rIns="0" bIns="0" rtlCol="0">
+            <a:noAutofit/>
+          </a:bodyPr>
+          <a:lstStyle/>
+          <a:p>
+            <a:pPr algn="ctr">
+              <a:spcBef>
+                <a:spcPts val="300"/>
+              </a:spcBef>
+              <a:spcAft>
+                <a:spcPts val="300"/>
+              </a:spcAft>
+              <a:buClr>
+                <a:schemeClr val="accent1"/>
+              </a:buClr>
+              <a:buSzPct val="90000"/>
+            </a:pPr>
+            <a:r>
+              <a:rPr lang="de-DE" sz="1200" dirty="0"/>
+              <a:t>mRubis</a:t>
+            </a:r>
+            <a:endParaRPr lang="en-GB" sz="1200" dirty="0" err="1"/>
+          </a:p>
+        </p:txBody>
+      </p:sp>
+      <p:grpSp>
+        <p:nvGrpSpPr>
+          <p:cNvPr id="19" name="Group 18">
+            <a:extLst>
+              <a:ext uri="{FF2B5EF4-FFF2-40B4-BE49-F238E27FC236}">
+                <a16:creationId xmlns:a16="http://schemas.microsoft.com/office/drawing/2014/main" id="{843710BB-0C14-44B4-8B4C-F3E73DBA1CB3}"/>
+              </a:ext>
+            </a:extLst>
+          </p:cNvPr>
+          <p:cNvGrpSpPr/>
+          <p:nvPr/>
+        </p:nvGrpSpPr>
+        <p:grpSpPr>
+          <a:xfrm>
+            <a:off x="1277112" y="1823701"/>
+            <a:ext cx="1512168" cy="145244"/>
+            <a:chOff x="1187624" y="1562410"/>
+            <a:chExt cx="1512168" cy="145244"/>
+          </a:xfrm>
+        </p:grpSpPr>
+        <p:cxnSp>
+          <p:nvCxnSpPr>
+            <p:cNvPr id="12" name="Straight Arrow Connector 11">
+              <a:extLst>
+                <a:ext uri="{FF2B5EF4-FFF2-40B4-BE49-F238E27FC236}">
+                  <a16:creationId xmlns:a16="http://schemas.microsoft.com/office/drawing/2014/main" id="{FCAC3CD5-8DA6-4718-8C43-D34845D48ED2}"/>
+                </a:ext>
+              </a:extLst>
+            </p:cNvPr>
+            <p:cNvCxnSpPr>
+              <a:cxnSpLocks/>
+            </p:cNvCxnSpPr>
+            <p:nvPr/>
+          </p:nvCxnSpPr>
+          <p:spPr bwMode="gray">
+            <a:xfrm>
+              <a:off x="1187624" y="1707654"/>
+              <a:ext cx="1512168" cy="0"/>
+            </a:xfrm>
+            <a:prstGeom prst="straightConnector1">
+              <a:avLst/>
+            </a:prstGeom>
+            <a:ln>
+              <a:solidFill>
+                <a:schemeClr val="accent1"/>
+              </a:solidFill>
+              <a:tailEnd type="triangle"/>
+            </a:ln>
+          </p:spPr>
+          <p:style>
+            <a:lnRef idx="1">
+              <a:schemeClr val="accent1"/>
+            </a:lnRef>
+            <a:fillRef idx="0">
+              <a:schemeClr val="accent1"/>
+            </a:fillRef>
+            <a:effectRef idx="0">
+              <a:schemeClr val="accent1"/>
+            </a:effectRef>
+            <a:fontRef idx="minor">
+              <a:schemeClr val="tx1"/>
+            </a:fontRef>
+          </p:style>
+        </p:cxnSp>
+        <p:sp>
+          <p:nvSpPr>
+            <p:cNvPr id="18" name="TextBox 17">
+              <a:extLst>
+                <a:ext uri="{FF2B5EF4-FFF2-40B4-BE49-F238E27FC236}">
+                  <a16:creationId xmlns:a16="http://schemas.microsoft.com/office/drawing/2014/main" id="{1EA9A8DF-D12C-43AA-93E2-3CDB3E3DBE87}"/>
+                </a:ext>
+              </a:extLst>
+            </p:cNvPr>
+            <p:cNvSpPr txBox="1"/>
+            <p:nvPr/>
+          </p:nvSpPr>
+          <p:spPr bwMode="gray">
+            <a:xfrm>
+              <a:off x="1544216" y="1562410"/>
+              <a:ext cx="914400" cy="145244"/>
+            </a:xfrm>
+            <a:prstGeom prst="rect">
+              <a:avLst/>
+            </a:prstGeom>
+            <a:noFill/>
+          </p:spPr>
+          <p:txBody>
+            <a:bodyPr wrap="none" lIns="0" tIns="0" rIns="0" bIns="0" rtlCol="0">
+              <a:noAutofit/>
+            </a:bodyPr>
+            <a:lstStyle/>
+            <a:p>
+              <a:pPr>
+                <a:spcBef>
+                  <a:spcPts val="300"/>
+                </a:spcBef>
+                <a:spcAft>
+                  <a:spcPts val="300"/>
+                </a:spcAft>
+                <a:buClr>
+                  <a:schemeClr val="accent1"/>
+                </a:buClr>
+                <a:buSzPct val="90000"/>
+              </a:pPr>
+              <a:r>
+                <a:rPr lang="de-DE" sz="900" dirty="0"/>
+                <a:t>get #shops</a:t>
+              </a:r>
+              <a:endParaRPr lang="en-GB" sz="900" dirty="0" err="1"/>
+            </a:p>
+          </p:txBody>
+        </p:sp>
+      </p:grpSp>
+      <p:grpSp>
+        <p:nvGrpSpPr>
+          <p:cNvPr id="22" name="Group 21">
+            <a:extLst>
+              <a:ext uri="{FF2B5EF4-FFF2-40B4-BE49-F238E27FC236}">
+                <a16:creationId xmlns:a16="http://schemas.microsoft.com/office/drawing/2014/main" id="{A778D26E-CD30-4D0A-9FA1-0926939AE20B}"/>
+              </a:ext>
+            </a:extLst>
+          </p:cNvPr>
+          <p:cNvGrpSpPr/>
+          <p:nvPr/>
+        </p:nvGrpSpPr>
+        <p:grpSpPr>
+          <a:xfrm>
+            <a:off x="1277112" y="2112961"/>
+            <a:ext cx="1512169" cy="145244"/>
+            <a:chOff x="1187624" y="1851670"/>
+            <a:chExt cx="1512169" cy="145244"/>
+          </a:xfrm>
+        </p:grpSpPr>
+        <p:cxnSp>
+          <p:nvCxnSpPr>
+            <p:cNvPr id="14" name="Straight Arrow Connector 13">
+              <a:extLst>
+                <a:ext uri="{FF2B5EF4-FFF2-40B4-BE49-F238E27FC236}">
+                  <a16:creationId xmlns:a16="http://schemas.microsoft.com/office/drawing/2014/main" id="{7D27AC3D-6DB4-4B7B-BCE1-A4CD82C3DD69}"/>
+                </a:ext>
+              </a:extLst>
+            </p:cNvPr>
+            <p:cNvCxnSpPr>
+              <a:cxnSpLocks/>
+            </p:cNvCxnSpPr>
+            <p:nvPr/>
+          </p:nvCxnSpPr>
+          <p:spPr bwMode="gray">
+            <a:xfrm flipH="1">
+              <a:off x="1187624" y="1985548"/>
+              <a:ext cx="1512169" cy="0"/>
+            </a:xfrm>
+            <a:prstGeom prst="straightConnector1">
+              <a:avLst/>
+            </a:prstGeom>
+            <a:ln>
+              <a:solidFill>
+                <a:schemeClr val="accent1"/>
+              </a:solidFill>
+              <a:prstDash val="sysDash"/>
+              <a:headEnd type="none" w="med" len="med"/>
+              <a:tailEnd type="arrow" w="med" len="med"/>
+            </a:ln>
+          </p:spPr>
+          <p:style>
+            <a:lnRef idx="1">
+              <a:schemeClr val="accent1"/>
+            </a:lnRef>
+            <a:fillRef idx="0">
+              <a:schemeClr val="accent1"/>
+            </a:fillRef>
+            <a:effectRef idx="0">
+              <a:schemeClr val="accent1"/>
+            </a:effectRef>
+            <a:fontRef idx="minor">
+              <a:schemeClr val="tx1"/>
+            </a:fontRef>
+          </p:style>
+        </p:cxnSp>
+        <p:sp>
+          <p:nvSpPr>
+            <p:cNvPr id="20" name="TextBox 19">
+              <a:extLst>
+                <a:ext uri="{FF2B5EF4-FFF2-40B4-BE49-F238E27FC236}">
+                  <a16:creationId xmlns:a16="http://schemas.microsoft.com/office/drawing/2014/main" id="{3BCFF756-88DC-430C-83C2-70903C2B11B2}"/>
+                </a:ext>
+              </a:extLst>
+            </p:cNvPr>
+            <p:cNvSpPr txBox="1"/>
+            <p:nvPr/>
+          </p:nvSpPr>
+          <p:spPr bwMode="gray">
+            <a:xfrm>
+              <a:off x="1481505" y="1851670"/>
+              <a:ext cx="914400" cy="145244"/>
+            </a:xfrm>
+            <a:prstGeom prst="rect">
+              <a:avLst/>
+            </a:prstGeom>
+            <a:noFill/>
+          </p:spPr>
+          <p:txBody>
+            <a:bodyPr wrap="none" lIns="0" tIns="0" rIns="0" bIns="0" rtlCol="0">
+              <a:noAutofit/>
+            </a:bodyPr>
+            <a:lstStyle/>
+            <a:p>
+              <a:pPr algn="ctr">
+                <a:spcBef>
+                  <a:spcPts val="300"/>
+                </a:spcBef>
+                <a:spcAft>
+                  <a:spcPts val="300"/>
+                </a:spcAft>
+                <a:buClr>
+                  <a:schemeClr val="accent1"/>
+                </a:buClr>
+                <a:buSzPct val="90000"/>
+              </a:pPr>
+              <a:r>
+                <a:rPr lang="de-DE" sz="900" dirty="0"/>
+                <a:t>#shops</a:t>
+              </a:r>
+              <a:endParaRPr lang="en-GB" sz="900" dirty="0" err="1"/>
+            </a:p>
+          </p:txBody>
+        </p:sp>
+      </p:grpSp>
+      <p:grpSp>
+        <p:nvGrpSpPr>
+          <p:cNvPr id="23" name="Group 22">
+            <a:extLst>
+              <a:ext uri="{FF2B5EF4-FFF2-40B4-BE49-F238E27FC236}">
+                <a16:creationId xmlns:a16="http://schemas.microsoft.com/office/drawing/2014/main" id="{61A71D6C-E844-461A-932F-DDB0C3D0F6EA}"/>
+              </a:ext>
+            </a:extLst>
+          </p:cNvPr>
+          <p:cNvGrpSpPr/>
+          <p:nvPr/>
+        </p:nvGrpSpPr>
+        <p:grpSpPr>
+          <a:xfrm>
+            <a:off x="1272109" y="2462242"/>
+            <a:ext cx="1512168" cy="145244"/>
+            <a:chOff x="1187624" y="1564306"/>
+            <a:chExt cx="1512168" cy="145244"/>
+          </a:xfrm>
+        </p:grpSpPr>
+        <p:cxnSp>
+          <p:nvCxnSpPr>
+            <p:cNvPr id="24" name="Straight Arrow Connector 23">
+              <a:extLst>
+                <a:ext uri="{FF2B5EF4-FFF2-40B4-BE49-F238E27FC236}">
+                  <a16:creationId xmlns:a16="http://schemas.microsoft.com/office/drawing/2014/main" id="{9D5A3096-F269-4AB3-A1FA-F19593636070}"/>
+                </a:ext>
+              </a:extLst>
+            </p:cNvPr>
+            <p:cNvCxnSpPr>
+              <a:cxnSpLocks/>
+            </p:cNvCxnSpPr>
+            <p:nvPr/>
+          </p:nvCxnSpPr>
+          <p:spPr bwMode="gray">
+            <a:xfrm>
+              <a:off x="1187624" y="1707654"/>
+              <a:ext cx="1512168" cy="0"/>
+            </a:xfrm>
+            <a:prstGeom prst="straightConnector1">
+              <a:avLst/>
+            </a:prstGeom>
+            <a:ln>
+              <a:solidFill>
+                <a:schemeClr val="accent1"/>
+              </a:solidFill>
+              <a:tailEnd type="triangle"/>
+            </a:ln>
+          </p:spPr>
+          <p:style>
+            <a:lnRef idx="1">
+              <a:schemeClr val="accent1"/>
+            </a:lnRef>
+            <a:fillRef idx="0">
+              <a:schemeClr val="accent1"/>
+            </a:fillRef>
+            <a:effectRef idx="0">
+              <a:schemeClr val="accent1"/>
+            </a:effectRef>
+            <a:fontRef idx="minor">
+              <a:schemeClr val="tx1"/>
+            </a:fontRef>
+          </p:style>
+        </p:cxnSp>
+        <p:sp>
+          <p:nvSpPr>
+            <p:cNvPr id="25" name="TextBox 24">
+              <a:extLst>
+                <a:ext uri="{FF2B5EF4-FFF2-40B4-BE49-F238E27FC236}">
+                  <a16:creationId xmlns:a16="http://schemas.microsoft.com/office/drawing/2014/main" id="{9BB34276-30F4-42E4-86F5-3B8BF4079AF3}"/>
+                </a:ext>
+              </a:extLst>
+            </p:cNvPr>
+            <p:cNvSpPr txBox="1"/>
+            <p:nvPr/>
+          </p:nvSpPr>
+          <p:spPr bwMode="gray">
+            <a:xfrm>
+              <a:off x="1426670" y="1564306"/>
+              <a:ext cx="914400" cy="145244"/>
+            </a:xfrm>
+            <a:prstGeom prst="rect">
+              <a:avLst/>
+            </a:prstGeom>
+            <a:noFill/>
+          </p:spPr>
+          <p:txBody>
+            <a:bodyPr wrap="none" lIns="0" tIns="0" rIns="0" bIns="0" rtlCol="0">
+              <a:noAutofit/>
+            </a:bodyPr>
+            <a:lstStyle/>
+            <a:p>
+              <a:pPr>
+                <a:spcBef>
+                  <a:spcPts val="300"/>
+                </a:spcBef>
+                <a:spcAft>
+                  <a:spcPts val="300"/>
+                </a:spcAft>
+                <a:buClr>
+                  <a:schemeClr val="accent1"/>
+                </a:buClr>
+                <a:buSzPct val="90000"/>
+              </a:pPr>
+              <a:r>
+                <a:rPr lang="de-DE" sz="900" dirty="0"/>
+                <a:t>get info of shop</a:t>
+              </a:r>
+              <a:endParaRPr lang="en-GB" sz="900" dirty="0" err="1"/>
+            </a:p>
+          </p:txBody>
+        </p:sp>
+      </p:grpSp>
+      <p:grpSp>
+        <p:nvGrpSpPr>
+          <p:cNvPr id="32" name="Group 31">
+            <a:extLst>
+              <a:ext uri="{FF2B5EF4-FFF2-40B4-BE49-F238E27FC236}">
+                <a16:creationId xmlns:a16="http://schemas.microsoft.com/office/drawing/2014/main" id="{79401B4B-078A-4B99-B7DB-6579CDA6F6F3}"/>
+              </a:ext>
+            </a:extLst>
+          </p:cNvPr>
+          <p:cNvGrpSpPr/>
+          <p:nvPr/>
+        </p:nvGrpSpPr>
+        <p:grpSpPr>
+          <a:xfrm>
+            <a:off x="1268458" y="2792202"/>
+            <a:ext cx="1512169" cy="145244"/>
+            <a:chOff x="1187624" y="1851670"/>
+            <a:chExt cx="1512169" cy="145244"/>
+          </a:xfrm>
+        </p:grpSpPr>
+        <p:cxnSp>
+          <p:nvCxnSpPr>
+            <p:cNvPr id="33" name="Straight Arrow Connector 32">
+              <a:extLst>
+                <a:ext uri="{FF2B5EF4-FFF2-40B4-BE49-F238E27FC236}">
+                  <a16:creationId xmlns:a16="http://schemas.microsoft.com/office/drawing/2014/main" id="{D5EA9ED3-64BA-43B9-8CA8-7AA639A05C08}"/>
+                </a:ext>
+              </a:extLst>
+            </p:cNvPr>
+            <p:cNvCxnSpPr>
+              <a:cxnSpLocks/>
+            </p:cNvCxnSpPr>
+            <p:nvPr/>
+          </p:nvCxnSpPr>
+          <p:spPr bwMode="gray">
+            <a:xfrm flipH="1">
+              <a:off x="1187624" y="1985548"/>
+              <a:ext cx="1512169" cy="0"/>
+            </a:xfrm>
+            <a:prstGeom prst="straightConnector1">
+              <a:avLst/>
+            </a:prstGeom>
+            <a:ln>
+              <a:solidFill>
+                <a:schemeClr val="accent1"/>
+              </a:solidFill>
+              <a:prstDash val="sysDash"/>
+              <a:headEnd type="none" w="med" len="med"/>
+              <a:tailEnd type="arrow" w="med" len="med"/>
+            </a:ln>
+          </p:spPr>
+          <p:style>
+            <a:lnRef idx="1">
+              <a:schemeClr val="accent1"/>
+            </a:lnRef>
+            <a:fillRef idx="0">
+              <a:schemeClr val="accent1"/>
+            </a:fillRef>
+            <a:effectRef idx="0">
+              <a:schemeClr val="accent1"/>
+            </a:effectRef>
+            <a:fontRef idx="minor">
+              <a:schemeClr val="tx1"/>
+            </a:fontRef>
+          </p:style>
+        </p:cxnSp>
+        <p:sp>
+          <p:nvSpPr>
+            <p:cNvPr id="34" name="TextBox 33">
+              <a:extLst>
+                <a:ext uri="{FF2B5EF4-FFF2-40B4-BE49-F238E27FC236}">
+                  <a16:creationId xmlns:a16="http://schemas.microsoft.com/office/drawing/2014/main" id="{63E0683B-E582-4B0F-A8C9-1DAF411AF3E8}"/>
+                </a:ext>
+              </a:extLst>
+            </p:cNvPr>
+            <p:cNvSpPr txBox="1"/>
+            <p:nvPr/>
+          </p:nvSpPr>
+          <p:spPr bwMode="gray">
+            <a:xfrm>
+              <a:off x="1481505" y="1851670"/>
+              <a:ext cx="914400" cy="145244"/>
+            </a:xfrm>
+            <a:prstGeom prst="rect">
+              <a:avLst/>
+            </a:prstGeom>
+            <a:noFill/>
+          </p:spPr>
+          <p:txBody>
+            <a:bodyPr wrap="none" lIns="0" tIns="0" rIns="0" bIns="0" rtlCol="0">
+              <a:noAutofit/>
+            </a:bodyPr>
+            <a:lstStyle/>
+            <a:p>
+              <a:pPr algn="ctr">
+                <a:spcBef>
+                  <a:spcPts val="300"/>
+                </a:spcBef>
+                <a:spcAft>
+                  <a:spcPts val="300"/>
+                </a:spcAft>
+                <a:buClr>
+                  <a:schemeClr val="accent1"/>
+                </a:buClr>
+                <a:buSzPct val="90000"/>
+              </a:pPr>
+              <a:r>
+                <a:rPr lang="de-DE" sz="900" dirty="0"/>
+                <a:t>info of shop</a:t>
+              </a:r>
+              <a:endParaRPr lang="en-GB" sz="900" dirty="0" err="1"/>
+            </a:p>
+          </p:txBody>
+        </p:sp>
+      </p:grpSp>
+      <p:grpSp>
+        <p:nvGrpSpPr>
+          <p:cNvPr id="35" name="Group 34">
+            <a:extLst>
+              <a:ext uri="{FF2B5EF4-FFF2-40B4-BE49-F238E27FC236}">
+                <a16:creationId xmlns:a16="http://schemas.microsoft.com/office/drawing/2014/main" id="{3B74E9DC-CD09-43D2-AC97-170340275560}"/>
+              </a:ext>
+            </a:extLst>
+          </p:cNvPr>
+          <p:cNvGrpSpPr/>
+          <p:nvPr/>
+        </p:nvGrpSpPr>
+        <p:grpSpPr>
+          <a:xfrm>
+            <a:off x="1286577" y="3099013"/>
+            <a:ext cx="1512168" cy="145244"/>
+            <a:chOff x="1187624" y="1564432"/>
+            <a:chExt cx="1512168" cy="145244"/>
+          </a:xfrm>
+        </p:grpSpPr>
+        <p:cxnSp>
+          <p:nvCxnSpPr>
+            <p:cNvPr id="36" name="Straight Arrow Connector 35">
+              <a:extLst>
+                <a:ext uri="{FF2B5EF4-FFF2-40B4-BE49-F238E27FC236}">
+                  <a16:creationId xmlns:a16="http://schemas.microsoft.com/office/drawing/2014/main" id="{DD7669D6-79BC-46E8-9D5B-87C61024ACF2}"/>
+                </a:ext>
+              </a:extLst>
+            </p:cNvPr>
+            <p:cNvCxnSpPr>
+              <a:cxnSpLocks/>
+            </p:cNvCxnSpPr>
+            <p:nvPr/>
+          </p:nvCxnSpPr>
+          <p:spPr bwMode="gray">
+            <a:xfrm>
+              <a:off x="1187624" y="1707654"/>
+              <a:ext cx="1512168" cy="0"/>
+            </a:xfrm>
+            <a:prstGeom prst="straightConnector1">
+              <a:avLst/>
+            </a:prstGeom>
+            <a:ln>
+              <a:solidFill>
+                <a:schemeClr val="accent1"/>
+              </a:solidFill>
+              <a:tailEnd type="triangle"/>
+            </a:ln>
+          </p:spPr>
+          <p:style>
+            <a:lnRef idx="1">
+              <a:schemeClr val="accent1"/>
+            </a:lnRef>
+            <a:fillRef idx="0">
+              <a:schemeClr val="accent1"/>
+            </a:fillRef>
+            <a:effectRef idx="0">
+              <a:schemeClr val="accent1"/>
+            </a:effectRef>
+            <a:fontRef idx="minor">
+              <a:schemeClr val="tx1"/>
+            </a:fontRef>
+          </p:style>
+        </p:cxnSp>
+        <p:sp>
+          <p:nvSpPr>
+            <p:cNvPr id="37" name="TextBox 36">
+              <a:extLst>
+                <a:ext uri="{FF2B5EF4-FFF2-40B4-BE49-F238E27FC236}">
+                  <a16:creationId xmlns:a16="http://schemas.microsoft.com/office/drawing/2014/main" id="{B8794480-41A2-4E2A-9490-4B062C8D7C20}"/>
+                </a:ext>
+              </a:extLst>
+            </p:cNvPr>
+            <p:cNvSpPr txBox="1"/>
+            <p:nvPr/>
+          </p:nvSpPr>
+          <p:spPr bwMode="gray">
+            <a:xfrm>
+              <a:off x="1543760" y="1564432"/>
+              <a:ext cx="914400" cy="145244"/>
+            </a:xfrm>
+            <a:prstGeom prst="rect">
+              <a:avLst/>
+            </a:prstGeom>
+            <a:noFill/>
+          </p:spPr>
+          <p:txBody>
+            <a:bodyPr wrap="none" lIns="0" tIns="0" rIns="0" bIns="0" rtlCol="0">
+              <a:noAutofit/>
+            </a:bodyPr>
+            <a:lstStyle/>
+            <a:p>
+              <a:pPr>
+                <a:spcBef>
+                  <a:spcPts val="300"/>
+                </a:spcBef>
+                <a:spcAft>
+                  <a:spcPts val="300"/>
+                </a:spcAft>
+                <a:buClr>
+                  <a:schemeClr val="accent1"/>
+                </a:buClr>
+                <a:buSzPct val="90000"/>
+              </a:pPr>
+              <a:r>
+                <a:rPr lang="de-DE" sz="900" dirty="0"/>
+                <a:t>get #issues</a:t>
+              </a:r>
+              <a:endParaRPr lang="en-GB" sz="900" dirty="0" err="1"/>
+            </a:p>
+          </p:txBody>
+        </p:sp>
+      </p:grpSp>
+      <p:grpSp>
+        <p:nvGrpSpPr>
+          <p:cNvPr id="39" name="Group 38">
+            <a:extLst>
+              <a:ext uri="{FF2B5EF4-FFF2-40B4-BE49-F238E27FC236}">
+                <a16:creationId xmlns:a16="http://schemas.microsoft.com/office/drawing/2014/main" id="{46268BD6-2684-4D89-8FB3-423AE9987B0B}"/>
+              </a:ext>
+            </a:extLst>
+          </p:cNvPr>
+          <p:cNvGrpSpPr/>
+          <p:nvPr/>
+        </p:nvGrpSpPr>
+        <p:grpSpPr>
+          <a:xfrm>
+            <a:off x="1282926" y="3428847"/>
+            <a:ext cx="1512169" cy="145244"/>
+            <a:chOff x="1187624" y="1851670"/>
+            <a:chExt cx="1512169" cy="145244"/>
+          </a:xfrm>
+        </p:grpSpPr>
+        <p:cxnSp>
+          <p:nvCxnSpPr>
+            <p:cNvPr id="40" name="Straight Arrow Connector 39">
+              <a:extLst>
+                <a:ext uri="{FF2B5EF4-FFF2-40B4-BE49-F238E27FC236}">
+                  <a16:creationId xmlns:a16="http://schemas.microsoft.com/office/drawing/2014/main" id="{EB8E1008-5E4D-40A5-89AB-C98A95A64D32}"/>
+                </a:ext>
+              </a:extLst>
+            </p:cNvPr>
+            <p:cNvCxnSpPr>
+              <a:cxnSpLocks/>
+            </p:cNvCxnSpPr>
+            <p:nvPr/>
+          </p:nvCxnSpPr>
+          <p:spPr bwMode="gray">
+            <a:xfrm flipH="1">
+              <a:off x="1187624" y="1985548"/>
+              <a:ext cx="1512169" cy="0"/>
+            </a:xfrm>
+            <a:prstGeom prst="straightConnector1">
+              <a:avLst/>
+            </a:prstGeom>
+            <a:ln>
+              <a:solidFill>
+                <a:schemeClr val="accent1"/>
+              </a:solidFill>
+              <a:prstDash val="sysDash"/>
+              <a:headEnd type="none" w="med" len="med"/>
+              <a:tailEnd type="arrow" w="med" len="med"/>
+            </a:ln>
+          </p:spPr>
+          <p:style>
+            <a:lnRef idx="1">
+              <a:schemeClr val="accent1"/>
+            </a:lnRef>
+            <a:fillRef idx="0">
+              <a:schemeClr val="accent1"/>
+            </a:fillRef>
+            <a:effectRef idx="0">
+              <a:schemeClr val="accent1"/>
+            </a:effectRef>
+            <a:fontRef idx="minor">
+              <a:schemeClr val="tx1"/>
+            </a:fontRef>
+          </p:style>
+        </p:cxnSp>
+        <p:sp>
+          <p:nvSpPr>
+            <p:cNvPr id="41" name="TextBox 40">
+              <a:extLst>
+                <a:ext uri="{FF2B5EF4-FFF2-40B4-BE49-F238E27FC236}">
+                  <a16:creationId xmlns:a16="http://schemas.microsoft.com/office/drawing/2014/main" id="{8DEFF64D-0AA4-442B-9F83-77D58A99C8AE}"/>
+                </a:ext>
+              </a:extLst>
+            </p:cNvPr>
+            <p:cNvSpPr txBox="1"/>
+            <p:nvPr/>
+          </p:nvSpPr>
+          <p:spPr bwMode="gray">
+            <a:xfrm>
+              <a:off x="1481505" y="1851670"/>
+              <a:ext cx="914400" cy="145244"/>
+            </a:xfrm>
+            <a:prstGeom prst="rect">
+              <a:avLst/>
+            </a:prstGeom>
+            <a:noFill/>
+          </p:spPr>
+          <p:txBody>
+            <a:bodyPr wrap="none" lIns="0" tIns="0" rIns="0" bIns="0" rtlCol="0">
+              <a:noAutofit/>
+            </a:bodyPr>
+            <a:lstStyle/>
+            <a:p>
+              <a:pPr algn="ctr">
+                <a:spcBef>
+                  <a:spcPts val="300"/>
+                </a:spcBef>
+                <a:spcAft>
+                  <a:spcPts val="300"/>
+                </a:spcAft>
+                <a:buClr>
+                  <a:schemeClr val="accent1"/>
+                </a:buClr>
+                <a:buSzPct val="90000"/>
+              </a:pPr>
+              <a:r>
+                <a:rPr lang="de-DE" sz="900" dirty="0"/>
+                <a:t>#issues</a:t>
+              </a:r>
+              <a:endParaRPr lang="en-GB" sz="900" dirty="0" err="1"/>
+            </a:p>
+          </p:txBody>
+        </p:sp>
+      </p:grpSp>
+      <p:grpSp>
+        <p:nvGrpSpPr>
+          <p:cNvPr id="42" name="Group 41">
+            <a:extLst>
+              <a:ext uri="{FF2B5EF4-FFF2-40B4-BE49-F238E27FC236}">
+                <a16:creationId xmlns:a16="http://schemas.microsoft.com/office/drawing/2014/main" id="{70C805DB-3827-4C6D-ABC1-BB16784F6B39}"/>
+              </a:ext>
+            </a:extLst>
+          </p:cNvPr>
+          <p:cNvGrpSpPr/>
+          <p:nvPr/>
+        </p:nvGrpSpPr>
+        <p:grpSpPr>
+          <a:xfrm>
+            <a:off x="1277924" y="3736360"/>
+            <a:ext cx="1512168" cy="156199"/>
+            <a:chOff x="1187624" y="1551455"/>
+            <a:chExt cx="1512168" cy="156199"/>
+          </a:xfrm>
+        </p:grpSpPr>
+        <p:cxnSp>
+          <p:nvCxnSpPr>
+            <p:cNvPr id="43" name="Straight Arrow Connector 42">
+              <a:extLst>
+                <a:ext uri="{FF2B5EF4-FFF2-40B4-BE49-F238E27FC236}">
+                  <a16:creationId xmlns:a16="http://schemas.microsoft.com/office/drawing/2014/main" id="{C1C9863A-F445-4BDB-87DD-8CB9D0EF140A}"/>
+                </a:ext>
+              </a:extLst>
+            </p:cNvPr>
+            <p:cNvCxnSpPr>
+              <a:cxnSpLocks/>
+            </p:cNvCxnSpPr>
+            <p:nvPr/>
+          </p:nvCxnSpPr>
+          <p:spPr bwMode="gray">
+            <a:xfrm>
+              <a:off x="1187624" y="1707654"/>
+              <a:ext cx="1512168" cy="0"/>
+            </a:xfrm>
+            <a:prstGeom prst="straightConnector1">
+              <a:avLst/>
+            </a:prstGeom>
+            <a:ln>
+              <a:solidFill>
+                <a:schemeClr val="accent1"/>
+              </a:solidFill>
+              <a:tailEnd type="triangle"/>
+            </a:ln>
+          </p:spPr>
+          <p:style>
+            <a:lnRef idx="1">
+              <a:schemeClr val="accent1"/>
+            </a:lnRef>
+            <a:fillRef idx="0">
+              <a:schemeClr val="accent1"/>
+            </a:fillRef>
+            <a:effectRef idx="0">
+              <a:schemeClr val="accent1"/>
+            </a:effectRef>
+            <a:fontRef idx="minor">
+              <a:schemeClr val="tx1"/>
+            </a:fontRef>
+          </p:style>
+        </p:cxnSp>
+        <p:sp>
+          <p:nvSpPr>
+            <p:cNvPr id="44" name="TextBox 43">
+              <a:extLst>
+                <a:ext uri="{FF2B5EF4-FFF2-40B4-BE49-F238E27FC236}">
+                  <a16:creationId xmlns:a16="http://schemas.microsoft.com/office/drawing/2014/main" id="{FB5BA8B1-A446-4713-95B3-2DE259FD11D7}"/>
+                </a:ext>
+              </a:extLst>
+            </p:cNvPr>
+            <p:cNvSpPr txBox="1"/>
+            <p:nvPr/>
+          </p:nvSpPr>
+          <p:spPr bwMode="gray">
+            <a:xfrm>
+              <a:off x="1224168" y="1551455"/>
+              <a:ext cx="914400" cy="145244"/>
+            </a:xfrm>
+            <a:prstGeom prst="rect">
+              <a:avLst/>
+            </a:prstGeom>
+            <a:noFill/>
+          </p:spPr>
+          <p:txBody>
+            <a:bodyPr wrap="none" lIns="0" tIns="0" rIns="0" bIns="0" rtlCol="0">
+              <a:noAutofit/>
+            </a:bodyPr>
+            <a:lstStyle/>
+            <a:p>
+              <a:pPr>
+                <a:spcBef>
+                  <a:spcPts val="300"/>
+                </a:spcBef>
+                <a:spcAft>
+                  <a:spcPts val="300"/>
+                </a:spcAft>
+                <a:buClr>
+                  <a:schemeClr val="accent1"/>
+                </a:buClr>
+                <a:buSzPct val="90000"/>
+              </a:pPr>
+              <a:r>
+                <a:rPr lang="de-DE" sz="900" dirty="0"/>
+                <a:t>request each issue seperately</a:t>
+              </a:r>
+              <a:endParaRPr lang="en-GB" sz="900" dirty="0" err="1"/>
+            </a:p>
+          </p:txBody>
+        </p:sp>
+      </p:grpSp>
+      <p:grpSp>
+        <p:nvGrpSpPr>
+          <p:cNvPr id="46" name="Group 45">
+            <a:extLst>
+              <a:ext uri="{FF2B5EF4-FFF2-40B4-BE49-F238E27FC236}">
+                <a16:creationId xmlns:a16="http://schemas.microsoft.com/office/drawing/2014/main" id="{EDAD0421-36E3-48B9-BC9E-9FFFD29A6F16}"/>
+              </a:ext>
+            </a:extLst>
+          </p:cNvPr>
+          <p:cNvGrpSpPr/>
+          <p:nvPr/>
+        </p:nvGrpSpPr>
+        <p:grpSpPr>
+          <a:xfrm>
+            <a:off x="1274273" y="4079171"/>
+            <a:ext cx="1512169" cy="145244"/>
+            <a:chOff x="1187624" y="1851670"/>
+            <a:chExt cx="1512169" cy="145244"/>
+          </a:xfrm>
+        </p:grpSpPr>
+        <p:cxnSp>
+          <p:nvCxnSpPr>
+            <p:cNvPr id="47" name="Straight Arrow Connector 46">
+              <a:extLst>
+                <a:ext uri="{FF2B5EF4-FFF2-40B4-BE49-F238E27FC236}">
+                  <a16:creationId xmlns:a16="http://schemas.microsoft.com/office/drawing/2014/main" id="{9A86AE5D-D84F-413A-93E4-C54EC32A6E4A}"/>
+                </a:ext>
+              </a:extLst>
+            </p:cNvPr>
+            <p:cNvCxnSpPr>
+              <a:cxnSpLocks/>
+            </p:cNvCxnSpPr>
+            <p:nvPr/>
+          </p:nvCxnSpPr>
+          <p:spPr bwMode="gray">
+            <a:xfrm flipH="1">
+              <a:off x="1187624" y="1985548"/>
+              <a:ext cx="1512169" cy="0"/>
+            </a:xfrm>
+            <a:prstGeom prst="straightConnector1">
+              <a:avLst/>
+            </a:prstGeom>
+            <a:ln>
+              <a:solidFill>
+                <a:schemeClr val="accent1"/>
+              </a:solidFill>
+              <a:prstDash val="sysDash"/>
+              <a:headEnd type="none" w="med" len="med"/>
+              <a:tailEnd type="arrow" w="med" len="med"/>
+            </a:ln>
+          </p:spPr>
+          <p:style>
+            <a:lnRef idx="1">
+              <a:schemeClr val="accent1"/>
+            </a:lnRef>
+            <a:fillRef idx="0">
+              <a:schemeClr val="accent1"/>
+            </a:fillRef>
+            <a:effectRef idx="0">
+              <a:schemeClr val="accent1"/>
+            </a:effectRef>
+            <a:fontRef idx="minor">
+              <a:schemeClr val="tx1"/>
+            </a:fontRef>
+          </p:style>
+        </p:cxnSp>
+        <p:sp>
+          <p:nvSpPr>
+            <p:cNvPr id="48" name="TextBox 47">
+              <a:extLst>
+                <a:ext uri="{FF2B5EF4-FFF2-40B4-BE49-F238E27FC236}">
+                  <a16:creationId xmlns:a16="http://schemas.microsoft.com/office/drawing/2014/main" id="{AE089945-220F-4BE4-B6BC-9F326ECCAC54}"/>
+                </a:ext>
+              </a:extLst>
+            </p:cNvPr>
+            <p:cNvSpPr txBox="1"/>
+            <p:nvPr/>
+          </p:nvSpPr>
+          <p:spPr bwMode="gray">
+            <a:xfrm>
+              <a:off x="1481505" y="1851670"/>
+              <a:ext cx="914400" cy="145244"/>
+            </a:xfrm>
+            <a:prstGeom prst="rect">
+              <a:avLst/>
+            </a:prstGeom>
+            <a:noFill/>
+          </p:spPr>
+          <p:txBody>
+            <a:bodyPr wrap="none" lIns="0" tIns="0" rIns="0" bIns="0" rtlCol="0">
+              <a:noAutofit/>
+            </a:bodyPr>
+            <a:lstStyle/>
+            <a:p>
+              <a:pPr algn="ctr">
+                <a:spcBef>
+                  <a:spcPts val="300"/>
+                </a:spcBef>
+                <a:spcAft>
+                  <a:spcPts val="300"/>
+                </a:spcAft>
+                <a:buClr>
+                  <a:schemeClr val="accent1"/>
+                </a:buClr>
+                <a:buSzPct val="90000"/>
+              </a:pPr>
+              <a:r>
+                <a:rPr lang="de-DE" sz="900" dirty="0"/>
+                <a:t>issue</a:t>
+              </a:r>
+              <a:endParaRPr lang="en-GB" sz="900" dirty="0" err="1"/>
+            </a:p>
+          </p:txBody>
+        </p:sp>
+      </p:grpSp>
+      <p:grpSp>
+        <p:nvGrpSpPr>
+          <p:cNvPr id="49" name="Group 48">
+            <a:extLst>
+              <a:ext uri="{FF2B5EF4-FFF2-40B4-BE49-F238E27FC236}">
+                <a16:creationId xmlns:a16="http://schemas.microsoft.com/office/drawing/2014/main" id="{3CCA90EB-9887-45DC-B1B7-C399A05E2C9C}"/>
+              </a:ext>
+            </a:extLst>
+          </p:cNvPr>
+          <p:cNvGrpSpPr/>
+          <p:nvPr/>
+        </p:nvGrpSpPr>
+        <p:grpSpPr>
+          <a:xfrm>
+            <a:off x="1274273" y="4431869"/>
+            <a:ext cx="1512168" cy="156199"/>
+            <a:chOff x="1187624" y="1551455"/>
+            <a:chExt cx="1512168" cy="156199"/>
+          </a:xfrm>
+        </p:grpSpPr>
+        <p:cxnSp>
+          <p:nvCxnSpPr>
+            <p:cNvPr id="50" name="Straight Arrow Connector 49">
+              <a:extLst>
+                <a:ext uri="{FF2B5EF4-FFF2-40B4-BE49-F238E27FC236}">
+                  <a16:creationId xmlns:a16="http://schemas.microsoft.com/office/drawing/2014/main" id="{EA454B56-109E-42F7-A4E6-55487C2B6DF9}"/>
+                </a:ext>
+              </a:extLst>
+            </p:cNvPr>
+            <p:cNvCxnSpPr>
+              <a:cxnSpLocks/>
+            </p:cNvCxnSpPr>
+            <p:nvPr/>
+          </p:nvCxnSpPr>
+          <p:spPr bwMode="gray">
+            <a:xfrm>
+              <a:off x="1187624" y="1707654"/>
+              <a:ext cx="1512168" cy="0"/>
+            </a:xfrm>
+            <a:prstGeom prst="straightConnector1">
+              <a:avLst/>
+            </a:prstGeom>
+            <a:ln>
+              <a:solidFill>
+                <a:schemeClr val="accent1"/>
+              </a:solidFill>
+              <a:tailEnd type="triangle"/>
+            </a:ln>
+          </p:spPr>
+          <p:style>
+            <a:lnRef idx="1">
+              <a:schemeClr val="accent1"/>
+            </a:lnRef>
+            <a:fillRef idx="0">
+              <a:schemeClr val="accent1"/>
+            </a:fillRef>
+            <a:effectRef idx="0">
+              <a:schemeClr val="accent1"/>
+            </a:effectRef>
+            <a:fontRef idx="minor">
+              <a:schemeClr val="tx1"/>
+            </a:fontRef>
+          </p:style>
+        </p:cxnSp>
+        <p:sp>
+          <p:nvSpPr>
+            <p:cNvPr id="51" name="TextBox 50">
+              <a:extLst>
+                <a:ext uri="{FF2B5EF4-FFF2-40B4-BE49-F238E27FC236}">
+                  <a16:creationId xmlns:a16="http://schemas.microsoft.com/office/drawing/2014/main" id="{17444FED-ED8F-4B55-AC4A-FBC6350D1245}"/>
+                </a:ext>
+              </a:extLst>
+            </p:cNvPr>
+            <p:cNvSpPr txBox="1"/>
+            <p:nvPr/>
+          </p:nvSpPr>
+          <p:spPr bwMode="gray">
+            <a:xfrm>
+              <a:off x="1224168" y="1551455"/>
+              <a:ext cx="914400" cy="145244"/>
+            </a:xfrm>
+            <a:prstGeom prst="rect">
+              <a:avLst/>
+            </a:prstGeom>
+            <a:noFill/>
+          </p:spPr>
+          <p:txBody>
+            <a:bodyPr wrap="none" lIns="0" tIns="0" rIns="0" bIns="0" rtlCol="0">
+              <a:noAutofit/>
+            </a:bodyPr>
+            <a:lstStyle/>
+            <a:p>
+              <a:pPr>
+                <a:spcBef>
+                  <a:spcPts val="300"/>
+                </a:spcBef>
+                <a:spcAft>
+                  <a:spcPts val="300"/>
+                </a:spcAft>
+                <a:buClr>
+                  <a:schemeClr val="accent1"/>
+                </a:buClr>
+                <a:buSzPct val="90000"/>
+              </a:pPr>
+              <a:r>
+                <a:rPr lang="de-DE" sz="900" dirty="0"/>
+                <a:t>send fix for each issue seperately</a:t>
+              </a:r>
+              <a:endParaRPr lang="en-GB" sz="900" dirty="0" err="1"/>
+            </a:p>
+          </p:txBody>
+        </p:sp>
+      </p:grpSp>
+      <p:grpSp>
+        <p:nvGrpSpPr>
+          <p:cNvPr id="56" name="Group 55">
+            <a:extLst>
+              <a:ext uri="{FF2B5EF4-FFF2-40B4-BE49-F238E27FC236}">
+                <a16:creationId xmlns:a16="http://schemas.microsoft.com/office/drawing/2014/main" id="{F3F09A5A-5F95-42A7-96B7-C9E4D62AB7FC}"/>
+              </a:ext>
+            </a:extLst>
+          </p:cNvPr>
+          <p:cNvGrpSpPr/>
+          <p:nvPr/>
+        </p:nvGrpSpPr>
+        <p:grpSpPr>
+          <a:xfrm>
+            <a:off x="1285191" y="4757729"/>
+            <a:ext cx="1512168" cy="145244"/>
+            <a:chOff x="1187624" y="1564432"/>
+            <a:chExt cx="1512168" cy="145244"/>
+          </a:xfrm>
+        </p:grpSpPr>
+        <p:cxnSp>
+          <p:nvCxnSpPr>
+            <p:cNvPr id="57" name="Straight Arrow Connector 56">
+              <a:extLst>
+                <a:ext uri="{FF2B5EF4-FFF2-40B4-BE49-F238E27FC236}">
+                  <a16:creationId xmlns:a16="http://schemas.microsoft.com/office/drawing/2014/main" id="{044375D0-6169-42B3-BF3E-43E1C9C27532}"/>
+                </a:ext>
+              </a:extLst>
+            </p:cNvPr>
+            <p:cNvCxnSpPr>
+              <a:cxnSpLocks/>
+            </p:cNvCxnSpPr>
+            <p:nvPr/>
+          </p:nvCxnSpPr>
+          <p:spPr bwMode="gray">
+            <a:xfrm>
+              <a:off x="1187624" y="1707654"/>
+              <a:ext cx="1512168" cy="0"/>
+            </a:xfrm>
+            <a:prstGeom prst="straightConnector1">
+              <a:avLst/>
+            </a:prstGeom>
+            <a:ln>
+              <a:solidFill>
+                <a:schemeClr val="accent1"/>
+              </a:solidFill>
+              <a:tailEnd type="triangle"/>
+            </a:ln>
+          </p:spPr>
+          <p:style>
+            <a:lnRef idx="1">
+              <a:schemeClr val="accent1"/>
+            </a:lnRef>
+            <a:fillRef idx="0">
+              <a:schemeClr val="accent1"/>
+            </a:fillRef>
+            <a:effectRef idx="0">
+              <a:schemeClr val="accent1"/>
+            </a:effectRef>
+            <a:fontRef idx="minor">
+              <a:schemeClr val="tx1"/>
+            </a:fontRef>
+          </p:style>
+        </p:cxnSp>
+        <p:sp>
+          <p:nvSpPr>
+            <p:cNvPr id="58" name="TextBox 57">
+              <a:extLst>
+                <a:ext uri="{FF2B5EF4-FFF2-40B4-BE49-F238E27FC236}">
+                  <a16:creationId xmlns:a16="http://schemas.microsoft.com/office/drawing/2014/main" id="{2CBC1DE7-4CE4-40E8-B2C3-7ABB03B9FAF9}"/>
+                </a:ext>
+              </a:extLst>
+            </p:cNvPr>
+            <p:cNvSpPr txBox="1"/>
+            <p:nvPr/>
+          </p:nvSpPr>
+          <p:spPr bwMode="gray">
+            <a:xfrm>
+              <a:off x="1388724" y="1564432"/>
+              <a:ext cx="914400" cy="145244"/>
+            </a:xfrm>
+            <a:prstGeom prst="rect">
+              <a:avLst/>
+            </a:prstGeom>
+            <a:noFill/>
+          </p:spPr>
+          <p:txBody>
+            <a:bodyPr wrap="none" lIns="0" tIns="0" rIns="0" bIns="0" rtlCol="0">
+              <a:noAutofit/>
+            </a:bodyPr>
+            <a:lstStyle/>
+            <a:p>
+              <a:pPr>
+                <a:spcBef>
+                  <a:spcPts val="300"/>
+                </a:spcBef>
+                <a:spcAft>
+                  <a:spcPts val="300"/>
+                </a:spcAft>
+                <a:buClr>
+                  <a:schemeClr val="accent1"/>
+                </a:buClr>
+                <a:buSzPct val="90000"/>
+              </a:pPr>
+              <a:r>
+                <a:rPr lang="de-DE" sz="900" dirty="0"/>
+                <a:t>send actual fix order</a:t>
+              </a:r>
+              <a:endParaRPr lang="en-GB" sz="900" dirty="0" err="1"/>
+            </a:p>
+          </p:txBody>
+        </p:sp>
+      </p:grpSp>
+      <p:sp>
+        <p:nvSpPr>
+          <p:cNvPr id="64" name="TextBox 63">
+            <a:extLst>
+              <a:ext uri="{FF2B5EF4-FFF2-40B4-BE49-F238E27FC236}">
+                <a16:creationId xmlns:a16="http://schemas.microsoft.com/office/drawing/2014/main" id="{525B54F3-DDB0-4FDE-BA9A-52E2459D484A}"/>
+              </a:ext>
+            </a:extLst>
+          </p:cNvPr>
+          <p:cNvSpPr txBox="1"/>
+          <p:nvPr/>
+        </p:nvSpPr>
+        <p:spPr bwMode="gray">
+          <a:xfrm>
+            <a:off x="4213280" y="1608431"/>
+            <a:ext cx="1368152" cy="213506"/>
+          </a:xfrm>
+          <a:prstGeom prst="rect">
+            <a:avLst/>
+          </a:prstGeom>
+          <a:noFill/>
+        </p:spPr>
+        <p:txBody>
+          <a:bodyPr wrap="none" lIns="0" tIns="0" rIns="0" bIns="0" rtlCol="0">
+            <a:noAutofit/>
+          </a:bodyPr>
+          <a:lstStyle/>
+          <a:p>
+            <a:pPr algn="ctr">
+              <a:spcBef>
+                <a:spcPts val="300"/>
+              </a:spcBef>
+              <a:spcAft>
+                <a:spcPts val="300"/>
+              </a:spcAft>
+              <a:buClr>
+                <a:schemeClr val="accent1"/>
+              </a:buClr>
+              <a:buSzPct val="90000"/>
+            </a:pPr>
+            <a:r>
+              <a:rPr lang="de-DE" sz="1200" dirty="0"/>
+              <a:t>python controller</a:t>
+            </a:r>
+            <a:endParaRPr lang="en-GB" sz="1200" dirty="0" err="1"/>
+          </a:p>
+        </p:txBody>
+      </p:sp>
+      <p:sp>
+        <p:nvSpPr>
+          <p:cNvPr id="66" name="TextBox 65">
+            <a:extLst>
+              <a:ext uri="{FF2B5EF4-FFF2-40B4-BE49-F238E27FC236}">
+                <a16:creationId xmlns:a16="http://schemas.microsoft.com/office/drawing/2014/main" id="{1D0FDC2F-5D31-422F-B912-5EEF60904DFB}"/>
+              </a:ext>
+            </a:extLst>
+          </p:cNvPr>
+          <p:cNvSpPr txBox="1"/>
+          <p:nvPr/>
+        </p:nvSpPr>
+        <p:spPr bwMode="gray">
+          <a:xfrm>
+            <a:off x="6157496" y="1643176"/>
+            <a:ext cx="1368152" cy="213506"/>
+          </a:xfrm>
+          <a:prstGeom prst="rect">
+            <a:avLst/>
+          </a:prstGeom>
+          <a:noFill/>
+        </p:spPr>
+        <p:txBody>
+          <a:bodyPr wrap="none" lIns="0" tIns="0" rIns="0" bIns="0" rtlCol="0">
+            <a:noAutofit/>
+          </a:bodyPr>
+          <a:lstStyle/>
+          <a:p>
+            <a:pPr algn="ctr">
+              <a:spcBef>
+                <a:spcPts val="300"/>
+              </a:spcBef>
+              <a:spcAft>
+                <a:spcPts val="300"/>
+              </a:spcAft>
+              <a:buClr>
+                <a:schemeClr val="accent1"/>
+              </a:buClr>
+              <a:buSzPct val="90000"/>
+            </a:pPr>
+            <a:r>
+              <a:rPr lang="de-DE" sz="1200" dirty="0"/>
+              <a:t>mRubis</a:t>
+            </a:r>
+            <a:endParaRPr lang="en-GB" sz="1200" dirty="0" err="1"/>
+          </a:p>
+        </p:txBody>
+      </p:sp>
+      <p:grpSp>
+        <p:nvGrpSpPr>
+          <p:cNvPr id="67" name="Group 66">
+            <a:extLst>
+              <a:ext uri="{FF2B5EF4-FFF2-40B4-BE49-F238E27FC236}">
+                <a16:creationId xmlns:a16="http://schemas.microsoft.com/office/drawing/2014/main" id="{8A863181-0C36-4438-83AB-A9D1D21B5613}"/>
+              </a:ext>
+            </a:extLst>
+          </p:cNvPr>
+          <p:cNvGrpSpPr/>
+          <p:nvPr/>
+        </p:nvGrpSpPr>
+        <p:grpSpPr>
+          <a:xfrm>
+            <a:off x="5113380" y="1820709"/>
+            <a:ext cx="1512168" cy="145244"/>
+            <a:chOff x="1187624" y="1562410"/>
+            <a:chExt cx="1512168" cy="145244"/>
+          </a:xfrm>
+        </p:grpSpPr>
+        <p:cxnSp>
+          <p:nvCxnSpPr>
+            <p:cNvPr id="68" name="Straight Arrow Connector 67">
+              <a:extLst>
+                <a:ext uri="{FF2B5EF4-FFF2-40B4-BE49-F238E27FC236}">
+                  <a16:creationId xmlns:a16="http://schemas.microsoft.com/office/drawing/2014/main" id="{5B13B658-4C67-4B8A-974C-DBD244D1F11E}"/>
+                </a:ext>
+              </a:extLst>
+            </p:cNvPr>
+            <p:cNvCxnSpPr>
+              <a:cxnSpLocks/>
+            </p:cNvCxnSpPr>
+            <p:nvPr/>
+          </p:nvCxnSpPr>
+          <p:spPr bwMode="gray">
+            <a:xfrm>
+              <a:off x="1187624" y="1707654"/>
+              <a:ext cx="1512168" cy="0"/>
+            </a:xfrm>
+            <a:prstGeom prst="straightConnector1">
+              <a:avLst/>
+            </a:prstGeom>
+            <a:ln>
+              <a:solidFill>
+                <a:schemeClr val="accent1"/>
+              </a:solidFill>
+              <a:tailEnd type="triangle"/>
+            </a:ln>
+          </p:spPr>
+          <p:style>
+            <a:lnRef idx="1">
+              <a:schemeClr val="accent1"/>
+            </a:lnRef>
+            <a:fillRef idx="0">
+              <a:schemeClr val="accent1"/>
+            </a:fillRef>
+            <a:effectRef idx="0">
+              <a:schemeClr val="accent1"/>
+            </a:effectRef>
+            <a:fontRef idx="minor">
+              <a:schemeClr val="tx1"/>
+            </a:fontRef>
+          </p:style>
+        </p:cxnSp>
+        <p:sp>
+          <p:nvSpPr>
+            <p:cNvPr id="69" name="TextBox 68">
+              <a:extLst>
+                <a:ext uri="{FF2B5EF4-FFF2-40B4-BE49-F238E27FC236}">
+                  <a16:creationId xmlns:a16="http://schemas.microsoft.com/office/drawing/2014/main" id="{3FA1D3DA-EF5A-4B79-9540-4E5120EFE64E}"/>
+                </a:ext>
+              </a:extLst>
+            </p:cNvPr>
+            <p:cNvSpPr txBox="1"/>
+            <p:nvPr/>
+          </p:nvSpPr>
+          <p:spPr bwMode="gray">
+            <a:xfrm>
+              <a:off x="1544216" y="1562410"/>
+              <a:ext cx="914400" cy="145244"/>
+            </a:xfrm>
+            <a:prstGeom prst="rect">
+              <a:avLst/>
+            </a:prstGeom>
+            <a:noFill/>
+          </p:spPr>
+          <p:txBody>
+            <a:bodyPr wrap="none" lIns="0" tIns="0" rIns="0" bIns="0" rtlCol="0">
+              <a:noAutofit/>
+            </a:bodyPr>
+            <a:lstStyle/>
+            <a:p>
+              <a:pPr>
+                <a:spcBef>
+                  <a:spcPts val="300"/>
+                </a:spcBef>
+                <a:spcAft>
+                  <a:spcPts val="300"/>
+                </a:spcAft>
+                <a:buClr>
+                  <a:schemeClr val="accent1"/>
+                </a:buClr>
+                <a:buSzPct val="90000"/>
+              </a:pPr>
+              <a:r>
+                <a:rPr lang="de-DE" sz="900" dirty="0"/>
+                <a:t>get all issues</a:t>
+              </a:r>
+              <a:endParaRPr lang="en-GB" sz="900" dirty="0" err="1"/>
+            </a:p>
+          </p:txBody>
+        </p:sp>
+      </p:grpSp>
+      <p:grpSp>
+        <p:nvGrpSpPr>
+          <p:cNvPr id="70" name="Group 69">
+            <a:extLst>
+              <a:ext uri="{FF2B5EF4-FFF2-40B4-BE49-F238E27FC236}">
+                <a16:creationId xmlns:a16="http://schemas.microsoft.com/office/drawing/2014/main" id="{AF448E4F-DF3A-4831-86C3-AE901DF390D4}"/>
+              </a:ext>
+            </a:extLst>
+          </p:cNvPr>
+          <p:cNvGrpSpPr/>
+          <p:nvPr/>
+        </p:nvGrpSpPr>
+        <p:grpSpPr>
+          <a:xfrm>
+            <a:off x="5113380" y="2109969"/>
+            <a:ext cx="1512169" cy="145244"/>
+            <a:chOff x="1187624" y="1851670"/>
+            <a:chExt cx="1512169" cy="145244"/>
+          </a:xfrm>
+        </p:grpSpPr>
+        <p:cxnSp>
+          <p:nvCxnSpPr>
+            <p:cNvPr id="71" name="Straight Arrow Connector 70">
+              <a:extLst>
+                <a:ext uri="{FF2B5EF4-FFF2-40B4-BE49-F238E27FC236}">
+                  <a16:creationId xmlns:a16="http://schemas.microsoft.com/office/drawing/2014/main" id="{B96BE677-FBCA-475C-85FA-6D5B1DD0CA87}"/>
+                </a:ext>
+              </a:extLst>
+            </p:cNvPr>
+            <p:cNvCxnSpPr>
+              <a:cxnSpLocks/>
+            </p:cNvCxnSpPr>
+            <p:nvPr/>
+          </p:nvCxnSpPr>
+          <p:spPr bwMode="gray">
+            <a:xfrm flipH="1">
+              <a:off x="1187624" y="1985548"/>
+              <a:ext cx="1512169" cy="0"/>
+            </a:xfrm>
+            <a:prstGeom prst="straightConnector1">
+              <a:avLst/>
+            </a:prstGeom>
+            <a:ln>
+              <a:solidFill>
+                <a:schemeClr val="accent1"/>
+              </a:solidFill>
+              <a:prstDash val="sysDash"/>
+              <a:headEnd type="none" w="med" len="med"/>
+              <a:tailEnd type="arrow" w="med" len="med"/>
+            </a:ln>
+          </p:spPr>
+          <p:style>
+            <a:lnRef idx="1">
+              <a:schemeClr val="accent1"/>
+            </a:lnRef>
+            <a:fillRef idx="0">
+              <a:schemeClr val="accent1"/>
+            </a:fillRef>
+            <a:effectRef idx="0">
+              <a:schemeClr val="accent1"/>
+            </a:effectRef>
+            <a:fontRef idx="minor">
+              <a:schemeClr val="tx1"/>
+            </a:fontRef>
+          </p:style>
+        </p:cxnSp>
+        <p:sp>
+          <p:nvSpPr>
+            <p:cNvPr id="72" name="TextBox 71">
+              <a:extLst>
+                <a:ext uri="{FF2B5EF4-FFF2-40B4-BE49-F238E27FC236}">
+                  <a16:creationId xmlns:a16="http://schemas.microsoft.com/office/drawing/2014/main" id="{D09510AE-91C3-494F-8C8B-FC7E75B86C69}"/>
+                </a:ext>
+              </a:extLst>
+            </p:cNvPr>
+            <p:cNvSpPr txBox="1"/>
+            <p:nvPr/>
+          </p:nvSpPr>
+          <p:spPr bwMode="gray">
+            <a:xfrm>
+              <a:off x="1481505" y="1851670"/>
+              <a:ext cx="914400" cy="145244"/>
+            </a:xfrm>
+            <a:prstGeom prst="rect">
+              <a:avLst/>
+            </a:prstGeom>
+            <a:noFill/>
+          </p:spPr>
+          <p:txBody>
+            <a:bodyPr wrap="none" lIns="0" tIns="0" rIns="0" bIns="0" rtlCol="0">
+              <a:noAutofit/>
+            </a:bodyPr>
+            <a:lstStyle/>
+            <a:p>
+              <a:pPr algn="ctr">
+                <a:spcBef>
+                  <a:spcPts val="300"/>
+                </a:spcBef>
+                <a:spcAft>
+                  <a:spcPts val="300"/>
+                </a:spcAft>
+                <a:buClr>
+                  <a:schemeClr val="accent1"/>
+                </a:buClr>
+                <a:buSzPct val="90000"/>
+              </a:pPr>
+              <a:r>
+                <a:rPr lang="de-DE" sz="900" dirty="0"/>
+                <a:t>all issues</a:t>
+              </a:r>
+              <a:endParaRPr lang="en-GB" sz="900" dirty="0" err="1"/>
+            </a:p>
+          </p:txBody>
+        </p:sp>
+      </p:grpSp>
+      <p:grpSp>
+        <p:nvGrpSpPr>
+          <p:cNvPr id="73" name="Group 72">
+            <a:extLst>
+              <a:ext uri="{FF2B5EF4-FFF2-40B4-BE49-F238E27FC236}">
+                <a16:creationId xmlns:a16="http://schemas.microsoft.com/office/drawing/2014/main" id="{71211777-BF76-43CE-84B6-3E2474E1DD6D}"/>
+              </a:ext>
+            </a:extLst>
+          </p:cNvPr>
+          <p:cNvGrpSpPr/>
+          <p:nvPr/>
+        </p:nvGrpSpPr>
+        <p:grpSpPr>
+          <a:xfrm>
+            <a:off x="5108377" y="2445989"/>
+            <a:ext cx="1512168" cy="156609"/>
+            <a:chOff x="1187624" y="1551045"/>
+            <a:chExt cx="1512168" cy="156609"/>
+          </a:xfrm>
+        </p:grpSpPr>
+        <p:cxnSp>
+          <p:nvCxnSpPr>
+            <p:cNvPr id="74" name="Straight Arrow Connector 73">
+              <a:extLst>
+                <a:ext uri="{FF2B5EF4-FFF2-40B4-BE49-F238E27FC236}">
+                  <a16:creationId xmlns:a16="http://schemas.microsoft.com/office/drawing/2014/main" id="{5CDEE5B9-AEB0-42A3-BCFE-03461A581C21}"/>
+                </a:ext>
+              </a:extLst>
+            </p:cNvPr>
+            <p:cNvCxnSpPr>
+              <a:cxnSpLocks/>
+            </p:cNvCxnSpPr>
+            <p:nvPr/>
+          </p:nvCxnSpPr>
+          <p:spPr bwMode="gray">
+            <a:xfrm>
+              <a:off x="1187624" y="1707654"/>
+              <a:ext cx="1512168" cy="0"/>
+            </a:xfrm>
+            <a:prstGeom prst="straightConnector1">
+              <a:avLst/>
+            </a:prstGeom>
+            <a:ln>
+              <a:solidFill>
+                <a:schemeClr val="accent1"/>
+              </a:solidFill>
+              <a:tailEnd type="triangle"/>
+            </a:ln>
+          </p:spPr>
+          <p:style>
+            <a:lnRef idx="1">
+              <a:schemeClr val="accent1"/>
+            </a:lnRef>
+            <a:fillRef idx="0">
+              <a:schemeClr val="accent1"/>
+            </a:fillRef>
+            <a:effectRef idx="0">
+              <a:schemeClr val="accent1"/>
+            </a:effectRef>
+            <a:fontRef idx="minor">
+              <a:schemeClr val="tx1"/>
+            </a:fontRef>
+          </p:style>
+        </p:cxnSp>
+        <p:sp>
+          <p:nvSpPr>
+            <p:cNvPr id="75" name="TextBox 74">
+              <a:extLst>
+                <a:ext uri="{FF2B5EF4-FFF2-40B4-BE49-F238E27FC236}">
+                  <a16:creationId xmlns:a16="http://schemas.microsoft.com/office/drawing/2014/main" id="{0A188E80-0E6B-4026-81E2-8AA279EC2CD1}"/>
+                </a:ext>
+              </a:extLst>
+            </p:cNvPr>
+            <p:cNvSpPr txBox="1"/>
+            <p:nvPr/>
+          </p:nvSpPr>
+          <p:spPr bwMode="gray">
+            <a:xfrm>
+              <a:off x="1217982" y="1551045"/>
+              <a:ext cx="914400" cy="145244"/>
+            </a:xfrm>
+            <a:prstGeom prst="rect">
+              <a:avLst/>
+            </a:prstGeom>
+            <a:noFill/>
+          </p:spPr>
+          <p:txBody>
+            <a:bodyPr wrap="none" lIns="0" tIns="0" rIns="0" bIns="0" rtlCol="0">
+              <a:noAutofit/>
+            </a:bodyPr>
+            <a:lstStyle/>
+            <a:p>
+              <a:pPr>
+                <a:spcBef>
+                  <a:spcPts val="300"/>
+                </a:spcBef>
+                <a:spcAft>
+                  <a:spcPts val="300"/>
+                </a:spcAft>
+                <a:buClr>
+                  <a:schemeClr val="accent1"/>
+                </a:buClr>
+                <a:buSzPct val="90000"/>
+              </a:pPr>
+              <a:r>
+                <a:rPr lang="de-DE" sz="900" dirty="0"/>
+                <a:t>Send sorted list of fixes</a:t>
+              </a:r>
+              <a:endParaRPr lang="en-GB" sz="900" dirty="0" err="1"/>
+            </a:p>
+          </p:txBody>
+        </p:sp>
+      </p:grpSp>
+      <p:sp>
+        <p:nvSpPr>
+          <p:cNvPr id="102" name="TextBox 101">
+            <a:extLst>
+              <a:ext uri="{FF2B5EF4-FFF2-40B4-BE49-F238E27FC236}">
+                <a16:creationId xmlns:a16="http://schemas.microsoft.com/office/drawing/2014/main" id="{CE5B4DD9-5D09-4C93-BDCA-CF13807B1484}"/>
+              </a:ext>
+            </a:extLst>
+          </p:cNvPr>
+          <p:cNvSpPr txBox="1"/>
+          <p:nvPr/>
+        </p:nvSpPr>
+        <p:spPr bwMode="gray">
+          <a:xfrm>
+            <a:off x="1583671" y="1237051"/>
+            <a:ext cx="914400" cy="914400"/>
+          </a:xfrm>
+          <a:prstGeom prst="rect">
+            <a:avLst/>
+          </a:prstGeom>
+          <a:noFill/>
+        </p:spPr>
+        <p:txBody>
+          <a:bodyPr wrap="none" lIns="0" tIns="0" rIns="0" bIns="0" rtlCol="0">
+            <a:noAutofit/>
+          </a:bodyPr>
+          <a:lstStyle/>
+          <a:p>
+            <a:pPr algn="ctr">
+              <a:spcBef>
+                <a:spcPts val="300"/>
+              </a:spcBef>
+              <a:spcAft>
+                <a:spcPts val="300"/>
+              </a:spcAft>
+              <a:buClr>
+                <a:schemeClr val="accent1"/>
+              </a:buClr>
+              <a:buSzPct val="90000"/>
+            </a:pPr>
+            <a:r>
+              <a:rPr lang="de-DE" sz="1600" u="sng" dirty="0"/>
+              <a:t>Current</a:t>
+            </a:r>
+            <a:endParaRPr lang="en-GB" sz="1600" u="sng" dirty="0" err="1"/>
+          </a:p>
+        </p:txBody>
+      </p:sp>
+      <p:sp>
+        <p:nvSpPr>
+          <p:cNvPr id="103" name="TextBox 102">
+            <a:extLst>
+              <a:ext uri="{FF2B5EF4-FFF2-40B4-BE49-F238E27FC236}">
+                <a16:creationId xmlns:a16="http://schemas.microsoft.com/office/drawing/2014/main" id="{FC2B0641-77BF-4002-9293-2EED08703575}"/>
+              </a:ext>
+            </a:extLst>
+          </p:cNvPr>
+          <p:cNvSpPr txBox="1"/>
+          <p:nvPr/>
+        </p:nvSpPr>
+        <p:spPr bwMode="gray">
+          <a:xfrm>
+            <a:off x="5428119" y="1237051"/>
+            <a:ext cx="914400" cy="914400"/>
+          </a:xfrm>
+          <a:prstGeom prst="rect">
+            <a:avLst/>
+          </a:prstGeom>
+          <a:noFill/>
+        </p:spPr>
+        <p:txBody>
+          <a:bodyPr wrap="none" lIns="0" tIns="0" rIns="0" bIns="0" rtlCol="0">
+            <a:noAutofit/>
+          </a:bodyPr>
+          <a:lstStyle/>
+          <a:p>
+            <a:pPr algn="ctr">
+              <a:spcBef>
+                <a:spcPts val="300"/>
+              </a:spcBef>
+              <a:spcAft>
+                <a:spcPts val="300"/>
+              </a:spcAft>
+              <a:buClr>
+                <a:schemeClr val="accent1"/>
+              </a:buClr>
+              <a:buSzPct val="90000"/>
+            </a:pPr>
+            <a:r>
+              <a:rPr lang="de-DE" sz="1600" u="sng" dirty="0"/>
+              <a:t>Proposal</a:t>
+            </a:r>
+            <a:endParaRPr lang="en-GB" sz="1600" u="sng" dirty="0" err="1"/>
+          </a:p>
+        </p:txBody>
+      </p:sp>
+      <p:sp>
+        <p:nvSpPr>
+          <p:cNvPr id="7" name="Rectangle 6">
+            <a:extLst>
+              <a:ext uri="{FF2B5EF4-FFF2-40B4-BE49-F238E27FC236}">
+                <a16:creationId xmlns:a16="http://schemas.microsoft.com/office/drawing/2014/main" id="{5946EA4E-2C9E-449C-BF8E-50BFE13257F6}"/>
+              </a:ext>
+            </a:extLst>
+          </p:cNvPr>
+          <p:cNvSpPr/>
+          <p:nvPr/>
+        </p:nvSpPr>
+        <p:spPr bwMode="gray">
+          <a:xfrm>
+            <a:off x="973224" y="1824929"/>
+            <a:ext cx="303887" cy="3210567"/>
+          </a:xfrm>
+          <a:prstGeom prst="rect">
+            <a:avLst/>
+          </a:prstGeom>
+          <a:ln/>
+        </p:spPr>
+        <p:style>
+          <a:lnRef idx="2">
+            <a:schemeClr val="dk1"/>
+          </a:lnRef>
+          <a:fillRef idx="1">
+            <a:schemeClr val="lt1"/>
+          </a:fillRef>
+          <a:effectRef idx="0">
+            <a:schemeClr val="dk1"/>
+          </a:effectRef>
+          <a:fontRef idx="minor">
+            <a:schemeClr val="dk1"/>
+          </a:fontRef>
+        </p:style>
+        <p:txBody>
+          <a:bodyPr rot="0" spcFirstLastPara="0" vertOverflow="overflow" horzOverflow="overflow" vert="horz" wrap="square" lIns="108000" tIns="72000" rIns="108000" bIns="72000" numCol="1" spcCol="0" rtlCol="0" fromWordArt="0" anchor="ctr" anchorCtr="0" forceAA="0" compatLnSpc="1">
+            <a:prstTxWarp prst="textNoShape">
+              <a:avLst/>
+            </a:prstTxWarp>
+            <a:noAutofit/>
+          </a:bodyPr>
+          <a:lstStyle/>
+          <a:p>
+            <a:pPr algn="ctr">
+              <a:spcBef>
+                <a:spcPts val="300"/>
+              </a:spcBef>
+              <a:spcAft>
+                <a:spcPts val="300"/>
+              </a:spcAft>
+            </a:pPr>
+            <a:endParaRPr lang="en-GB" sz="1200" b="1" dirty="0" err="1">
+              <a:solidFill>
+                <a:schemeClr val="tx1"/>
+              </a:solidFill>
+            </a:endParaRPr>
+          </a:p>
+        </p:txBody>
+      </p:sp>
+      <p:sp>
+        <p:nvSpPr>
+          <p:cNvPr id="9" name="Rectangle 8">
+            <a:extLst>
+              <a:ext uri="{FF2B5EF4-FFF2-40B4-BE49-F238E27FC236}">
+                <a16:creationId xmlns:a16="http://schemas.microsoft.com/office/drawing/2014/main" id="{598AFD6E-0E64-40C1-B897-DBCE8E54F5DF}"/>
+              </a:ext>
+            </a:extLst>
+          </p:cNvPr>
+          <p:cNvSpPr/>
+          <p:nvPr/>
+        </p:nvSpPr>
+        <p:spPr bwMode="gray">
+          <a:xfrm>
+            <a:off x="2789280" y="1933524"/>
+            <a:ext cx="293881" cy="324681"/>
+          </a:xfrm>
+          <a:prstGeom prst="rect">
+            <a:avLst/>
+          </a:prstGeom>
+          <a:ln/>
+        </p:spPr>
+        <p:style>
+          <a:lnRef idx="2">
+            <a:schemeClr val="dk1"/>
+          </a:lnRef>
+          <a:fillRef idx="1">
+            <a:schemeClr val="lt1"/>
+          </a:fillRef>
+          <a:effectRef idx="0">
+            <a:schemeClr val="dk1"/>
+          </a:effectRef>
+          <a:fontRef idx="minor">
+            <a:schemeClr val="dk1"/>
+          </a:fontRef>
+        </p:style>
+        <p:txBody>
+          <a:bodyPr rot="0" spcFirstLastPara="0" vertOverflow="overflow" horzOverflow="overflow" vert="horz" wrap="square" lIns="108000" tIns="72000" rIns="108000" bIns="72000" numCol="1" spcCol="0" rtlCol="0" fromWordArt="0" anchor="ctr" anchorCtr="0" forceAA="0" compatLnSpc="1">
+            <a:prstTxWarp prst="textNoShape">
+              <a:avLst/>
+            </a:prstTxWarp>
+            <a:noAutofit/>
+          </a:bodyPr>
+          <a:lstStyle/>
+          <a:p>
+            <a:pPr algn="ctr">
+              <a:spcBef>
+                <a:spcPts val="300"/>
+              </a:spcBef>
+              <a:spcAft>
+                <a:spcPts val="300"/>
+              </a:spcAft>
+            </a:pPr>
+            <a:endParaRPr lang="en-GB" sz="1200" b="1" dirty="0" err="1">
+              <a:solidFill>
+                <a:schemeClr val="tx1"/>
+              </a:solidFill>
+            </a:endParaRPr>
+          </a:p>
+        </p:txBody>
+      </p:sp>
+      <p:sp>
+        <p:nvSpPr>
+          <p:cNvPr id="31" name="Rectangle 30">
+            <a:extLst>
+              <a:ext uri="{FF2B5EF4-FFF2-40B4-BE49-F238E27FC236}">
+                <a16:creationId xmlns:a16="http://schemas.microsoft.com/office/drawing/2014/main" id="{DBFF6B8B-8A67-446F-A020-2C277B460196}"/>
+              </a:ext>
+            </a:extLst>
+          </p:cNvPr>
+          <p:cNvSpPr/>
+          <p:nvPr/>
+        </p:nvSpPr>
+        <p:spPr bwMode="gray">
+          <a:xfrm>
+            <a:off x="2789280" y="2605590"/>
+            <a:ext cx="293881" cy="324681"/>
+          </a:xfrm>
+          <a:prstGeom prst="rect">
+            <a:avLst/>
+          </a:prstGeom>
+          <a:ln/>
+        </p:spPr>
+        <p:style>
+          <a:lnRef idx="2">
+            <a:schemeClr val="dk1"/>
+          </a:lnRef>
+          <a:fillRef idx="1">
+            <a:schemeClr val="lt1"/>
+          </a:fillRef>
+          <a:effectRef idx="0">
+            <a:schemeClr val="dk1"/>
+          </a:effectRef>
+          <a:fontRef idx="minor">
+            <a:schemeClr val="dk1"/>
+          </a:fontRef>
+        </p:style>
+        <p:txBody>
+          <a:bodyPr rot="0" spcFirstLastPara="0" vertOverflow="overflow" horzOverflow="overflow" vert="horz" wrap="square" lIns="108000" tIns="72000" rIns="108000" bIns="72000" numCol="1" spcCol="0" rtlCol="0" fromWordArt="0" anchor="ctr" anchorCtr="0" forceAA="0" compatLnSpc="1">
+            <a:prstTxWarp prst="textNoShape">
+              <a:avLst/>
+            </a:prstTxWarp>
+            <a:noAutofit/>
+          </a:bodyPr>
+          <a:lstStyle/>
+          <a:p>
+            <a:pPr algn="ctr">
+              <a:spcBef>
+                <a:spcPts val="300"/>
+              </a:spcBef>
+              <a:spcAft>
+                <a:spcPts val="300"/>
+              </a:spcAft>
+            </a:pPr>
+            <a:endParaRPr lang="en-GB" sz="1200" b="1" dirty="0" err="1">
+              <a:solidFill>
+                <a:schemeClr val="tx1"/>
+              </a:solidFill>
+            </a:endParaRPr>
+          </a:p>
+        </p:txBody>
+      </p:sp>
+      <p:sp>
+        <p:nvSpPr>
+          <p:cNvPr id="38" name="Rectangle 37">
+            <a:extLst>
+              <a:ext uri="{FF2B5EF4-FFF2-40B4-BE49-F238E27FC236}">
+                <a16:creationId xmlns:a16="http://schemas.microsoft.com/office/drawing/2014/main" id="{6D3FFA68-A282-48E9-9144-44983B9D0C61}"/>
+              </a:ext>
+            </a:extLst>
+          </p:cNvPr>
+          <p:cNvSpPr/>
+          <p:nvPr/>
+        </p:nvSpPr>
+        <p:spPr bwMode="gray">
+          <a:xfrm>
+            <a:off x="2803748" y="3242235"/>
+            <a:ext cx="293881" cy="324681"/>
+          </a:xfrm>
+          <a:prstGeom prst="rect">
+            <a:avLst/>
+          </a:prstGeom>
+          <a:ln/>
+        </p:spPr>
+        <p:style>
+          <a:lnRef idx="2">
+            <a:schemeClr val="dk1"/>
+          </a:lnRef>
+          <a:fillRef idx="1">
+            <a:schemeClr val="lt1"/>
+          </a:fillRef>
+          <a:effectRef idx="0">
+            <a:schemeClr val="dk1"/>
+          </a:effectRef>
+          <a:fontRef idx="minor">
+            <a:schemeClr val="dk1"/>
+          </a:fontRef>
+        </p:style>
+        <p:txBody>
+          <a:bodyPr rot="0" spcFirstLastPara="0" vertOverflow="overflow" horzOverflow="overflow" vert="horz" wrap="square" lIns="108000" tIns="72000" rIns="108000" bIns="72000" numCol="1" spcCol="0" rtlCol="0" fromWordArt="0" anchor="ctr" anchorCtr="0" forceAA="0" compatLnSpc="1">
+            <a:prstTxWarp prst="textNoShape">
+              <a:avLst/>
+            </a:prstTxWarp>
+            <a:noAutofit/>
+          </a:bodyPr>
+          <a:lstStyle/>
+          <a:p>
+            <a:pPr algn="ctr">
+              <a:spcBef>
+                <a:spcPts val="300"/>
+              </a:spcBef>
+              <a:spcAft>
+                <a:spcPts val="300"/>
+              </a:spcAft>
+            </a:pPr>
+            <a:endParaRPr lang="en-GB" sz="1200" b="1" dirty="0" err="1">
+              <a:solidFill>
+                <a:schemeClr val="tx1"/>
+              </a:solidFill>
+            </a:endParaRPr>
+          </a:p>
+        </p:txBody>
+      </p:sp>
+      <p:sp>
+        <p:nvSpPr>
+          <p:cNvPr id="45" name="Rectangle 44">
+            <a:extLst>
+              <a:ext uri="{FF2B5EF4-FFF2-40B4-BE49-F238E27FC236}">
+                <a16:creationId xmlns:a16="http://schemas.microsoft.com/office/drawing/2014/main" id="{EDB513A4-EFBF-4710-AE18-99F7C26986A3}"/>
+              </a:ext>
+            </a:extLst>
+          </p:cNvPr>
+          <p:cNvSpPr/>
+          <p:nvPr/>
+        </p:nvSpPr>
+        <p:spPr bwMode="gray">
+          <a:xfrm>
+            <a:off x="2795095" y="3892559"/>
+            <a:ext cx="293881" cy="324681"/>
+          </a:xfrm>
+          <a:prstGeom prst="rect">
+            <a:avLst/>
+          </a:prstGeom>
+          <a:ln/>
+        </p:spPr>
+        <p:style>
+          <a:lnRef idx="2">
+            <a:schemeClr val="dk1"/>
+          </a:lnRef>
+          <a:fillRef idx="1">
+            <a:schemeClr val="lt1"/>
+          </a:fillRef>
+          <a:effectRef idx="0">
+            <a:schemeClr val="dk1"/>
+          </a:effectRef>
+          <a:fontRef idx="minor">
+            <a:schemeClr val="dk1"/>
+          </a:fontRef>
+        </p:style>
+        <p:txBody>
+          <a:bodyPr rot="0" spcFirstLastPara="0" vertOverflow="overflow" horzOverflow="overflow" vert="horz" wrap="square" lIns="108000" tIns="72000" rIns="108000" bIns="72000" numCol="1" spcCol="0" rtlCol="0" fromWordArt="0" anchor="ctr" anchorCtr="0" forceAA="0" compatLnSpc="1">
+            <a:prstTxWarp prst="textNoShape">
+              <a:avLst/>
+            </a:prstTxWarp>
+            <a:noAutofit/>
+          </a:bodyPr>
+          <a:lstStyle/>
+          <a:p>
+            <a:pPr algn="ctr">
+              <a:spcBef>
+                <a:spcPts val="300"/>
+              </a:spcBef>
+              <a:spcAft>
+                <a:spcPts val="300"/>
+              </a:spcAft>
+            </a:pPr>
+            <a:endParaRPr lang="en-GB" sz="1200" b="1" dirty="0" err="1">
+              <a:solidFill>
+                <a:schemeClr val="tx1"/>
+              </a:solidFill>
+            </a:endParaRPr>
+          </a:p>
+        </p:txBody>
+      </p:sp>
+      <p:sp>
+        <p:nvSpPr>
+          <p:cNvPr id="52" name="Rectangle 51">
+            <a:extLst>
+              <a:ext uri="{FF2B5EF4-FFF2-40B4-BE49-F238E27FC236}">
+                <a16:creationId xmlns:a16="http://schemas.microsoft.com/office/drawing/2014/main" id="{E0B87384-596C-445E-BDE7-E51217671F96}"/>
+              </a:ext>
+            </a:extLst>
+          </p:cNvPr>
+          <p:cNvSpPr/>
+          <p:nvPr/>
+        </p:nvSpPr>
+        <p:spPr bwMode="gray">
+          <a:xfrm>
+            <a:off x="2791443" y="4588069"/>
+            <a:ext cx="293881" cy="108436"/>
+          </a:xfrm>
+          <a:prstGeom prst="rect">
+            <a:avLst/>
+          </a:prstGeom>
+          <a:ln/>
+        </p:spPr>
+        <p:style>
+          <a:lnRef idx="2">
+            <a:schemeClr val="dk1"/>
+          </a:lnRef>
+          <a:fillRef idx="1">
+            <a:schemeClr val="lt1"/>
+          </a:fillRef>
+          <a:effectRef idx="0">
+            <a:schemeClr val="dk1"/>
+          </a:effectRef>
+          <a:fontRef idx="minor">
+            <a:schemeClr val="dk1"/>
+          </a:fontRef>
+        </p:style>
+        <p:txBody>
+          <a:bodyPr rot="0" spcFirstLastPara="0" vertOverflow="overflow" horzOverflow="overflow" vert="horz" wrap="square" lIns="108000" tIns="72000" rIns="108000" bIns="72000" numCol="1" spcCol="0" rtlCol="0" fromWordArt="0" anchor="ctr" anchorCtr="0" forceAA="0" compatLnSpc="1">
+            <a:prstTxWarp prst="textNoShape">
+              <a:avLst/>
+            </a:prstTxWarp>
+            <a:noAutofit/>
+          </a:bodyPr>
+          <a:lstStyle/>
+          <a:p>
+            <a:pPr algn="ctr">
+              <a:spcBef>
+                <a:spcPts val="300"/>
+              </a:spcBef>
+              <a:spcAft>
+                <a:spcPts val="300"/>
+              </a:spcAft>
+            </a:pPr>
+            <a:endParaRPr lang="en-GB" sz="1200" b="1" dirty="0" err="1">
+              <a:solidFill>
+                <a:schemeClr val="tx1"/>
+              </a:solidFill>
+            </a:endParaRPr>
+          </a:p>
+        </p:txBody>
+      </p:sp>
+      <p:sp>
+        <p:nvSpPr>
+          <p:cNvPr id="59" name="Rectangle 58">
+            <a:extLst>
+              <a:ext uri="{FF2B5EF4-FFF2-40B4-BE49-F238E27FC236}">
+                <a16:creationId xmlns:a16="http://schemas.microsoft.com/office/drawing/2014/main" id="{8C0B9286-C306-4C49-9872-5397D7691D99}"/>
+              </a:ext>
+            </a:extLst>
+          </p:cNvPr>
+          <p:cNvSpPr/>
+          <p:nvPr/>
+        </p:nvSpPr>
+        <p:spPr bwMode="gray">
+          <a:xfrm>
+            <a:off x="2802362" y="4900952"/>
+            <a:ext cx="293881" cy="143222"/>
+          </a:xfrm>
+          <a:prstGeom prst="rect">
+            <a:avLst/>
+          </a:prstGeom>
+          <a:ln/>
+        </p:spPr>
+        <p:style>
+          <a:lnRef idx="2">
+            <a:schemeClr val="dk1"/>
+          </a:lnRef>
+          <a:fillRef idx="1">
+            <a:schemeClr val="lt1"/>
+          </a:fillRef>
+          <a:effectRef idx="0">
+            <a:schemeClr val="dk1"/>
+          </a:effectRef>
+          <a:fontRef idx="minor">
+            <a:schemeClr val="dk1"/>
+          </a:fontRef>
+        </p:style>
+        <p:txBody>
+          <a:bodyPr rot="0" spcFirstLastPara="0" vertOverflow="overflow" horzOverflow="overflow" vert="horz" wrap="square" lIns="108000" tIns="72000" rIns="108000" bIns="72000" numCol="1" spcCol="0" rtlCol="0" fromWordArt="0" anchor="ctr" anchorCtr="0" forceAA="0" compatLnSpc="1">
+            <a:prstTxWarp prst="textNoShape">
+              <a:avLst/>
+            </a:prstTxWarp>
+            <a:noAutofit/>
+          </a:bodyPr>
+          <a:lstStyle/>
+          <a:p>
+            <a:pPr algn="ctr">
+              <a:spcBef>
+                <a:spcPts val="300"/>
+              </a:spcBef>
+              <a:spcAft>
+                <a:spcPts val="300"/>
+              </a:spcAft>
+            </a:pPr>
+            <a:endParaRPr lang="en-GB" sz="1200" b="1" dirty="0" err="1">
+              <a:solidFill>
+                <a:schemeClr val="tx1"/>
+              </a:solidFill>
+            </a:endParaRPr>
+          </a:p>
+        </p:txBody>
+      </p:sp>
+      <p:sp>
+        <p:nvSpPr>
+          <p:cNvPr id="63" name="Rectangle 62">
+            <a:extLst>
+              <a:ext uri="{FF2B5EF4-FFF2-40B4-BE49-F238E27FC236}">
+                <a16:creationId xmlns:a16="http://schemas.microsoft.com/office/drawing/2014/main" id="{80FCCB6E-5FC7-417A-8435-B2793ED6A9DA}"/>
+              </a:ext>
+            </a:extLst>
+          </p:cNvPr>
+          <p:cNvSpPr/>
+          <p:nvPr/>
+        </p:nvSpPr>
+        <p:spPr bwMode="gray">
+          <a:xfrm>
+            <a:off x="4809492" y="1821938"/>
+            <a:ext cx="303887" cy="1018775"/>
+          </a:xfrm>
+          <a:prstGeom prst="rect">
+            <a:avLst/>
+          </a:prstGeom>
+          <a:ln/>
+        </p:spPr>
+        <p:style>
+          <a:lnRef idx="2">
+            <a:schemeClr val="dk1"/>
+          </a:lnRef>
+          <a:fillRef idx="1">
+            <a:schemeClr val="lt1"/>
+          </a:fillRef>
+          <a:effectRef idx="0">
+            <a:schemeClr val="dk1"/>
+          </a:effectRef>
+          <a:fontRef idx="minor">
+            <a:schemeClr val="dk1"/>
+          </a:fontRef>
+        </p:style>
+        <p:txBody>
+          <a:bodyPr rot="0" spcFirstLastPara="0" vertOverflow="overflow" horzOverflow="overflow" vert="horz" wrap="square" lIns="108000" tIns="72000" rIns="108000" bIns="72000" numCol="1" spcCol="0" rtlCol="0" fromWordArt="0" anchor="ctr" anchorCtr="0" forceAA="0" compatLnSpc="1">
+            <a:prstTxWarp prst="textNoShape">
+              <a:avLst/>
+            </a:prstTxWarp>
+            <a:noAutofit/>
+          </a:bodyPr>
+          <a:lstStyle/>
+          <a:p>
+            <a:pPr algn="ctr">
+              <a:spcBef>
+                <a:spcPts val="300"/>
+              </a:spcBef>
+              <a:spcAft>
+                <a:spcPts val="300"/>
+              </a:spcAft>
+            </a:pPr>
+            <a:endParaRPr lang="en-GB" sz="1200" b="1" dirty="0" err="1">
+              <a:solidFill>
+                <a:schemeClr val="tx1"/>
+              </a:solidFill>
+            </a:endParaRPr>
+          </a:p>
+        </p:txBody>
+      </p:sp>
+      <p:sp>
+        <p:nvSpPr>
+          <p:cNvPr id="65" name="Rectangle 64">
+            <a:extLst>
+              <a:ext uri="{FF2B5EF4-FFF2-40B4-BE49-F238E27FC236}">
+                <a16:creationId xmlns:a16="http://schemas.microsoft.com/office/drawing/2014/main" id="{9E6801C1-3FD0-40A2-82AE-4250AD30C693}"/>
+              </a:ext>
+            </a:extLst>
+          </p:cNvPr>
+          <p:cNvSpPr/>
+          <p:nvPr/>
+        </p:nvSpPr>
+        <p:spPr bwMode="gray">
+          <a:xfrm>
+            <a:off x="6625548" y="1930532"/>
+            <a:ext cx="293881" cy="324681"/>
+          </a:xfrm>
+          <a:prstGeom prst="rect">
+            <a:avLst/>
+          </a:prstGeom>
+          <a:ln/>
+        </p:spPr>
+        <p:style>
+          <a:lnRef idx="2">
+            <a:schemeClr val="dk1"/>
+          </a:lnRef>
+          <a:fillRef idx="1">
+            <a:schemeClr val="lt1"/>
+          </a:fillRef>
+          <a:effectRef idx="0">
+            <a:schemeClr val="dk1"/>
+          </a:effectRef>
+          <a:fontRef idx="minor">
+            <a:schemeClr val="dk1"/>
+          </a:fontRef>
+        </p:style>
+        <p:txBody>
+          <a:bodyPr rot="0" spcFirstLastPara="0" vertOverflow="overflow" horzOverflow="overflow" vert="horz" wrap="square" lIns="108000" tIns="72000" rIns="108000" bIns="72000" numCol="1" spcCol="0" rtlCol="0" fromWordArt="0" anchor="ctr" anchorCtr="0" forceAA="0" compatLnSpc="1">
+            <a:prstTxWarp prst="textNoShape">
+              <a:avLst/>
+            </a:prstTxWarp>
+            <a:noAutofit/>
+          </a:bodyPr>
+          <a:lstStyle/>
+          <a:p>
+            <a:pPr algn="ctr">
+              <a:spcBef>
+                <a:spcPts val="300"/>
+              </a:spcBef>
+              <a:spcAft>
+                <a:spcPts val="300"/>
+              </a:spcAft>
+            </a:pPr>
+            <a:endParaRPr lang="en-GB" sz="1200" b="1" dirty="0" err="1">
+              <a:solidFill>
+                <a:schemeClr val="tx1"/>
+              </a:solidFill>
+            </a:endParaRPr>
+          </a:p>
+        </p:txBody>
+      </p:sp>
+      <p:sp>
+        <p:nvSpPr>
+          <p:cNvPr id="76" name="Rectangle 75">
+            <a:extLst>
+              <a:ext uri="{FF2B5EF4-FFF2-40B4-BE49-F238E27FC236}">
+                <a16:creationId xmlns:a16="http://schemas.microsoft.com/office/drawing/2014/main" id="{C74EE227-86CE-4E75-8843-963C1820E584}"/>
+              </a:ext>
+            </a:extLst>
+          </p:cNvPr>
+          <p:cNvSpPr/>
+          <p:nvPr/>
+        </p:nvSpPr>
+        <p:spPr bwMode="gray">
+          <a:xfrm>
+            <a:off x="6625548" y="2602599"/>
+            <a:ext cx="293881" cy="238114"/>
+          </a:xfrm>
+          <a:prstGeom prst="rect">
+            <a:avLst/>
+          </a:prstGeom>
+          <a:ln/>
+        </p:spPr>
+        <p:style>
+          <a:lnRef idx="2">
+            <a:schemeClr val="dk1"/>
+          </a:lnRef>
+          <a:fillRef idx="1">
+            <a:schemeClr val="lt1"/>
+          </a:fillRef>
+          <a:effectRef idx="0">
+            <a:schemeClr val="dk1"/>
+          </a:effectRef>
+          <a:fontRef idx="minor">
+            <a:schemeClr val="dk1"/>
+          </a:fontRef>
+        </p:style>
+        <p:txBody>
+          <a:bodyPr rot="0" spcFirstLastPara="0" vertOverflow="overflow" horzOverflow="overflow" vert="horz" wrap="square" lIns="108000" tIns="72000" rIns="108000" bIns="72000" numCol="1" spcCol="0" rtlCol="0" fromWordArt="0" anchor="ctr" anchorCtr="0" forceAA="0" compatLnSpc="1">
+            <a:prstTxWarp prst="textNoShape">
+              <a:avLst/>
+            </a:prstTxWarp>
+            <a:noAutofit/>
+          </a:bodyPr>
+          <a:lstStyle/>
+          <a:p>
+            <a:pPr algn="ctr">
+              <a:spcBef>
+                <a:spcPts val="300"/>
+              </a:spcBef>
+              <a:spcAft>
+                <a:spcPts val="300"/>
+              </a:spcAft>
+            </a:pPr>
+            <a:endParaRPr lang="en-GB" sz="1200" b="1" dirty="0" err="1">
+              <a:solidFill>
+                <a:schemeClr val="tx1"/>
+              </a:solidFill>
+            </a:endParaRPr>
+          </a:p>
+        </p:txBody>
+      </p:sp>
+      <p:sp>
+        <p:nvSpPr>
+          <p:cNvPr id="112" name="TextBox 111">
+            <a:extLst>
+              <a:ext uri="{FF2B5EF4-FFF2-40B4-BE49-F238E27FC236}">
+                <a16:creationId xmlns:a16="http://schemas.microsoft.com/office/drawing/2014/main" id="{E2AF1D8A-D3F0-4A83-BD66-637C5628D5EF}"/>
+              </a:ext>
+            </a:extLst>
+          </p:cNvPr>
+          <p:cNvSpPr txBox="1"/>
+          <p:nvPr/>
+        </p:nvSpPr>
+        <p:spPr bwMode="gray">
+          <a:xfrm>
+            <a:off x="224981" y="2436130"/>
+            <a:ext cx="914400" cy="155103"/>
+          </a:xfrm>
+          <a:prstGeom prst="rect">
+            <a:avLst/>
+          </a:prstGeom>
+          <a:noFill/>
+        </p:spPr>
+        <p:txBody>
+          <a:bodyPr wrap="none" lIns="0" tIns="0" rIns="0" bIns="0" rtlCol="0">
+            <a:noAutofit/>
+          </a:bodyPr>
+          <a:lstStyle/>
+          <a:p>
+            <a:pPr>
+              <a:spcBef>
+                <a:spcPts val="300"/>
+              </a:spcBef>
+              <a:spcAft>
+                <a:spcPts val="300"/>
+              </a:spcAft>
+              <a:buClr>
+                <a:schemeClr val="accent1"/>
+              </a:buClr>
+              <a:buSzPct val="90000"/>
+            </a:pPr>
+            <a:r>
+              <a:rPr lang="de-DE" sz="800" dirty="0"/>
+              <a:t>for each shop</a:t>
+            </a:r>
+            <a:endParaRPr lang="en-GB" sz="800" dirty="0" err="1"/>
+          </a:p>
+        </p:txBody>
+      </p:sp>
+      <p:sp>
+        <p:nvSpPr>
+          <p:cNvPr id="113" name="TextBox 112">
+            <a:extLst>
+              <a:ext uri="{FF2B5EF4-FFF2-40B4-BE49-F238E27FC236}">
+                <a16:creationId xmlns:a16="http://schemas.microsoft.com/office/drawing/2014/main" id="{4EE130AE-EACF-42B6-94D1-EE4DA2E82BA9}"/>
+              </a:ext>
+            </a:extLst>
+          </p:cNvPr>
+          <p:cNvSpPr txBox="1"/>
+          <p:nvPr/>
+        </p:nvSpPr>
+        <p:spPr bwMode="gray">
+          <a:xfrm>
+            <a:off x="209464" y="3722550"/>
+            <a:ext cx="914400" cy="155103"/>
+          </a:xfrm>
+          <a:prstGeom prst="rect">
+            <a:avLst/>
+          </a:prstGeom>
+          <a:noFill/>
+        </p:spPr>
+        <p:txBody>
+          <a:bodyPr wrap="none" lIns="0" tIns="0" rIns="0" bIns="0" rtlCol="0">
+            <a:noAutofit/>
+          </a:bodyPr>
+          <a:lstStyle/>
+          <a:p>
+            <a:pPr>
+              <a:spcBef>
+                <a:spcPts val="300"/>
+              </a:spcBef>
+              <a:spcAft>
+                <a:spcPts val="300"/>
+              </a:spcAft>
+              <a:buClr>
+                <a:schemeClr val="accent1"/>
+              </a:buClr>
+              <a:buSzPct val="90000"/>
+            </a:pPr>
+            <a:r>
+              <a:rPr lang="de-DE" sz="800" dirty="0"/>
+              <a:t>for each issue</a:t>
+            </a:r>
+            <a:endParaRPr lang="en-GB" sz="800" dirty="0" err="1"/>
+          </a:p>
+        </p:txBody>
+      </p:sp>
+      <p:sp>
+        <p:nvSpPr>
+          <p:cNvPr id="114" name="TextBox 113">
+            <a:extLst>
+              <a:ext uri="{FF2B5EF4-FFF2-40B4-BE49-F238E27FC236}">
+                <a16:creationId xmlns:a16="http://schemas.microsoft.com/office/drawing/2014/main" id="{1ACDD30B-301D-4CBD-860D-09CCA20344E2}"/>
+              </a:ext>
+            </a:extLst>
+          </p:cNvPr>
+          <p:cNvSpPr txBox="1"/>
+          <p:nvPr/>
+        </p:nvSpPr>
+        <p:spPr bwMode="gray">
+          <a:xfrm>
+            <a:off x="224981" y="4357691"/>
+            <a:ext cx="914400" cy="155103"/>
+          </a:xfrm>
+          <a:prstGeom prst="rect">
+            <a:avLst/>
+          </a:prstGeom>
+          <a:noFill/>
+        </p:spPr>
+        <p:txBody>
+          <a:bodyPr wrap="none" lIns="0" tIns="0" rIns="0" bIns="0" rtlCol="0">
+            <a:noAutofit/>
+          </a:bodyPr>
+          <a:lstStyle/>
+          <a:p>
+            <a:pPr>
+              <a:spcBef>
+                <a:spcPts val="300"/>
+              </a:spcBef>
+              <a:spcAft>
+                <a:spcPts val="300"/>
+              </a:spcAft>
+              <a:buClr>
+                <a:schemeClr val="accent1"/>
+              </a:buClr>
+              <a:buSzPct val="90000"/>
+            </a:pPr>
+            <a:r>
+              <a:rPr lang="de-DE" sz="800" dirty="0"/>
+              <a:t>for each issue</a:t>
+            </a:r>
+            <a:endParaRPr lang="en-GB" sz="800" dirty="0" err="1"/>
+          </a:p>
+        </p:txBody>
+      </p:sp>
+      <p:cxnSp>
+        <p:nvCxnSpPr>
+          <p:cNvPr id="116" name="Straight Arrow Connector 115">
+            <a:extLst>
+              <a:ext uri="{FF2B5EF4-FFF2-40B4-BE49-F238E27FC236}">
+                <a16:creationId xmlns:a16="http://schemas.microsoft.com/office/drawing/2014/main" id="{86276089-3DEF-4FE9-8E77-F7482D9FDCDD}"/>
+              </a:ext>
+            </a:extLst>
+          </p:cNvPr>
+          <p:cNvCxnSpPr>
+            <a:cxnSpLocks/>
+          </p:cNvCxnSpPr>
+          <p:nvPr/>
+        </p:nvCxnSpPr>
+        <p:spPr bwMode="gray">
+          <a:xfrm>
+            <a:off x="3419872" y="4757729"/>
+            <a:ext cx="432048" cy="0"/>
+          </a:xfrm>
+          <a:prstGeom prst="straightConnector1">
+            <a:avLst/>
+          </a:prstGeom>
+          <a:ln>
+            <a:tailEnd type="triangle"/>
+          </a:ln>
+        </p:spPr>
+        <p:style>
+          <a:lnRef idx="1">
+            <a:schemeClr val="dk1"/>
+          </a:lnRef>
+          <a:fillRef idx="0">
+            <a:schemeClr val="dk1"/>
+          </a:fillRef>
+          <a:effectRef idx="0">
+            <a:schemeClr val="dk1"/>
+          </a:effectRef>
+          <a:fontRef idx="minor">
+            <a:schemeClr val="tx1"/>
+          </a:fontRef>
+        </p:style>
+      </p:cxnSp>
+      <p:sp>
+        <p:nvSpPr>
+          <p:cNvPr id="118" name="TextBox 117">
+            <a:extLst>
+              <a:ext uri="{FF2B5EF4-FFF2-40B4-BE49-F238E27FC236}">
+                <a16:creationId xmlns:a16="http://schemas.microsoft.com/office/drawing/2014/main" id="{F20E9497-2E5F-44D7-AED6-E5B8B5016FA5}"/>
+              </a:ext>
+            </a:extLst>
+          </p:cNvPr>
+          <p:cNvSpPr txBox="1"/>
+          <p:nvPr/>
+        </p:nvSpPr>
+        <p:spPr bwMode="gray">
+          <a:xfrm>
+            <a:off x="3904825" y="4650976"/>
+            <a:ext cx="1368152" cy="213506"/>
+          </a:xfrm>
+          <a:prstGeom prst="rect">
+            <a:avLst/>
+          </a:prstGeom>
+          <a:noFill/>
+        </p:spPr>
+        <p:txBody>
+          <a:bodyPr wrap="none" lIns="0" tIns="0" rIns="0" bIns="0" rtlCol="0">
+            <a:noAutofit/>
+          </a:bodyPr>
+          <a:lstStyle/>
+          <a:p>
+            <a:pPr>
+              <a:spcBef>
+                <a:spcPts val="300"/>
+              </a:spcBef>
+              <a:spcAft>
+                <a:spcPts val="300"/>
+              </a:spcAft>
+              <a:buClr>
+                <a:schemeClr val="accent1"/>
+              </a:buClr>
+              <a:buSzPct val="90000"/>
+            </a:pPr>
+            <a:r>
+              <a:rPr lang="de-DE" sz="1200" dirty="0"/>
+              <a:t>20-40 messages</a:t>
+            </a:r>
+            <a:endParaRPr lang="en-GB" sz="1200" dirty="0" err="1"/>
+          </a:p>
+        </p:txBody>
+      </p:sp>
+      <p:cxnSp>
+        <p:nvCxnSpPr>
+          <p:cNvPr id="119" name="Straight Arrow Connector 118">
+            <a:extLst>
+              <a:ext uri="{FF2B5EF4-FFF2-40B4-BE49-F238E27FC236}">
+                <a16:creationId xmlns:a16="http://schemas.microsoft.com/office/drawing/2014/main" id="{8BA019FA-1724-4FCB-AA61-09FA85B25E85}"/>
+              </a:ext>
+            </a:extLst>
+          </p:cNvPr>
+          <p:cNvCxnSpPr>
+            <a:cxnSpLocks/>
+          </p:cNvCxnSpPr>
+          <p:nvPr/>
+        </p:nvCxnSpPr>
+        <p:spPr bwMode="gray">
+          <a:xfrm>
+            <a:off x="5868144" y="3020185"/>
+            <a:ext cx="0" cy="222050"/>
+          </a:xfrm>
+          <a:prstGeom prst="straightConnector1">
+            <a:avLst/>
+          </a:prstGeom>
+          <a:ln>
+            <a:tailEnd type="triangle"/>
+          </a:ln>
+        </p:spPr>
+        <p:style>
+          <a:lnRef idx="1">
+            <a:schemeClr val="dk1"/>
+          </a:lnRef>
+          <a:fillRef idx="0">
+            <a:schemeClr val="dk1"/>
+          </a:fillRef>
+          <a:effectRef idx="0">
+            <a:schemeClr val="dk1"/>
+          </a:effectRef>
+          <a:fontRef idx="minor">
+            <a:schemeClr val="tx1"/>
+          </a:fontRef>
+        </p:style>
+      </p:cxnSp>
+      <p:sp>
+        <p:nvSpPr>
+          <p:cNvPr id="120" name="TextBox 119">
+            <a:extLst>
+              <a:ext uri="{FF2B5EF4-FFF2-40B4-BE49-F238E27FC236}">
+                <a16:creationId xmlns:a16="http://schemas.microsoft.com/office/drawing/2014/main" id="{D450678B-1210-4D1D-854C-AB49A59B4C8D}"/>
+              </a:ext>
+            </a:extLst>
+          </p:cNvPr>
+          <p:cNvSpPr txBox="1"/>
+          <p:nvPr/>
+        </p:nvSpPr>
+        <p:spPr bwMode="gray">
+          <a:xfrm>
+            <a:off x="5279832" y="3282602"/>
+            <a:ext cx="1176624" cy="213506"/>
+          </a:xfrm>
+          <a:prstGeom prst="rect">
+            <a:avLst/>
+          </a:prstGeom>
+          <a:noFill/>
+        </p:spPr>
+        <p:txBody>
+          <a:bodyPr wrap="none" lIns="0" tIns="0" rIns="0" bIns="0" rtlCol="0">
+            <a:noAutofit/>
+          </a:bodyPr>
+          <a:lstStyle/>
+          <a:p>
+            <a:pPr>
+              <a:spcBef>
+                <a:spcPts val="300"/>
+              </a:spcBef>
+              <a:spcAft>
+                <a:spcPts val="300"/>
+              </a:spcAft>
+              <a:buClr>
+                <a:schemeClr val="accent1"/>
+              </a:buClr>
+              <a:buSzPct val="90000"/>
+            </a:pPr>
+            <a:r>
+              <a:rPr lang="de-DE" sz="1200" dirty="0"/>
+              <a:t> = 2 messages</a:t>
+            </a:r>
+            <a:endParaRPr lang="en-GB" sz="1200" dirty="0" err="1"/>
+          </a:p>
+        </p:txBody>
+      </p:sp>
+      <p:grpSp>
+        <p:nvGrpSpPr>
+          <p:cNvPr id="123" name="Group 122">
+            <a:extLst>
+              <a:ext uri="{FF2B5EF4-FFF2-40B4-BE49-F238E27FC236}">
+                <a16:creationId xmlns:a16="http://schemas.microsoft.com/office/drawing/2014/main" id="{32D600C6-DF9C-4C84-8D79-BEABCA691763}"/>
+              </a:ext>
+            </a:extLst>
+          </p:cNvPr>
+          <p:cNvGrpSpPr/>
+          <p:nvPr/>
+        </p:nvGrpSpPr>
+        <p:grpSpPr>
+          <a:xfrm>
+            <a:off x="5108376" y="2672799"/>
+            <a:ext cx="1512169" cy="145244"/>
+            <a:chOff x="1187624" y="1851670"/>
+            <a:chExt cx="1512169" cy="145244"/>
+          </a:xfrm>
+        </p:grpSpPr>
+        <p:cxnSp>
+          <p:nvCxnSpPr>
+            <p:cNvPr id="124" name="Straight Arrow Connector 123">
+              <a:extLst>
+                <a:ext uri="{FF2B5EF4-FFF2-40B4-BE49-F238E27FC236}">
+                  <a16:creationId xmlns:a16="http://schemas.microsoft.com/office/drawing/2014/main" id="{E9427021-A038-44B2-AE89-944B5E89821A}"/>
+                </a:ext>
+              </a:extLst>
+            </p:cNvPr>
+            <p:cNvCxnSpPr>
+              <a:cxnSpLocks/>
+            </p:cNvCxnSpPr>
+            <p:nvPr/>
+          </p:nvCxnSpPr>
+          <p:spPr bwMode="gray">
+            <a:xfrm flipH="1">
+              <a:off x="1187624" y="1985548"/>
+              <a:ext cx="1512169" cy="0"/>
+            </a:xfrm>
+            <a:prstGeom prst="straightConnector1">
+              <a:avLst/>
+            </a:prstGeom>
+            <a:ln>
+              <a:solidFill>
+                <a:schemeClr val="accent1"/>
+              </a:solidFill>
+              <a:prstDash val="sysDash"/>
+              <a:headEnd type="none" w="med" len="med"/>
+              <a:tailEnd type="arrow" w="med" len="med"/>
+            </a:ln>
+          </p:spPr>
+          <p:style>
+            <a:lnRef idx="1">
+              <a:schemeClr val="accent1"/>
+            </a:lnRef>
+            <a:fillRef idx="0">
+              <a:schemeClr val="accent1"/>
+            </a:fillRef>
+            <a:effectRef idx="0">
+              <a:schemeClr val="accent1"/>
+            </a:effectRef>
+            <a:fontRef idx="minor">
+              <a:schemeClr val="tx1"/>
+            </a:fontRef>
+          </p:style>
+        </p:cxnSp>
+        <p:sp>
+          <p:nvSpPr>
+            <p:cNvPr id="125" name="TextBox 124">
+              <a:extLst>
+                <a:ext uri="{FF2B5EF4-FFF2-40B4-BE49-F238E27FC236}">
+                  <a16:creationId xmlns:a16="http://schemas.microsoft.com/office/drawing/2014/main" id="{E0DA5919-255F-4E0D-BC7F-18617FA49AAD}"/>
+                </a:ext>
+              </a:extLst>
+            </p:cNvPr>
+            <p:cNvSpPr txBox="1"/>
+            <p:nvPr/>
+          </p:nvSpPr>
+          <p:spPr bwMode="gray">
+            <a:xfrm>
+              <a:off x="1481505" y="1851670"/>
+              <a:ext cx="914400" cy="145244"/>
+            </a:xfrm>
+            <a:prstGeom prst="rect">
+              <a:avLst/>
+            </a:prstGeom>
+            <a:noFill/>
+          </p:spPr>
+          <p:txBody>
+            <a:bodyPr wrap="none" lIns="0" tIns="0" rIns="0" bIns="0" rtlCol="0">
+              <a:noAutofit/>
+            </a:bodyPr>
+            <a:lstStyle/>
+            <a:p>
+              <a:pPr algn="ctr">
+                <a:spcBef>
+                  <a:spcPts val="300"/>
+                </a:spcBef>
+                <a:spcAft>
+                  <a:spcPts val="300"/>
+                </a:spcAft>
+                <a:buClr>
+                  <a:schemeClr val="accent1"/>
+                </a:buClr>
+                <a:buSzPct val="90000"/>
+              </a:pPr>
+              <a:r>
+                <a:rPr lang="de-DE" sz="900" dirty="0"/>
+                <a:t>system utility </a:t>
+              </a:r>
+              <a:endParaRPr lang="en-GB" sz="900" dirty="0" err="1"/>
+            </a:p>
+          </p:txBody>
+        </p:sp>
+      </p:grpSp>
+    </p:spTree>
+    <p:extLst>
+      <p:ext uri="{BB962C8B-B14F-4D97-AF65-F5344CB8AC3E}">
+        <p14:creationId xmlns:p14="http://schemas.microsoft.com/office/powerpoint/2010/main" val="4202233612"/>
+      </p:ext>
+    </p:extLst>
+  </p:cSld>
+  <p:clrMapOvr>
+    <a:masterClrMapping/>
+  </p:clrMapOvr>
+  <p:transition>
+    <p:fade/>
+  </p:transition>
+  <p:timing>
+    <p:tnLst>
+      <p:par>
+        <p:cTn id="1" dur="indefinite" restart="never" nodeType="tmRoot">
+          <p:childTnLst>
+            <p:seq concurrent="1" nextAc="seek">
+              <p:cTn id="2" dur="indefinite" nodeType="mainSeq">
+                <p:childTnLst>
+                  <p:par>
+                    <p:cTn id="3" fill="hold">
+                      <p:stCondLst>
+                        <p:cond delay="indefinite"/>
+                      </p:stCondLst>
+                      <p:childTnLst>
+                        <p:par>
+                          <p:cTn id="4" fill="hold">
+                            <p:stCondLst>
+                              <p:cond delay="0"/>
+                            </p:stCondLst>
+                            <p:childTnLst>
+                              <p:par>
+                                <p:cTn id="5" presetID="10" presetClass="entr" presetSubtype="0" fill="hold" grpId="0" nodeType="clickEffect">
+                                  <p:stCondLst>
+                                    <p:cond delay="0"/>
+                                  </p:stCondLst>
+                                  <p:childTnLst>
+                                    <p:set>
+                                      <p:cBhvr>
+                                        <p:cTn id="6" dur="1" fill="hold">
+                                          <p:stCondLst>
+                                            <p:cond delay="0"/>
+                                          </p:stCondLst>
+                                        </p:cTn>
+                                        <p:tgtEl>
+                                          <p:spTgt spid="64"/>
+                                        </p:tgtEl>
+                                        <p:attrNameLst>
+                                          <p:attrName>style.visibility</p:attrName>
+                                        </p:attrNameLst>
+                                      </p:cBhvr>
+                                      <p:to>
+                                        <p:strVal val="visible"/>
+                                      </p:to>
+                                    </p:set>
+                                    <p:animEffect transition="in" filter="fade">
+                                      <p:cBhvr>
+                                        <p:cTn id="7" dur="250"/>
+                                        <p:tgtEl>
+                                          <p:spTgt spid="64"/>
+                                        </p:tgtEl>
+                                      </p:cBhvr>
+                                    </p:animEffect>
+                                  </p:childTnLst>
+                                </p:cTn>
+                              </p:par>
+                              <p:par>
+                                <p:cTn id="8" presetID="10" presetClass="entr" presetSubtype="0" fill="hold" nodeType="withEffect">
+                                  <p:stCondLst>
+                                    <p:cond delay="0"/>
+                                  </p:stCondLst>
+                                  <p:childTnLst>
+                                    <p:set>
+                                      <p:cBhvr>
+                                        <p:cTn id="9" dur="1" fill="hold">
+                                          <p:stCondLst>
+                                            <p:cond delay="0"/>
+                                          </p:stCondLst>
+                                        </p:cTn>
+                                        <p:tgtEl>
+                                          <p:spTgt spid="67"/>
+                                        </p:tgtEl>
+                                        <p:attrNameLst>
+                                          <p:attrName>style.visibility</p:attrName>
+                                        </p:attrNameLst>
+                                      </p:cBhvr>
+                                      <p:to>
+                                        <p:strVal val="visible"/>
+                                      </p:to>
+                                    </p:set>
+                                    <p:animEffect transition="in" filter="fade">
+                                      <p:cBhvr>
+                                        <p:cTn id="10" dur="250"/>
+                                        <p:tgtEl>
+                                          <p:spTgt spid="67"/>
+                                        </p:tgtEl>
+                                      </p:cBhvr>
+                                    </p:animEffect>
+                                  </p:childTnLst>
+                                </p:cTn>
+                              </p:par>
+                              <p:par>
+                                <p:cTn id="11" presetID="10" presetClass="entr" presetSubtype="0" fill="hold" nodeType="withEffect">
+                                  <p:stCondLst>
+                                    <p:cond delay="0"/>
+                                  </p:stCondLst>
+                                  <p:childTnLst>
+                                    <p:set>
+                                      <p:cBhvr>
+                                        <p:cTn id="12" dur="1" fill="hold">
+                                          <p:stCondLst>
+                                            <p:cond delay="0"/>
+                                          </p:stCondLst>
+                                        </p:cTn>
+                                        <p:tgtEl>
+                                          <p:spTgt spid="70"/>
+                                        </p:tgtEl>
+                                        <p:attrNameLst>
+                                          <p:attrName>style.visibility</p:attrName>
+                                        </p:attrNameLst>
+                                      </p:cBhvr>
+                                      <p:to>
+                                        <p:strVal val="visible"/>
+                                      </p:to>
+                                    </p:set>
+                                    <p:animEffect transition="in" filter="fade">
+                                      <p:cBhvr>
+                                        <p:cTn id="13" dur="250"/>
+                                        <p:tgtEl>
+                                          <p:spTgt spid="70"/>
+                                        </p:tgtEl>
+                                      </p:cBhvr>
+                                    </p:animEffect>
+                                  </p:childTnLst>
+                                </p:cTn>
+                              </p:par>
+                              <p:par>
+                                <p:cTn id="14" presetID="10" presetClass="entr" presetSubtype="0" fill="hold" nodeType="withEffect">
+                                  <p:stCondLst>
+                                    <p:cond delay="0"/>
+                                  </p:stCondLst>
+                                  <p:childTnLst>
+                                    <p:set>
+                                      <p:cBhvr>
+                                        <p:cTn id="15" dur="1" fill="hold">
+                                          <p:stCondLst>
+                                            <p:cond delay="0"/>
+                                          </p:stCondLst>
+                                        </p:cTn>
+                                        <p:tgtEl>
+                                          <p:spTgt spid="73"/>
+                                        </p:tgtEl>
+                                        <p:attrNameLst>
+                                          <p:attrName>style.visibility</p:attrName>
+                                        </p:attrNameLst>
+                                      </p:cBhvr>
+                                      <p:to>
+                                        <p:strVal val="visible"/>
+                                      </p:to>
+                                    </p:set>
+                                    <p:animEffect transition="in" filter="fade">
+                                      <p:cBhvr>
+                                        <p:cTn id="16" dur="250"/>
+                                        <p:tgtEl>
+                                          <p:spTgt spid="73"/>
+                                        </p:tgtEl>
+                                      </p:cBhvr>
+                                    </p:animEffect>
+                                  </p:childTnLst>
+                                </p:cTn>
+                              </p:par>
+                              <p:par>
+                                <p:cTn id="17" presetID="10" presetClass="entr" presetSubtype="0" fill="hold" grpId="0" nodeType="withEffect">
+                                  <p:stCondLst>
+                                    <p:cond delay="0"/>
+                                  </p:stCondLst>
+                                  <p:childTnLst>
+                                    <p:set>
+                                      <p:cBhvr>
+                                        <p:cTn id="18" dur="1" fill="hold">
+                                          <p:stCondLst>
+                                            <p:cond delay="0"/>
+                                          </p:stCondLst>
+                                        </p:cTn>
+                                        <p:tgtEl>
+                                          <p:spTgt spid="103"/>
+                                        </p:tgtEl>
+                                        <p:attrNameLst>
+                                          <p:attrName>style.visibility</p:attrName>
+                                        </p:attrNameLst>
+                                      </p:cBhvr>
+                                      <p:to>
+                                        <p:strVal val="visible"/>
+                                      </p:to>
+                                    </p:set>
+                                    <p:animEffect transition="in" filter="fade">
+                                      <p:cBhvr>
+                                        <p:cTn id="19" dur="250"/>
+                                        <p:tgtEl>
+                                          <p:spTgt spid="103"/>
+                                        </p:tgtEl>
+                                      </p:cBhvr>
+                                    </p:animEffect>
+                                  </p:childTnLst>
+                                </p:cTn>
+                              </p:par>
+                              <p:par>
+                                <p:cTn id="20" presetID="10" presetClass="entr" presetSubtype="0" fill="hold" grpId="0" nodeType="withEffect">
+                                  <p:stCondLst>
+                                    <p:cond delay="0"/>
+                                  </p:stCondLst>
+                                  <p:childTnLst>
+                                    <p:set>
+                                      <p:cBhvr>
+                                        <p:cTn id="21" dur="1" fill="hold">
+                                          <p:stCondLst>
+                                            <p:cond delay="0"/>
+                                          </p:stCondLst>
+                                        </p:cTn>
+                                        <p:tgtEl>
+                                          <p:spTgt spid="63"/>
+                                        </p:tgtEl>
+                                        <p:attrNameLst>
+                                          <p:attrName>style.visibility</p:attrName>
+                                        </p:attrNameLst>
+                                      </p:cBhvr>
+                                      <p:to>
+                                        <p:strVal val="visible"/>
+                                      </p:to>
+                                    </p:set>
+                                    <p:animEffect transition="in" filter="fade">
+                                      <p:cBhvr>
+                                        <p:cTn id="22" dur="250"/>
+                                        <p:tgtEl>
+                                          <p:spTgt spid="63"/>
+                                        </p:tgtEl>
+                                      </p:cBhvr>
+                                    </p:animEffect>
+                                  </p:childTnLst>
+                                </p:cTn>
+                              </p:par>
+                              <p:par>
+                                <p:cTn id="23" presetID="10" presetClass="entr" presetSubtype="0" fill="hold" grpId="0" nodeType="withEffect">
+                                  <p:stCondLst>
+                                    <p:cond delay="0"/>
+                                  </p:stCondLst>
+                                  <p:childTnLst>
+                                    <p:set>
+                                      <p:cBhvr>
+                                        <p:cTn id="24" dur="1" fill="hold">
+                                          <p:stCondLst>
+                                            <p:cond delay="0"/>
+                                          </p:stCondLst>
+                                        </p:cTn>
+                                        <p:tgtEl>
+                                          <p:spTgt spid="65"/>
+                                        </p:tgtEl>
+                                        <p:attrNameLst>
+                                          <p:attrName>style.visibility</p:attrName>
+                                        </p:attrNameLst>
+                                      </p:cBhvr>
+                                      <p:to>
+                                        <p:strVal val="visible"/>
+                                      </p:to>
+                                    </p:set>
+                                    <p:animEffect transition="in" filter="fade">
+                                      <p:cBhvr>
+                                        <p:cTn id="25" dur="250"/>
+                                        <p:tgtEl>
+                                          <p:spTgt spid="65"/>
+                                        </p:tgtEl>
+                                      </p:cBhvr>
+                                    </p:animEffect>
+                                  </p:childTnLst>
+                                </p:cTn>
+                              </p:par>
+                              <p:par>
+                                <p:cTn id="26" presetID="10" presetClass="entr" presetSubtype="0" fill="hold" grpId="0" nodeType="withEffect">
+                                  <p:stCondLst>
+                                    <p:cond delay="0"/>
+                                  </p:stCondLst>
+                                  <p:childTnLst>
+                                    <p:set>
+                                      <p:cBhvr>
+                                        <p:cTn id="27" dur="1" fill="hold">
+                                          <p:stCondLst>
+                                            <p:cond delay="0"/>
+                                          </p:stCondLst>
+                                        </p:cTn>
+                                        <p:tgtEl>
+                                          <p:spTgt spid="76"/>
+                                        </p:tgtEl>
+                                        <p:attrNameLst>
+                                          <p:attrName>style.visibility</p:attrName>
+                                        </p:attrNameLst>
+                                      </p:cBhvr>
+                                      <p:to>
+                                        <p:strVal val="visible"/>
+                                      </p:to>
+                                    </p:set>
+                                    <p:animEffect transition="in" filter="fade">
+                                      <p:cBhvr>
+                                        <p:cTn id="28" dur="250"/>
+                                        <p:tgtEl>
+                                          <p:spTgt spid="76"/>
+                                        </p:tgtEl>
+                                      </p:cBhvr>
+                                    </p:animEffect>
+                                  </p:childTnLst>
+                                </p:cTn>
+                              </p:par>
+                              <p:par>
+                                <p:cTn id="29" presetID="10" presetClass="entr" presetSubtype="0" fill="hold" grpId="0" nodeType="withEffect">
+                                  <p:stCondLst>
+                                    <p:cond delay="0"/>
+                                  </p:stCondLst>
+                                  <p:childTnLst>
+                                    <p:set>
+                                      <p:cBhvr>
+                                        <p:cTn id="30" dur="1" fill="hold">
+                                          <p:stCondLst>
+                                            <p:cond delay="0"/>
+                                          </p:stCondLst>
+                                        </p:cTn>
+                                        <p:tgtEl>
+                                          <p:spTgt spid="66"/>
+                                        </p:tgtEl>
+                                        <p:attrNameLst>
+                                          <p:attrName>style.visibility</p:attrName>
+                                        </p:attrNameLst>
+                                      </p:cBhvr>
+                                      <p:to>
+                                        <p:strVal val="visible"/>
+                                      </p:to>
+                                    </p:set>
+                                    <p:animEffect transition="in" filter="fade">
+                                      <p:cBhvr>
+                                        <p:cTn id="31" dur="250"/>
+                                        <p:tgtEl>
+                                          <p:spTgt spid="66"/>
+                                        </p:tgtEl>
+                                      </p:cBhvr>
+                                    </p:animEffect>
+                                  </p:childTnLst>
+                                </p:cTn>
+                              </p:par>
+                              <p:par>
+                                <p:cTn id="32" presetID="10" presetClass="entr" presetSubtype="0" fill="hold" nodeType="withEffect">
+                                  <p:stCondLst>
+                                    <p:cond delay="0"/>
+                                  </p:stCondLst>
+                                  <p:childTnLst>
+                                    <p:set>
+                                      <p:cBhvr>
+                                        <p:cTn id="33" dur="1" fill="hold">
+                                          <p:stCondLst>
+                                            <p:cond delay="0"/>
+                                          </p:stCondLst>
+                                        </p:cTn>
+                                        <p:tgtEl>
+                                          <p:spTgt spid="123"/>
+                                        </p:tgtEl>
+                                        <p:attrNameLst>
+                                          <p:attrName>style.visibility</p:attrName>
+                                        </p:attrNameLst>
+                                      </p:cBhvr>
+                                      <p:to>
+                                        <p:strVal val="visible"/>
+                                      </p:to>
+                                    </p:set>
+                                    <p:animEffect transition="in" filter="fade">
+                                      <p:cBhvr>
+                                        <p:cTn id="34" dur="250"/>
+                                        <p:tgtEl>
+                                          <p:spTgt spid="123"/>
+                                        </p:tgtEl>
+                                      </p:cBhvr>
+                                    </p:animEffect>
+                                  </p:childTnLst>
+                                </p:cTn>
+                              </p:par>
+                            </p:childTnLst>
+                          </p:cTn>
+                        </p:par>
+                      </p:childTnLst>
+                    </p:cTn>
+                  </p:par>
+                  <p:par>
+                    <p:cTn id="35" fill="hold">
+                      <p:stCondLst>
+                        <p:cond delay="indefinite"/>
+                      </p:stCondLst>
+                      <p:childTnLst>
+                        <p:par>
+                          <p:cTn id="36" fill="hold">
+                            <p:stCondLst>
+                              <p:cond delay="0"/>
+                            </p:stCondLst>
+                            <p:childTnLst>
+                              <p:par>
+                                <p:cTn id="37" presetID="10" presetClass="entr" presetSubtype="0" fill="hold" grpId="0" nodeType="clickEffect">
+                                  <p:stCondLst>
+                                    <p:cond delay="0"/>
+                                  </p:stCondLst>
+                                  <p:childTnLst>
+                                    <p:set>
+                                      <p:cBhvr>
+                                        <p:cTn id="38" dur="1" fill="hold">
+                                          <p:stCondLst>
+                                            <p:cond delay="0"/>
+                                          </p:stCondLst>
+                                        </p:cTn>
+                                        <p:tgtEl>
+                                          <p:spTgt spid="118"/>
+                                        </p:tgtEl>
+                                        <p:attrNameLst>
+                                          <p:attrName>style.visibility</p:attrName>
+                                        </p:attrNameLst>
+                                      </p:cBhvr>
+                                      <p:to>
+                                        <p:strVal val="visible"/>
+                                      </p:to>
+                                    </p:set>
+                                    <p:animEffect transition="in" filter="fade">
+                                      <p:cBhvr>
+                                        <p:cTn id="39" dur="250"/>
+                                        <p:tgtEl>
+                                          <p:spTgt spid="118"/>
+                                        </p:tgtEl>
+                                      </p:cBhvr>
+                                    </p:animEffect>
+                                  </p:childTnLst>
+                                </p:cTn>
+                              </p:par>
+                              <p:par>
+                                <p:cTn id="40" presetID="10" presetClass="entr" presetSubtype="0" fill="hold" nodeType="withEffect">
+                                  <p:stCondLst>
+                                    <p:cond delay="0"/>
+                                  </p:stCondLst>
+                                  <p:childTnLst>
+                                    <p:set>
+                                      <p:cBhvr>
+                                        <p:cTn id="41" dur="1" fill="hold">
+                                          <p:stCondLst>
+                                            <p:cond delay="0"/>
+                                          </p:stCondLst>
+                                        </p:cTn>
+                                        <p:tgtEl>
+                                          <p:spTgt spid="116"/>
+                                        </p:tgtEl>
+                                        <p:attrNameLst>
+                                          <p:attrName>style.visibility</p:attrName>
+                                        </p:attrNameLst>
+                                      </p:cBhvr>
+                                      <p:to>
+                                        <p:strVal val="visible"/>
+                                      </p:to>
+                                    </p:set>
+                                    <p:animEffect transition="in" filter="fade">
+                                      <p:cBhvr>
+                                        <p:cTn id="42" dur="250"/>
+                                        <p:tgtEl>
+                                          <p:spTgt spid="116"/>
+                                        </p:tgtEl>
+                                      </p:cBhvr>
+                                    </p:animEffect>
+                                  </p:childTnLst>
+                                </p:cTn>
+                              </p:par>
+                              <p:par>
+                                <p:cTn id="43" presetID="10" presetClass="entr" presetSubtype="0" fill="hold" grpId="0" nodeType="withEffect">
+                                  <p:stCondLst>
+                                    <p:cond delay="0"/>
+                                  </p:stCondLst>
+                                  <p:childTnLst>
+                                    <p:set>
+                                      <p:cBhvr>
+                                        <p:cTn id="44" dur="1" fill="hold">
+                                          <p:stCondLst>
+                                            <p:cond delay="0"/>
+                                          </p:stCondLst>
+                                        </p:cTn>
+                                        <p:tgtEl>
+                                          <p:spTgt spid="120"/>
+                                        </p:tgtEl>
+                                        <p:attrNameLst>
+                                          <p:attrName>style.visibility</p:attrName>
+                                        </p:attrNameLst>
+                                      </p:cBhvr>
+                                      <p:to>
+                                        <p:strVal val="visible"/>
+                                      </p:to>
+                                    </p:set>
+                                    <p:animEffect transition="in" filter="fade">
+                                      <p:cBhvr>
+                                        <p:cTn id="45" dur="250"/>
+                                        <p:tgtEl>
+                                          <p:spTgt spid="120"/>
+                                        </p:tgtEl>
+                                      </p:cBhvr>
+                                    </p:animEffect>
+                                  </p:childTnLst>
+                                </p:cTn>
+                              </p:par>
+                              <p:par>
+                                <p:cTn id="46" presetID="10" presetClass="entr" presetSubtype="0" fill="hold" nodeType="withEffect">
+                                  <p:stCondLst>
+                                    <p:cond delay="0"/>
+                                  </p:stCondLst>
+                                  <p:childTnLst>
+                                    <p:set>
+                                      <p:cBhvr>
+                                        <p:cTn id="47" dur="1" fill="hold">
+                                          <p:stCondLst>
+                                            <p:cond delay="0"/>
+                                          </p:stCondLst>
+                                        </p:cTn>
+                                        <p:tgtEl>
+                                          <p:spTgt spid="119"/>
+                                        </p:tgtEl>
+                                        <p:attrNameLst>
+                                          <p:attrName>style.visibility</p:attrName>
+                                        </p:attrNameLst>
+                                      </p:cBhvr>
+                                      <p:to>
+                                        <p:strVal val="visible"/>
+                                      </p:to>
+                                    </p:set>
+                                    <p:animEffect transition="in" filter="fade">
+                                      <p:cBhvr>
+                                        <p:cTn id="48" dur="250"/>
+                                        <p:tgtEl>
+                                          <p:spTgt spid="119"/>
+                                        </p:tgtEl>
+                                      </p:cBhvr>
+                                    </p:animEffect>
+                                  </p:childTnLst>
+                                </p:cTn>
+                              </p:par>
+                            </p:childTnLst>
+                          </p:cTn>
+                        </p:par>
+                      </p:childTnLst>
+                    </p:cTn>
+                  </p:par>
+                </p:childTnLst>
+              </p:cTn>
+              <p:prevCondLst>
+                <p:cond evt="onPrev" delay="0">
+                  <p:tgtEl>
+                    <p:sldTgt/>
+                  </p:tgtEl>
+                </p:cond>
+              </p:prevCondLst>
+              <p:nextCondLst>
+                <p:cond evt="onNext" delay="0">
+                  <p:tgtEl>
+                    <p:sldTgt/>
+                  </p:tgtEl>
+                </p:cond>
+              </p:nextCondLst>
+            </p:seq>
+          </p:childTnLst>
+        </p:cTn>
+      </p:par>
+    </p:tnLst>
+    <p:bldLst>
+      <p:bldP spid="64" grpId="0"/>
+      <p:bldP spid="66" grpId="0"/>
+      <p:bldP spid="103" grpId="0"/>
+      <p:bldP spid="63" grpId="0" animBg="1"/>
+      <p:bldP spid="65" grpId="0" animBg="1"/>
+      <p:bldP spid="76" grpId="0" animBg="1"/>
+      <p:bldP spid="118" grpId="0"/>
+      <p:bldP spid="120" grpId="0"/>
+    </p:bldLst>
+  </p:timing>
+</p:sld>
+</file>
+
+<file path=ppt/slides/slide11.xml><?xml version="1.0" encoding="utf-8"?>
+<p:sld xmlns:a="http://schemas.openxmlformats.org/drawingml/2006/main" xmlns:r="http://schemas.openxmlformats.org/officeDocument/2006/relationships" xmlns:p="http://schemas.openxmlformats.org/presentationml/2006/main">
+  <p:cSld>
+    <p:spTree>
+      <p:nvGrpSpPr>
+        <p:cNvPr id="1" name=""/>
+        <p:cNvGrpSpPr/>
+        <p:nvPr/>
+      </p:nvGrpSpPr>
+      <p:grpSpPr>
+        <a:xfrm>
+          <a:off x="0" y="0"/>
+          <a:ext cx="0" cy="0"/>
+          <a:chOff x="0" y="0"/>
+          <a:chExt cx="0" cy="0"/>
+        </a:xfrm>
+      </p:grpSpPr>
+      <p:sp>
+        <p:nvSpPr>
           <p:cNvPr id="6" name="Bildplatzhalter 5"/>
           <p:cNvSpPr>
             <a:spLocks noGrp="1"/>
@@ -11934,7 +15659,7 @@
 </p:sld>
 </file>
 
-<file path=ppt/slides/slide11.xml><?xml version="1.0" encoding="utf-8"?>
+<file path=ppt/slides/slide12.xml><?xml version="1.0" encoding="utf-8"?>
 <p:sld xmlns:a="http://schemas.openxmlformats.org/drawingml/2006/main" xmlns:r="http://schemas.openxmlformats.org/officeDocument/2006/relationships" xmlns:p="http://schemas.openxmlformats.org/presentationml/2006/main" show="0">
   <p:cSld>
     <p:spTree>
@@ -12049,7 +15774,7 @@
 </p:sld>
 </file>
 
-<file path=ppt/slides/slide12.xml><?xml version="1.0" encoding="utf-8"?>
+<file path=ppt/slides/slide13.xml><?xml version="1.0" encoding="utf-8"?>
 <p:sld xmlns:a="http://schemas.openxmlformats.org/drawingml/2006/main" xmlns:r="http://schemas.openxmlformats.org/officeDocument/2006/relationships" xmlns:p="http://schemas.openxmlformats.org/presentationml/2006/main" show="0">
   <p:cSld>
     <p:spTree>
@@ -12164,7 +15889,7 @@
 </p:sld>
 </file>
 
-<file path=ppt/slides/slide13.xml><?xml version="1.0" encoding="utf-8"?>
+<file path=ppt/slides/slide14.xml><?xml version="1.0" encoding="utf-8"?>
 <p:sld xmlns:a="http://schemas.openxmlformats.org/drawingml/2006/main" xmlns:r="http://schemas.openxmlformats.org/officeDocument/2006/relationships" xmlns:p="http://schemas.openxmlformats.org/presentationml/2006/main" show="0">
   <p:cSld>
     <p:spTree>
@@ -12264,7 +15989,7 @@
 </p:sld>
 </file>
 
-<file path=ppt/slides/slide14.xml><?xml version="1.0" encoding="utf-8"?>
+<file path=ppt/slides/slide15.xml><?xml version="1.0" encoding="utf-8"?>
 <p:sld xmlns:a="http://schemas.openxmlformats.org/drawingml/2006/main" xmlns:r="http://schemas.openxmlformats.org/officeDocument/2006/relationships" xmlns:p="http://schemas.openxmlformats.org/presentationml/2006/main" show="0">
   <p:cSld>
     <p:spTree>
@@ -12753,7 +16478,7 @@
             <a:fld id="{91D913BA-B0D8-4B51-9328-DFAA0B370309}" type="slidenum">
               <a:rPr lang="en-US" b="1" smtClean="0"/>
               <a:pPr/>
-              <a:t>14</a:t>
+              <a:t>15</a:t>
             </a:fld>
             <a:endParaRPr lang="en-US" b="1" dirty="0"/>
           </a:p>
@@ -12830,7 +16555,7 @@
 </p:sld>
 </file>
 
-<file path=ppt/slides/slide15.xml><?xml version="1.0" encoding="utf-8"?>
+<file path=ppt/slides/slide16.xml><?xml version="1.0" encoding="utf-8"?>
 <p:sld xmlns:a="http://schemas.openxmlformats.org/drawingml/2006/main" xmlns:r="http://schemas.openxmlformats.org/officeDocument/2006/relationships" xmlns:p="http://schemas.openxmlformats.org/presentationml/2006/main" show="0">
   <p:cSld>
     <p:spTree>
@@ -13584,7 +17309,7 @@
             <a:fld id="{91D913BA-B0D8-4B51-9328-DFAA0B370309}" type="slidenum">
               <a:rPr lang="en-US" b="1" smtClean="0"/>
               <a:pPr/>
-              <a:t>15</a:t>
+              <a:t>16</a:t>
             </a:fld>
             <a:endParaRPr lang="en-US" b="1" dirty="0"/>
           </a:p>
@@ -13724,7 +17449,7 @@
 </p:sld>
 </file>
 
-<file path=ppt/slides/slide16.xml><?xml version="1.0" encoding="utf-8"?>
+<file path=ppt/slides/slide17.xml><?xml version="1.0" encoding="utf-8"?>
 <p:sld xmlns:a="http://schemas.openxmlformats.org/drawingml/2006/main" xmlns:r="http://schemas.openxmlformats.org/officeDocument/2006/relationships" xmlns:p="http://schemas.openxmlformats.org/presentationml/2006/main" show="0">
   <p:cSld>
     <p:spTree>
@@ -14357,7 +18082,7 @@
             <a:fld id="{91D913BA-B0D8-4B51-9328-DFAA0B370309}" type="slidenum">
               <a:rPr lang="en-US" b="1" smtClean="0"/>
               <a:pPr/>
-              <a:t>16</a:t>
+              <a:t>17</a:t>
             </a:fld>
             <a:endParaRPr lang="en-US" b="1" dirty="0"/>
           </a:p>
@@ -14435,7 +18160,7 @@
 </p:sld>
 </file>
 
-<file path=ppt/slides/slide17.xml><?xml version="1.0" encoding="utf-8"?>
+<file path=ppt/slides/slide18.xml><?xml version="1.0" encoding="utf-8"?>
 <p:sld xmlns:a="http://schemas.openxmlformats.org/drawingml/2006/main" xmlns:r="http://schemas.openxmlformats.org/officeDocument/2006/relationships" xmlns:p="http://schemas.openxmlformats.org/presentationml/2006/main" show="0">
   <p:cSld>
     <p:spTree>
@@ -14641,7 +18366,7 @@
             <a:fld id="{91D913BA-B0D8-4B51-9328-DFAA0B370309}" type="slidenum">
               <a:rPr lang="en-US" b="1" smtClean="0"/>
               <a:pPr/>
-              <a:t>17</a:t>
+              <a:t>18</a:t>
             </a:fld>
             <a:endParaRPr lang="en-US" b="1" dirty="0"/>
           </a:p>
@@ -16847,11 +20572,11 @@
           </a:p>
           <a:p>
             <a:r>
-              <a:rPr lang="de-DE"/>
+              <a:rPr lang="de-DE" dirty="0"/>
               <a:t>mRubis wants „execution plan“ but ignores it </a:t>
             </a:r>
             <a:r>
-              <a:rPr lang="de-DE">
+              <a:rPr lang="de-DE" dirty="0">
                 <a:sym typeface="Wingdings" panose="05000000000000000000" pitchFamily="2" charset="2"/>
               </a:rPr>
               <a:t></a:t>

</xml_diff>